<commit_message>
update images in presentation
</commit_message>
<xml_diff>
--- a/Output/Communication Material/most recent version.pptx
+++ b/Output/Communication Material/most recent version.pptx
@@ -5,7 +5,7 @@
     <p:sldMasterId id="2147483648" r:id="rId1"/>
   </p:sldMasterIdLst>
   <p:notesMasterIdLst>
-    <p:notesMasterId r:id="rId19"/>
+    <p:notesMasterId r:id="rId20"/>
   </p:notesMasterIdLst>
   <p:sldIdLst>
     <p:sldId id="260" r:id="rId2"/>
@@ -21,10 +21,11 @@
     <p:sldId id="309" r:id="rId12"/>
     <p:sldId id="305" r:id="rId13"/>
     <p:sldId id="270" r:id="rId14"/>
-    <p:sldId id="307" r:id="rId15"/>
-    <p:sldId id="311" r:id="rId16"/>
-    <p:sldId id="312" r:id="rId17"/>
-    <p:sldId id="277" r:id="rId18"/>
+    <p:sldId id="313" r:id="rId15"/>
+    <p:sldId id="307" r:id="rId16"/>
+    <p:sldId id="311" r:id="rId17"/>
+    <p:sldId id="312" r:id="rId18"/>
+    <p:sldId id="277" r:id="rId19"/>
   </p:sldIdLst>
   <p:sldSz cx="12192000" cy="6858000"/>
   <p:notesSz cx="6858000" cy="9144000"/>
@@ -125,7 +126,18 @@
   </p:defaultTextStyle>
   <p:extLst>
     <p:ext uri="{EFAFB233-063F-42B5-8137-9DF3F51BA10A}">
-      <p15:sldGuideLst xmlns:p15="http://schemas.microsoft.com/office/powerpoint/2012/main" xmlns=""/>
+      <p15:sldGuideLst xmlns:p15="http://schemas.microsoft.com/office/powerpoint/2012/main">
+        <p15:guide id="1" orient="horz" pos="2160">
+          <p15:clr>
+            <a:srgbClr val="A4A3A4"/>
+          </p15:clr>
+        </p15:guide>
+        <p15:guide id="2" pos="3840">
+          <p15:clr>
+            <a:srgbClr val="A4A3A4"/>
+          </p15:clr>
+        </p15:guide>
+      </p15:sldGuideLst>
     </p:ext>
   </p:extLst>
 </p:presentation>
@@ -3809,13 +3821,6 @@
         </dgm:presLayoutVars>
       </dgm:prSet>
       <dgm:spPr/>
-      <dgm:t>
-        <a:bodyPr/>
-        <a:lstStyle/>
-        <a:p>
-          <a:endParaRPr lang="fr-FR"/>
-        </a:p>
-      </dgm:t>
     </dgm:pt>
     <dgm:pt modelId="{7AE48669-78BE-2E40-9F1A-962520656F60}" type="pres">
       <dgm:prSet presAssocID="{FA0E60DA-53EB-2345-8364-D0C8694D5D69}" presName="spacing" presStyleCnt="0"/>
@@ -3836,13 +3841,6 @@
         </dgm:presLayoutVars>
       </dgm:prSet>
       <dgm:spPr/>
-      <dgm:t>
-        <a:bodyPr/>
-        <a:lstStyle/>
-        <a:p>
-          <a:endParaRPr lang="fr-FR"/>
-        </a:p>
-      </dgm:t>
     </dgm:pt>
     <dgm:pt modelId="{64B77A97-79F1-DE4A-A4BD-8C3E03A444C4}" type="pres">
       <dgm:prSet presAssocID="{1E0D2B32-E1A9-B94F-AC62-A91FEAB93B46}" presName="spacing" presStyleCnt="0"/>
@@ -3863,23 +3861,16 @@
         </dgm:presLayoutVars>
       </dgm:prSet>
       <dgm:spPr/>
-      <dgm:t>
-        <a:bodyPr/>
-        <a:lstStyle/>
-        <a:p>
-          <a:endParaRPr lang="fr-FR"/>
-        </a:p>
-      </dgm:t>
     </dgm:pt>
   </dgm:ptLst>
   <dgm:cxnLst>
     <dgm:cxn modelId="{72E8A500-59D2-B244-9409-0B9C1C96FB3F}" type="presOf" srcId="{4D31FBB5-407A-C34D-B756-37DB391F5B2F}" destId="{4F985BED-34D2-904A-B495-7C21DC1C2C2C}" srcOrd="0" destOrd="0" presId="urn:microsoft.com/office/officeart/2005/8/layout/vList3"/>
+    <dgm:cxn modelId="{B2C16F14-FFF1-CF42-9E9F-07CD5CE69648}" srcId="{6577BB5B-08BE-C64A-BEAE-E9480DF63DF6}" destId="{8436259E-7E8B-2343-8939-80AE17CB70C9}" srcOrd="0" destOrd="0" parTransId="{C81056A5-5666-A84E-BC83-912FEDB1D7DC}" sibTransId="{FA0E60DA-53EB-2345-8364-D0C8694D5D69}"/>
     <dgm:cxn modelId="{FB574316-E93C-0143-99F8-C3C2E5EC75C2}" type="presOf" srcId="{CDE60358-B073-484C-8938-1FEA89217358}" destId="{2E523C3B-DD45-6B48-84C0-210DE2166C10}" srcOrd="0" destOrd="0" presId="urn:microsoft.com/office/officeart/2005/8/layout/vList3"/>
+    <dgm:cxn modelId="{E3828439-3E1A-524B-87C5-084EF92F20B3}" srcId="{6577BB5B-08BE-C64A-BEAE-E9480DF63DF6}" destId="{4D31FBB5-407A-C34D-B756-37DB391F5B2F}" srcOrd="1" destOrd="0" parTransId="{FE38597B-85B8-E543-8DA6-8C752A6B4100}" sibTransId="{1E0D2B32-E1A9-B94F-AC62-A91FEAB93B46}"/>
+    <dgm:cxn modelId="{D6F4BEBD-7DA0-8849-B2DE-88752106C871}" type="presOf" srcId="{6577BB5B-08BE-C64A-BEAE-E9480DF63DF6}" destId="{B6309637-668A-5C46-8D01-B0137C5E4C87}" srcOrd="0" destOrd="0" presId="urn:microsoft.com/office/officeart/2005/8/layout/vList3"/>
     <dgm:cxn modelId="{44CA00D3-6139-C949-8F69-3FDC43EBD52F}" srcId="{6577BB5B-08BE-C64A-BEAE-E9480DF63DF6}" destId="{CDE60358-B073-484C-8938-1FEA89217358}" srcOrd="2" destOrd="0" parTransId="{1B7B1E5A-763E-6741-8C37-4D58289090C3}" sibTransId="{A914339C-3C50-A643-9ED9-03207D192824}"/>
     <dgm:cxn modelId="{0C3896FB-5F4B-354B-97EA-7D02D07F429F}" type="presOf" srcId="{8436259E-7E8B-2343-8939-80AE17CB70C9}" destId="{DFC81A66-EC39-9E4B-8D4A-54E237348B17}" srcOrd="0" destOrd="0" presId="urn:microsoft.com/office/officeart/2005/8/layout/vList3"/>
-    <dgm:cxn modelId="{D6F4BEBD-7DA0-8849-B2DE-88752106C871}" type="presOf" srcId="{6577BB5B-08BE-C64A-BEAE-E9480DF63DF6}" destId="{B6309637-668A-5C46-8D01-B0137C5E4C87}" srcOrd="0" destOrd="0" presId="urn:microsoft.com/office/officeart/2005/8/layout/vList3"/>
-    <dgm:cxn modelId="{B2C16F14-FFF1-CF42-9E9F-07CD5CE69648}" srcId="{6577BB5B-08BE-C64A-BEAE-E9480DF63DF6}" destId="{8436259E-7E8B-2343-8939-80AE17CB70C9}" srcOrd="0" destOrd="0" parTransId="{C81056A5-5666-A84E-BC83-912FEDB1D7DC}" sibTransId="{FA0E60DA-53EB-2345-8364-D0C8694D5D69}"/>
-    <dgm:cxn modelId="{E3828439-3E1A-524B-87C5-084EF92F20B3}" srcId="{6577BB5B-08BE-C64A-BEAE-E9480DF63DF6}" destId="{4D31FBB5-407A-C34D-B756-37DB391F5B2F}" srcOrd="1" destOrd="0" parTransId="{FE38597B-85B8-E543-8DA6-8C752A6B4100}" sibTransId="{1E0D2B32-E1A9-B94F-AC62-A91FEAB93B46}"/>
     <dgm:cxn modelId="{A76B8235-7A62-4743-A372-A1C14CBFA203}" type="presParOf" srcId="{B6309637-668A-5C46-8D01-B0137C5E4C87}" destId="{91BE62C7-FD42-504D-8E42-60FC6E804D3A}" srcOrd="0" destOrd="0" presId="urn:microsoft.com/office/officeart/2005/8/layout/vList3"/>
     <dgm:cxn modelId="{AF06770F-4563-D241-9149-D53B3FFB2F47}" type="presParOf" srcId="{91BE62C7-FD42-504D-8E42-60FC6E804D3A}" destId="{050B3CF9-2666-0D4D-B48F-0FF7A2E83BE9}" srcOrd="0" destOrd="0" presId="urn:microsoft.com/office/officeart/2005/8/layout/vList3"/>
     <dgm:cxn modelId="{CD4FFAD8-5219-CD4B-B2C1-8E4720C7575D}" type="presParOf" srcId="{91BE62C7-FD42-504D-8E42-60FC6E804D3A}" destId="{DFC81A66-EC39-9E4B-8D4A-54E237348B17}" srcOrd="1" destOrd="0" presId="urn:microsoft.com/office/officeart/2005/8/layout/vList3"/>
@@ -3960,10 +3951,9 @@
         <a:lstStyle/>
         <a:p>
           <a:r>
-            <a:rPr lang="en-US" dirty="0" smtClean="0"/>
+            <a:rPr lang="en-US" dirty="0"/>
             <a:t>Predictive Model</a:t>
           </a:r>
-          <a:endParaRPr lang="en-US" dirty="0"/>
         </a:p>
       </dgm:t>
     </dgm:pt>
@@ -4033,10 +4023,9 @@
         <a:lstStyle/>
         <a:p>
           <a:r>
-            <a:rPr lang="en-US" dirty="0" smtClean="0"/>
+            <a:rPr lang="en-US" dirty="0"/>
             <a:t>Regularized linear regression</a:t>
           </a:r>
-          <a:endParaRPr lang="en-US" dirty="0"/>
         </a:p>
       </dgm:t>
     </dgm:pt>
@@ -4070,12 +4059,8 @@
         <a:lstStyle/>
         <a:p>
           <a:r>
-            <a:rPr lang="en-US" dirty="0" smtClean="0"/>
-            <a:t>Recommender </a:t>
-          </a:r>
-          <a:r>
             <a:rPr lang="en-US" dirty="0"/>
-            <a:t>System</a:t>
+            <a:t>Recommender System</a:t>
           </a:r>
         </a:p>
       </dgm:t>
@@ -4166,14 +4151,9 @@
         </a:p>
         <a:p>
           <a:r>
-            <a:rPr lang="en-US" dirty="0" smtClean="0"/>
-            <a:t>Warnings &amp; </a:t>
+            <a:rPr lang="en-US" dirty="0"/>
+            <a:t>Warnings &amp; preparatory courses</a:t>
           </a:r>
-          <a:r>
-            <a:rPr lang="en-US" dirty="0" smtClean="0"/>
-            <a:t>preparatory courses</a:t>
-          </a:r>
-          <a:endParaRPr lang="en-US" dirty="0"/>
         </a:p>
       </dgm:t>
     </dgm:pt>
@@ -4210,13 +4190,6 @@
         </dgm:presLayoutVars>
       </dgm:prSet>
       <dgm:spPr/>
-      <dgm:t>
-        <a:bodyPr/>
-        <a:lstStyle/>
-        <a:p>
-          <a:endParaRPr lang="fr-FR"/>
-        </a:p>
-      </dgm:t>
     </dgm:pt>
     <dgm:pt modelId="{4EB9F925-FEE1-6A40-A0B7-BC304ADE4377}" type="pres">
       <dgm:prSet presAssocID="{0D18B1F3-560F-1A4A-AD1F-6E4EE34BCCE5}" presName="hierRoot1" presStyleCnt="0"/>
@@ -4237,13 +4210,6 @@
         </dgm:presLayoutVars>
       </dgm:prSet>
       <dgm:spPr/>
-      <dgm:t>
-        <a:bodyPr/>
-        <a:lstStyle/>
-        <a:p>
-          <a:endParaRPr lang="fr-FR"/>
-        </a:p>
-      </dgm:t>
     </dgm:pt>
     <dgm:pt modelId="{CA916C65-0C63-F94E-9886-B508B08EE2DB}" type="pres">
       <dgm:prSet presAssocID="{0D18B1F3-560F-1A4A-AD1F-6E4EE34BCCE5}" presName="hierChild2" presStyleCnt="0"/>
@@ -4252,13 +4218,6 @@
     <dgm:pt modelId="{5AC0287F-4A09-4644-9B60-1384F89E5341}" type="pres">
       <dgm:prSet presAssocID="{DB9B08D7-4AFB-F742-BDAD-DB3C800F7A45}" presName="Name10" presStyleLbl="parChTrans1D2" presStyleIdx="0" presStyleCnt="2"/>
       <dgm:spPr/>
-      <dgm:t>
-        <a:bodyPr/>
-        <a:lstStyle/>
-        <a:p>
-          <a:endParaRPr lang="fr-FR"/>
-        </a:p>
-      </dgm:t>
     </dgm:pt>
     <dgm:pt modelId="{B07CAB6A-9A6B-EC44-BC7B-B1ACBE441B01}" type="pres">
       <dgm:prSet presAssocID="{AA22864D-A49F-214D-BA2E-24A6B2D5B253}" presName="hierRoot2" presStyleCnt="0"/>
@@ -4279,13 +4238,6 @@
         </dgm:presLayoutVars>
       </dgm:prSet>
       <dgm:spPr/>
-      <dgm:t>
-        <a:bodyPr/>
-        <a:lstStyle/>
-        <a:p>
-          <a:endParaRPr lang="fr-FR"/>
-        </a:p>
-      </dgm:t>
     </dgm:pt>
     <dgm:pt modelId="{2FAC129B-FE48-2943-B8AF-8D7BFD491833}" type="pres">
       <dgm:prSet presAssocID="{AA22864D-A49F-214D-BA2E-24A6B2D5B253}" presName="hierChild3" presStyleCnt="0"/>
@@ -4294,13 +4246,6 @@
     <dgm:pt modelId="{75BC13C8-AF8C-5647-B5CB-4CF15E860B55}" type="pres">
       <dgm:prSet presAssocID="{0DEA9509-4205-6048-AE19-434F50645AD4}" presName="Name17" presStyleLbl="parChTrans1D3" presStyleIdx="0" presStyleCnt="2"/>
       <dgm:spPr/>
-      <dgm:t>
-        <a:bodyPr/>
-        <a:lstStyle/>
-        <a:p>
-          <a:endParaRPr lang="fr-FR"/>
-        </a:p>
-      </dgm:t>
     </dgm:pt>
     <dgm:pt modelId="{BE4E18E3-AA50-F143-B7DC-45D3B974F95C}" type="pres">
       <dgm:prSet presAssocID="{0D020AA6-2535-894D-A0B4-B6B4C024B9AD}" presName="hierRoot3" presStyleCnt="0"/>
@@ -4321,13 +4266,6 @@
         </dgm:presLayoutVars>
       </dgm:prSet>
       <dgm:spPr/>
-      <dgm:t>
-        <a:bodyPr/>
-        <a:lstStyle/>
-        <a:p>
-          <a:endParaRPr lang="fr-FR"/>
-        </a:p>
-      </dgm:t>
     </dgm:pt>
     <dgm:pt modelId="{702CDD9E-AE57-9249-9DB1-8310F5BDAF09}" type="pres">
       <dgm:prSet presAssocID="{0D020AA6-2535-894D-A0B4-B6B4C024B9AD}" presName="hierChild4" presStyleCnt="0"/>
@@ -4336,13 +4274,6 @@
     <dgm:pt modelId="{26B5F258-484C-3F4C-BB80-B640A1C559C5}" type="pres">
       <dgm:prSet presAssocID="{562EB75D-1669-DB46-AF06-E78E2C50015C}" presName="Name23" presStyleLbl="parChTrans1D4" presStyleIdx="0" presStyleCnt="2"/>
       <dgm:spPr/>
-      <dgm:t>
-        <a:bodyPr/>
-        <a:lstStyle/>
-        <a:p>
-          <a:endParaRPr lang="fr-FR"/>
-        </a:p>
-      </dgm:t>
     </dgm:pt>
     <dgm:pt modelId="{86D22DBD-41B3-1B41-92D9-A334794CF4DE}" type="pres">
       <dgm:prSet presAssocID="{6D7F74E0-EEE5-3D4C-8FFC-469D7626CA89}" presName="hierRoot4" presStyleCnt="0"/>
@@ -4363,13 +4294,6 @@
         </dgm:presLayoutVars>
       </dgm:prSet>
       <dgm:spPr/>
-      <dgm:t>
-        <a:bodyPr/>
-        <a:lstStyle/>
-        <a:p>
-          <a:endParaRPr lang="fr-FR"/>
-        </a:p>
-      </dgm:t>
     </dgm:pt>
     <dgm:pt modelId="{19CC0299-9B21-9946-BC29-DE62CC2E0B9F}" type="pres">
       <dgm:prSet presAssocID="{6D7F74E0-EEE5-3D4C-8FFC-469D7626CA89}" presName="hierChild5" presStyleCnt="0"/>
@@ -4378,13 +4302,6 @@
     <dgm:pt modelId="{79AF5C01-8724-DF4E-8B78-F6ED5F02738D}" type="pres">
       <dgm:prSet presAssocID="{AF3E5E4F-1619-4346-ABFB-1AC9527739FB}" presName="Name10" presStyleLbl="parChTrans1D2" presStyleIdx="1" presStyleCnt="2"/>
       <dgm:spPr/>
-      <dgm:t>
-        <a:bodyPr/>
-        <a:lstStyle/>
-        <a:p>
-          <a:endParaRPr lang="fr-FR"/>
-        </a:p>
-      </dgm:t>
     </dgm:pt>
     <dgm:pt modelId="{1732F2D7-A330-8344-8F0F-AD96C51C795E}" type="pres">
       <dgm:prSet presAssocID="{FF95716C-2E76-B448-9AEC-0CE65C5F61A9}" presName="hierRoot2" presStyleCnt="0"/>
@@ -4405,13 +4322,6 @@
         </dgm:presLayoutVars>
       </dgm:prSet>
       <dgm:spPr/>
-      <dgm:t>
-        <a:bodyPr/>
-        <a:lstStyle/>
-        <a:p>
-          <a:endParaRPr lang="fr-FR"/>
-        </a:p>
-      </dgm:t>
     </dgm:pt>
     <dgm:pt modelId="{C9FCBE1C-E569-5249-BCCA-B9B15316F873}" type="pres">
       <dgm:prSet presAssocID="{FF95716C-2E76-B448-9AEC-0CE65C5F61A9}" presName="hierChild3" presStyleCnt="0"/>
@@ -4420,13 +4330,6 @@
     <dgm:pt modelId="{351862DD-EBB8-2F4F-8E19-58F5D3E7E1B0}" type="pres">
       <dgm:prSet presAssocID="{8DB2768A-4134-F740-861B-DD0D40D9DE64}" presName="Name17" presStyleLbl="parChTrans1D3" presStyleIdx="1" presStyleCnt="2"/>
       <dgm:spPr/>
-      <dgm:t>
-        <a:bodyPr/>
-        <a:lstStyle/>
-        <a:p>
-          <a:endParaRPr lang="fr-FR"/>
-        </a:p>
-      </dgm:t>
     </dgm:pt>
     <dgm:pt modelId="{20DEC751-508E-024A-BF88-AA9992DF604C}" type="pres">
       <dgm:prSet presAssocID="{E7EC5815-0641-8C49-BB3D-0734EDEACDE0}" presName="hierRoot3" presStyleCnt="0"/>
@@ -4447,13 +4350,6 @@
         </dgm:presLayoutVars>
       </dgm:prSet>
       <dgm:spPr/>
-      <dgm:t>
-        <a:bodyPr/>
-        <a:lstStyle/>
-        <a:p>
-          <a:endParaRPr lang="fr-FR"/>
-        </a:p>
-      </dgm:t>
     </dgm:pt>
     <dgm:pt modelId="{4ED59EF9-2FEA-6243-B737-0893CDC2D0A0}" type="pres">
       <dgm:prSet presAssocID="{E7EC5815-0641-8C49-BB3D-0734EDEACDE0}" presName="hierChild4" presStyleCnt="0"/>
@@ -4462,13 +4358,6 @@
     <dgm:pt modelId="{D1731169-6A47-834F-8E2F-4B1149483C43}" type="pres">
       <dgm:prSet presAssocID="{0466863D-366A-EA49-BAC1-71BC9618F51B}" presName="Name23" presStyleLbl="parChTrans1D4" presStyleIdx="1" presStyleCnt="2"/>
       <dgm:spPr/>
-      <dgm:t>
-        <a:bodyPr/>
-        <a:lstStyle/>
-        <a:p>
-          <a:endParaRPr lang="fr-FR"/>
-        </a:p>
-      </dgm:t>
     </dgm:pt>
     <dgm:pt modelId="{E92FCD50-7069-524C-B447-027148347F7D}" type="pres">
       <dgm:prSet presAssocID="{E55E7914-8F4D-A24A-A910-246628899527}" presName="hierRoot4" presStyleCnt="0"/>
@@ -4489,13 +4378,6 @@
         </dgm:presLayoutVars>
       </dgm:prSet>
       <dgm:spPr/>
-      <dgm:t>
-        <a:bodyPr/>
-        <a:lstStyle/>
-        <a:p>
-          <a:endParaRPr lang="fr-FR"/>
-        </a:p>
-      </dgm:t>
     </dgm:pt>
     <dgm:pt modelId="{4CCEFCDD-8906-1643-98F1-921615FE62F7}" type="pres">
       <dgm:prSet presAssocID="{E55E7914-8F4D-A24A-A910-246628899527}" presName="hierChild5" presStyleCnt="0"/>
@@ -4503,27 +4385,27 @@
     </dgm:pt>
   </dgm:ptLst>
   <dgm:cxnLst>
+    <dgm:cxn modelId="{3ABE1401-F495-FF4D-88CE-EF14630BE7D1}" type="presOf" srcId="{0D18B1F3-560F-1A4A-AD1F-6E4EE34BCCE5}" destId="{71A1BEFD-FB77-1246-B5EC-C86C2AFAB676}" srcOrd="0" destOrd="0" presId="urn:microsoft.com/office/officeart/2009/layout/CirclePictureHierarchy"/>
+    <dgm:cxn modelId="{DC68D40B-B8DD-C44E-9FE4-AD39E05A38B5}" srcId="{AA22864D-A49F-214D-BA2E-24A6B2D5B253}" destId="{0D020AA6-2535-894D-A0B4-B6B4C024B9AD}" srcOrd="0" destOrd="0" parTransId="{0DEA9509-4205-6048-AE19-434F50645AD4}" sibTransId="{D15362C5-3F97-9C45-81BA-0E460C3F6C7A}"/>
+    <dgm:cxn modelId="{A0C88310-6364-D54B-902E-B9BCC8B130E9}" srcId="{F8106121-B633-8B49-BCC0-FFDB78E8B098}" destId="{0D18B1F3-560F-1A4A-AD1F-6E4EE34BCCE5}" srcOrd="0" destOrd="0" parTransId="{8C10D682-039B-8249-95CE-156F17462F7E}" sibTransId="{61379222-F04D-4B4B-8300-45C15E2CB7B6}"/>
+    <dgm:cxn modelId="{6295AE13-673B-A349-97B0-F52E7D052D27}" type="presOf" srcId="{6D7F74E0-EEE5-3D4C-8FFC-469D7626CA89}" destId="{3E92DB47-43A1-D646-9B77-D593F8ED4415}" srcOrd="0" destOrd="0" presId="urn:microsoft.com/office/officeart/2009/layout/CirclePictureHierarchy"/>
+    <dgm:cxn modelId="{B91B0B18-601A-5A4D-B4A8-71D3F69517AA}" type="presOf" srcId="{8DB2768A-4134-F740-861B-DD0D40D9DE64}" destId="{351862DD-EBB8-2F4F-8E19-58F5D3E7E1B0}" srcOrd="0" destOrd="0" presId="urn:microsoft.com/office/officeart/2009/layout/CirclePictureHierarchy"/>
+    <dgm:cxn modelId="{018F611B-9525-1946-BFFC-EC86CCBFD36A}" type="presOf" srcId="{562EB75D-1669-DB46-AF06-E78E2C50015C}" destId="{26B5F258-484C-3F4C-BB80-B640A1C559C5}" srcOrd="0" destOrd="0" presId="urn:microsoft.com/office/officeart/2009/layout/CirclePictureHierarchy"/>
+    <dgm:cxn modelId="{DC72862B-5F4F-974F-95A1-BBFBFD1E084E}" type="presOf" srcId="{AA22864D-A49F-214D-BA2E-24A6B2D5B253}" destId="{3F272584-72A2-4D46-B55C-57743770FE43}" srcOrd="0" destOrd="0" presId="urn:microsoft.com/office/officeart/2009/layout/CirclePictureHierarchy"/>
+    <dgm:cxn modelId="{9110902E-4B4E-6A4A-A16E-8A95CA1A3E42}" type="presOf" srcId="{E7EC5815-0641-8C49-BB3D-0734EDEACDE0}" destId="{F13BCCAE-E1C2-614B-81A6-4774211489D5}" srcOrd="0" destOrd="0" presId="urn:microsoft.com/office/officeart/2009/layout/CirclePictureHierarchy"/>
+    <dgm:cxn modelId="{47BAF33A-0DF5-E940-B850-09B2F65C3352}" srcId="{FF95716C-2E76-B448-9AEC-0CE65C5F61A9}" destId="{E7EC5815-0641-8C49-BB3D-0734EDEACDE0}" srcOrd="0" destOrd="0" parTransId="{8DB2768A-4134-F740-861B-DD0D40D9DE64}" sibTransId="{43BA868F-15D9-C14E-94FF-E0C1520B4A9F}"/>
+    <dgm:cxn modelId="{512A9841-CDD1-344A-B5F5-086D9CBAB538}" type="presOf" srcId="{F8106121-B633-8B49-BCC0-FFDB78E8B098}" destId="{BFACA518-B679-324F-BEE3-4D9B308FF833}" srcOrd="0" destOrd="0" presId="urn:microsoft.com/office/officeart/2009/layout/CirclePictureHierarchy"/>
+    <dgm:cxn modelId="{E5CDEA5B-F6F4-2D46-801C-C817F55FF8AF}" type="presOf" srcId="{FF95716C-2E76-B448-9AEC-0CE65C5F61A9}" destId="{B3177CA6-3E69-4641-94C7-968D9AE05BA2}" srcOrd="0" destOrd="0" presId="urn:microsoft.com/office/officeart/2009/layout/CirclePictureHierarchy"/>
+    <dgm:cxn modelId="{D8BC4587-8AD7-DC40-9B0A-7194B03577E8}" srcId="{0D18B1F3-560F-1A4A-AD1F-6E4EE34BCCE5}" destId="{AA22864D-A49F-214D-BA2E-24A6B2D5B253}" srcOrd="0" destOrd="0" parTransId="{DB9B08D7-4AFB-F742-BDAD-DB3C800F7A45}" sibTransId="{CE71534D-56BD-7343-BC19-810D7E83E898}"/>
+    <dgm:cxn modelId="{46D6C0A4-0803-0342-AE5E-1D3C8B7F2AEC}" type="presOf" srcId="{DB9B08D7-4AFB-F742-BDAD-DB3C800F7A45}" destId="{5AC0287F-4A09-4644-9B60-1384F89E5341}" srcOrd="0" destOrd="0" presId="urn:microsoft.com/office/officeart/2009/layout/CirclePictureHierarchy"/>
+    <dgm:cxn modelId="{CD1BE2A4-9F95-D044-AD89-F010A88F515B}" type="presOf" srcId="{0466863D-366A-EA49-BAC1-71BC9618F51B}" destId="{D1731169-6A47-834F-8E2F-4B1149483C43}" srcOrd="0" destOrd="0" presId="urn:microsoft.com/office/officeart/2009/layout/CirclePictureHierarchy"/>
+    <dgm:cxn modelId="{FEA17CA7-9782-7D4D-AA5F-1D2841F6471A}" type="presOf" srcId="{0D020AA6-2535-894D-A0B4-B6B4C024B9AD}" destId="{6774ED39-1A82-8348-875D-49E60374E5C1}" srcOrd="0" destOrd="0" presId="urn:microsoft.com/office/officeart/2009/layout/CirclePictureHierarchy"/>
+    <dgm:cxn modelId="{BA412CCD-110F-DE4E-AAE2-6358950A7311}" srcId="{E7EC5815-0641-8C49-BB3D-0734EDEACDE0}" destId="{E55E7914-8F4D-A24A-A910-246628899527}" srcOrd="0" destOrd="0" parTransId="{0466863D-366A-EA49-BAC1-71BC9618F51B}" sibTransId="{36D8079B-B638-AC48-9856-A6814567AAB5}"/>
+    <dgm:cxn modelId="{7442CAD3-D774-C04F-A197-4A6C49BDD3ED}" type="presOf" srcId="{AF3E5E4F-1619-4346-ABFB-1AC9527739FB}" destId="{79AF5C01-8724-DF4E-8B78-F6ED5F02738D}" srcOrd="0" destOrd="0" presId="urn:microsoft.com/office/officeart/2009/layout/CirclePictureHierarchy"/>
     <dgm:cxn modelId="{69A84CD7-AAA9-7D48-98A3-371EEE3B9EA1}" type="presOf" srcId="{E55E7914-8F4D-A24A-A910-246628899527}" destId="{151BC73F-3B0B-F544-A30B-41E20B575076}" srcOrd="0" destOrd="0" presId="urn:microsoft.com/office/officeart/2009/layout/CirclePictureHierarchy"/>
-    <dgm:cxn modelId="{D8BC4587-8AD7-DC40-9B0A-7194B03577E8}" srcId="{0D18B1F3-560F-1A4A-AD1F-6E4EE34BCCE5}" destId="{AA22864D-A49F-214D-BA2E-24A6B2D5B253}" srcOrd="0" destOrd="0" parTransId="{DB9B08D7-4AFB-F742-BDAD-DB3C800F7A45}" sibTransId="{CE71534D-56BD-7343-BC19-810D7E83E898}"/>
-    <dgm:cxn modelId="{BA412CCD-110F-DE4E-AAE2-6358950A7311}" srcId="{E7EC5815-0641-8C49-BB3D-0734EDEACDE0}" destId="{E55E7914-8F4D-A24A-A910-246628899527}" srcOrd="0" destOrd="0" parTransId="{0466863D-366A-EA49-BAC1-71BC9618F51B}" sibTransId="{36D8079B-B638-AC48-9856-A6814567AAB5}"/>
-    <dgm:cxn modelId="{A0C88310-6364-D54B-902E-B9BCC8B130E9}" srcId="{F8106121-B633-8B49-BCC0-FFDB78E8B098}" destId="{0D18B1F3-560F-1A4A-AD1F-6E4EE34BCCE5}" srcOrd="0" destOrd="0" parTransId="{8C10D682-039B-8249-95CE-156F17462F7E}" sibTransId="{61379222-F04D-4B4B-8300-45C15E2CB7B6}"/>
-    <dgm:cxn modelId="{7442CAD3-D774-C04F-A197-4A6C49BDD3ED}" type="presOf" srcId="{AF3E5E4F-1619-4346-ABFB-1AC9527739FB}" destId="{79AF5C01-8724-DF4E-8B78-F6ED5F02738D}" srcOrd="0" destOrd="0" presId="urn:microsoft.com/office/officeart/2009/layout/CirclePictureHierarchy"/>
-    <dgm:cxn modelId="{DC68D40B-B8DD-C44E-9FE4-AD39E05A38B5}" srcId="{AA22864D-A49F-214D-BA2E-24A6B2D5B253}" destId="{0D020AA6-2535-894D-A0B4-B6B4C024B9AD}" srcOrd="0" destOrd="0" parTransId="{0DEA9509-4205-6048-AE19-434F50645AD4}" sibTransId="{D15362C5-3F97-9C45-81BA-0E460C3F6C7A}"/>
-    <dgm:cxn modelId="{CD1BE2A4-9F95-D044-AD89-F010A88F515B}" type="presOf" srcId="{0466863D-366A-EA49-BAC1-71BC9618F51B}" destId="{D1731169-6A47-834F-8E2F-4B1149483C43}" srcOrd="0" destOrd="0" presId="urn:microsoft.com/office/officeart/2009/layout/CirclePictureHierarchy"/>
     <dgm:cxn modelId="{C12FF2D7-1E3B-C342-9B75-E47DDBCCFD36}" type="presOf" srcId="{0DEA9509-4205-6048-AE19-434F50645AD4}" destId="{75BC13C8-AF8C-5647-B5CB-4CF15E860B55}" srcOrd="0" destOrd="0" presId="urn:microsoft.com/office/officeart/2009/layout/CirclePictureHierarchy"/>
-    <dgm:cxn modelId="{B91B0B18-601A-5A4D-B4A8-71D3F69517AA}" type="presOf" srcId="{8DB2768A-4134-F740-861B-DD0D40D9DE64}" destId="{351862DD-EBB8-2F4F-8E19-58F5D3E7E1B0}" srcOrd="0" destOrd="0" presId="urn:microsoft.com/office/officeart/2009/layout/CirclePictureHierarchy"/>
-    <dgm:cxn modelId="{47BAF33A-0DF5-E940-B850-09B2F65C3352}" srcId="{FF95716C-2E76-B448-9AEC-0CE65C5F61A9}" destId="{E7EC5815-0641-8C49-BB3D-0734EDEACDE0}" srcOrd="0" destOrd="0" parTransId="{8DB2768A-4134-F740-861B-DD0D40D9DE64}" sibTransId="{43BA868F-15D9-C14E-94FF-E0C1520B4A9F}"/>
     <dgm:cxn modelId="{2A2F09F2-4F9C-214B-96A9-B99E9195CC97}" srcId="{0D020AA6-2535-894D-A0B4-B6B4C024B9AD}" destId="{6D7F74E0-EEE5-3D4C-8FFC-469D7626CA89}" srcOrd="0" destOrd="0" parTransId="{562EB75D-1669-DB46-AF06-E78E2C50015C}" sibTransId="{9F726F4E-6A8E-904D-BC49-511C686C9E00}"/>
-    <dgm:cxn modelId="{6295AE13-673B-A349-97B0-F52E7D052D27}" type="presOf" srcId="{6D7F74E0-EEE5-3D4C-8FFC-469D7626CA89}" destId="{3E92DB47-43A1-D646-9B77-D593F8ED4415}" srcOrd="0" destOrd="0" presId="urn:microsoft.com/office/officeart/2009/layout/CirclePictureHierarchy"/>
-    <dgm:cxn modelId="{E5CDEA5B-F6F4-2D46-801C-C817F55FF8AF}" type="presOf" srcId="{FF95716C-2E76-B448-9AEC-0CE65C5F61A9}" destId="{B3177CA6-3E69-4641-94C7-968D9AE05BA2}" srcOrd="0" destOrd="0" presId="urn:microsoft.com/office/officeart/2009/layout/CirclePictureHierarchy"/>
     <dgm:cxn modelId="{4C3A57F8-3AE6-2F4C-9956-859857EA2BDD}" srcId="{0D18B1F3-560F-1A4A-AD1F-6E4EE34BCCE5}" destId="{FF95716C-2E76-B448-9AEC-0CE65C5F61A9}" srcOrd="1" destOrd="0" parTransId="{AF3E5E4F-1619-4346-ABFB-1AC9527739FB}" sibTransId="{2B201AA7-B7B2-DD4E-A59D-6AA1B3421050}"/>
-    <dgm:cxn modelId="{FEA17CA7-9782-7D4D-AA5F-1D2841F6471A}" type="presOf" srcId="{0D020AA6-2535-894D-A0B4-B6B4C024B9AD}" destId="{6774ED39-1A82-8348-875D-49E60374E5C1}" srcOrd="0" destOrd="0" presId="urn:microsoft.com/office/officeart/2009/layout/CirclePictureHierarchy"/>
-    <dgm:cxn modelId="{9110902E-4B4E-6A4A-A16E-8A95CA1A3E42}" type="presOf" srcId="{E7EC5815-0641-8C49-BB3D-0734EDEACDE0}" destId="{F13BCCAE-E1C2-614B-81A6-4774211489D5}" srcOrd="0" destOrd="0" presId="urn:microsoft.com/office/officeart/2009/layout/CirclePictureHierarchy"/>
-    <dgm:cxn modelId="{DC72862B-5F4F-974F-95A1-BBFBFD1E084E}" type="presOf" srcId="{AA22864D-A49F-214D-BA2E-24A6B2D5B253}" destId="{3F272584-72A2-4D46-B55C-57743770FE43}" srcOrd="0" destOrd="0" presId="urn:microsoft.com/office/officeart/2009/layout/CirclePictureHierarchy"/>
-    <dgm:cxn modelId="{46D6C0A4-0803-0342-AE5E-1D3C8B7F2AEC}" type="presOf" srcId="{DB9B08D7-4AFB-F742-BDAD-DB3C800F7A45}" destId="{5AC0287F-4A09-4644-9B60-1384F89E5341}" srcOrd="0" destOrd="0" presId="urn:microsoft.com/office/officeart/2009/layout/CirclePictureHierarchy"/>
-    <dgm:cxn modelId="{3ABE1401-F495-FF4D-88CE-EF14630BE7D1}" type="presOf" srcId="{0D18B1F3-560F-1A4A-AD1F-6E4EE34BCCE5}" destId="{71A1BEFD-FB77-1246-B5EC-C86C2AFAB676}" srcOrd="0" destOrd="0" presId="urn:microsoft.com/office/officeart/2009/layout/CirclePictureHierarchy"/>
-    <dgm:cxn modelId="{018F611B-9525-1946-BFFC-EC86CCBFD36A}" type="presOf" srcId="{562EB75D-1669-DB46-AF06-E78E2C50015C}" destId="{26B5F258-484C-3F4C-BB80-B640A1C559C5}" srcOrd="0" destOrd="0" presId="urn:microsoft.com/office/officeart/2009/layout/CirclePictureHierarchy"/>
-    <dgm:cxn modelId="{512A9841-CDD1-344A-B5F5-086D9CBAB538}" type="presOf" srcId="{F8106121-B633-8B49-BCC0-FFDB78E8B098}" destId="{BFACA518-B679-324F-BEE3-4D9B308FF833}" srcOrd="0" destOrd="0" presId="urn:microsoft.com/office/officeart/2009/layout/CirclePictureHierarchy"/>
     <dgm:cxn modelId="{1723FDE2-DC58-CF40-A821-F834C825588A}" type="presParOf" srcId="{BFACA518-B679-324F-BEE3-4D9B308FF833}" destId="{4EB9F925-FEE1-6A40-A0B7-BC304ADE4377}" srcOrd="0" destOrd="0" presId="urn:microsoft.com/office/officeart/2009/layout/CirclePictureHierarchy"/>
     <dgm:cxn modelId="{50BD7ADD-101E-114B-BBD0-F62F37B0340F}" type="presParOf" srcId="{4EB9F925-FEE1-6A40-A0B7-BC304ADE4377}" destId="{36DF1AB2-6220-C347-A48F-B712450C3326}" srcOrd="0" destOrd="0" presId="urn:microsoft.com/office/officeart/2009/layout/CirclePictureHierarchy"/>
     <dgm:cxn modelId="{A0BAF571-6B67-3341-9DC5-8CD8B4E3678B}" type="presParOf" srcId="{36DF1AB2-6220-C347-A48F-B712450C3326}" destId="{4286AF6E-DC77-7944-951F-D84B00D22109}" srcOrd="0" destOrd="0" presId="urn:microsoft.com/office/officeart/2009/layout/CirclePictureHierarchy"/>
@@ -4598,10 +4480,9 @@
         <a:lstStyle/>
         <a:p>
           <a:r>
-            <a:rPr lang="en-US" dirty="0" smtClean="0"/>
+            <a:rPr lang="en-US" dirty="0"/>
             <a:t>Input</a:t>
           </a:r>
-          <a:endParaRPr lang="en-US" dirty="0"/>
         </a:p>
       </dgm:t>
     </dgm:pt>
@@ -4635,10 +4516,9 @@
         <a:lstStyle/>
         <a:p>
           <a:r>
-            <a:rPr lang="en-US" dirty="0" smtClean="0"/>
+            <a:rPr lang="en-US" dirty="0"/>
             <a:t>Textual description of courses:</a:t>
           </a:r>
-          <a:endParaRPr lang="en-US" dirty="0"/>
         </a:p>
       </dgm:t>
     </dgm:pt>
@@ -4708,12 +4588,8 @@
         <a:lstStyle/>
         <a:p>
           <a:r>
-            <a:rPr lang="en-US" dirty="0" smtClean="0"/>
-            <a:t>Course </a:t>
-          </a:r>
-          <a:r>
             <a:rPr lang="en-US" dirty="0"/>
-            <a:t>Recommendation</a:t>
+            <a:t>Course Recommendation</a:t>
           </a:r>
         </a:p>
       </dgm:t>
@@ -4748,10 +4624,9 @@
         <a:lstStyle/>
         <a:p>
           <a:r>
-            <a:rPr lang="en-US" dirty="0" smtClean="0"/>
+            <a:rPr lang="en-US" dirty="0"/>
             <a:t>App: selection of key words</a:t>
           </a:r>
-          <a:endParaRPr lang="en-US" dirty="0"/>
         </a:p>
       </dgm:t>
     </dgm:pt>
@@ -4821,14 +4696,9 @@
         <a:lstStyle/>
         <a:p>
           <a:r>
-            <a:rPr lang="en-US" dirty="0" smtClean="0"/>
-            <a:t>Model selection: perplexity, coherence, </a:t>
+            <a:rPr lang="en-US" dirty="0"/>
+            <a:t>Model selection: perplexity, coherence, log-likelihood (future)</a:t>
           </a:r>
-          <a:r>
-            <a:rPr lang="en-US" dirty="0" smtClean="0"/>
-            <a:t>log-likelihood (future)</a:t>
-          </a:r>
-          <a:endParaRPr lang="en-US" dirty="0"/>
         </a:p>
       </dgm:t>
     </dgm:pt>
@@ -4864,7 +4734,7 @@
             <a:lstStyle/>
             <a:p>
               <a:r>
-                <a:rPr lang="en-US" dirty="0" smtClean="0"/>
+                <a:rPr lang="en-US" dirty="0"/>
                 <a:t>Vary: </a:t>
               </a:r>
               <a14:m>
@@ -4890,7 +4760,7 @@
                 </m:oMath>
               </a14:m>
               <a:r>
-                <a:rPr lang="en-US" dirty="0" smtClean="0"/>
+                <a:rPr lang="en-US" dirty="0"/>
                 <a:t> and </a:t>
               </a:r>
               <a14:m>
@@ -4978,10 +4848,9 @@
         <a:lstStyle/>
         <a:p>
           <a:r>
-            <a:rPr lang="en-US" dirty="0" smtClean="0"/>
+            <a:rPr lang="en-US" dirty="0"/>
             <a:t>Course manuals</a:t>
           </a:r>
-          <a:endParaRPr lang="en-US" dirty="0"/>
         </a:p>
       </dgm:t>
     </dgm:pt>
@@ -5015,10 +4884,9 @@
         <a:lstStyle/>
         <a:p>
           <a:r>
-            <a:rPr lang="en-US" dirty="0" smtClean="0"/>
+            <a:rPr lang="en-US" dirty="0"/>
             <a:t>Course catalogue</a:t>
           </a:r>
-          <a:endParaRPr lang="en-US" dirty="0"/>
         </a:p>
       </dgm:t>
     </dgm:pt>
@@ -5085,10 +4953,9 @@
         <a:lstStyle/>
         <a:p>
           <a:r>
-            <a:rPr lang="en-US" dirty="0" smtClean="0"/>
+            <a:rPr lang="en-US" dirty="0"/>
             <a:t>Identify matching courses</a:t>
           </a:r>
-          <a:endParaRPr lang="en-US" dirty="0"/>
         </a:p>
       </dgm:t>
     </dgm:pt>
@@ -5122,10 +4989,9 @@
         <a:lstStyle/>
         <a:p>
           <a:r>
-            <a:rPr lang="en-US" dirty="0" smtClean="0"/>
+            <a:rPr lang="en-US" dirty="0"/>
             <a:t>student topic profile</a:t>
           </a:r>
-          <a:endParaRPr lang="en-US" dirty="0"/>
         </a:p>
       </dgm:t>
     </dgm:pt>
@@ -5159,10 +5025,9 @@
         <a:lstStyle/>
         <a:p>
           <a:r>
-            <a:rPr lang="en-US" dirty="0" smtClean="0"/>
+            <a:rPr lang="en-US" dirty="0"/>
             <a:t>Course literature (future)</a:t>
           </a:r>
-          <a:endParaRPr lang="en-US" dirty="0"/>
         </a:p>
       </dgm:t>
     </dgm:pt>
@@ -5196,13 +5061,6 @@
         </dgm:presLayoutVars>
       </dgm:prSet>
       <dgm:spPr/>
-      <dgm:t>
-        <a:bodyPr/>
-        <a:lstStyle/>
-        <a:p>
-          <a:endParaRPr lang="fr-FR"/>
-        </a:p>
-      </dgm:t>
     </dgm:pt>
     <dgm:pt modelId="{C52653A9-88E4-5B4C-A313-E4CE4518E38B}" type="pres">
       <dgm:prSet presAssocID="{CB4FD71C-37EB-7C4D-BA75-847F56CE95C2}" presName="node" presStyleLbl="node1" presStyleIdx="0" presStyleCnt="3">
@@ -5211,35 +5069,14 @@
         </dgm:presLayoutVars>
       </dgm:prSet>
       <dgm:spPr/>
-      <dgm:t>
-        <a:bodyPr/>
-        <a:lstStyle/>
-        <a:p>
-          <a:endParaRPr lang="fr-FR"/>
-        </a:p>
-      </dgm:t>
     </dgm:pt>
     <dgm:pt modelId="{524E36A4-812D-A94F-B713-8FF1DFB30DF5}" type="pres">
       <dgm:prSet presAssocID="{3C3A72B1-6F38-454F-ADA5-D1EBE4A37A7A}" presName="sibTrans" presStyleLbl="sibTrans2D1" presStyleIdx="0" presStyleCnt="2"/>
       <dgm:spPr/>
-      <dgm:t>
-        <a:bodyPr/>
-        <a:lstStyle/>
-        <a:p>
-          <a:endParaRPr lang="fr-FR"/>
-        </a:p>
-      </dgm:t>
     </dgm:pt>
     <dgm:pt modelId="{45B56F92-CA62-7547-B01D-E6ADA8964BD8}" type="pres">
       <dgm:prSet presAssocID="{3C3A72B1-6F38-454F-ADA5-D1EBE4A37A7A}" presName="connectorText" presStyleLbl="sibTrans2D1" presStyleIdx="0" presStyleCnt="2"/>
       <dgm:spPr/>
-      <dgm:t>
-        <a:bodyPr/>
-        <a:lstStyle/>
-        <a:p>
-          <a:endParaRPr lang="fr-FR"/>
-        </a:p>
-      </dgm:t>
     </dgm:pt>
     <dgm:pt modelId="{062D1ADA-9625-5C42-8A29-3EBF6176F03B}" type="pres">
       <dgm:prSet presAssocID="{55AF6ACC-D03D-AE4C-B062-8B2F16A0D8E1}" presName="node" presStyleLbl="node1" presStyleIdx="1" presStyleCnt="3">
@@ -5248,35 +5085,14 @@
         </dgm:presLayoutVars>
       </dgm:prSet>
       <dgm:spPr/>
-      <dgm:t>
-        <a:bodyPr/>
-        <a:lstStyle/>
-        <a:p>
-          <a:endParaRPr lang="fr-FR"/>
-        </a:p>
-      </dgm:t>
     </dgm:pt>
     <dgm:pt modelId="{FF924318-EFF4-114C-A607-D5E593D342F4}" type="pres">
       <dgm:prSet presAssocID="{A7B5DA2F-F7AF-9F49-B4CA-599244722077}" presName="sibTrans" presStyleLbl="sibTrans2D1" presStyleIdx="1" presStyleCnt="2"/>
       <dgm:spPr/>
-      <dgm:t>
-        <a:bodyPr/>
-        <a:lstStyle/>
-        <a:p>
-          <a:endParaRPr lang="fr-FR"/>
-        </a:p>
-      </dgm:t>
     </dgm:pt>
     <dgm:pt modelId="{A4EC4731-5BF8-BF47-ADB2-BBF1EF6E6274}" type="pres">
       <dgm:prSet presAssocID="{A7B5DA2F-F7AF-9F49-B4CA-599244722077}" presName="connectorText" presStyleLbl="sibTrans2D1" presStyleIdx="1" presStyleCnt="2"/>
       <dgm:spPr/>
-      <dgm:t>
-        <a:bodyPr/>
-        <a:lstStyle/>
-        <a:p>
-          <a:endParaRPr lang="fr-FR"/>
-        </a:p>
-      </dgm:t>
     </dgm:pt>
     <dgm:pt modelId="{A9073634-AA3C-9A44-B584-1CB99DA50058}" type="pres">
       <dgm:prSet presAssocID="{33B6F756-187C-084D-A5E5-14E3CE45FED5}" presName="node" presStyleLbl="node1" presStyleIdx="2" presStyleCnt="3">
@@ -5285,49 +5101,42 @@
         </dgm:presLayoutVars>
       </dgm:prSet>
       <dgm:spPr/>
-      <dgm:t>
-        <a:bodyPr/>
-        <a:lstStyle/>
-        <a:p>
-          <a:endParaRPr lang="fr-FR"/>
-        </a:p>
-      </dgm:t>
     </dgm:pt>
   </dgm:ptLst>
   <dgm:cxnLst>
+    <dgm:cxn modelId="{FE4CCA03-634C-43E9-B996-682B19E0C451}" srcId="{3AC304E9-26FF-944E-90D5-3DC6C1AA69DE}" destId="{1799A8BD-C483-4181-999C-C3AC6E1B686F}" srcOrd="2" destOrd="0" parTransId="{D57A2C41-D98D-45ED-936C-9E5212ED50A4}" sibTransId="{49AF01D2-FF22-4078-AB1D-65D1F25CCADA}"/>
+    <dgm:cxn modelId="{56614105-8CA3-4F42-9E8B-B78A9891730D}" type="presOf" srcId="{A7B5DA2F-F7AF-9F49-B4CA-599244722077}" destId="{A4EC4731-5BF8-BF47-ADB2-BBF1EF6E6274}" srcOrd="1" destOrd="0" presId="urn:microsoft.com/office/officeart/2005/8/layout/process1"/>
+    <dgm:cxn modelId="{6C8AAC0A-232D-9248-A993-1B79BE69D5E7}" srcId="{CB4FD71C-37EB-7C4D-BA75-847F56CE95C2}" destId="{3AC304E9-26FF-944E-90D5-3DC6C1AA69DE}" srcOrd="0" destOrd="0" parTransId="{0234A1D6-3B1B-9849-9EE8-C66F3B5967D5}" sibTransId="{FBCE840F-0CAD-8945-BADD-24F97645C1A6}"/>
+    <dgm:cxn modelId="{73DD5911-7F14-43E1-8C50-4BCC7D96A6B5}" type="presOf" srcId="{56493F77-2575-44A4-96C5-29A0E72BF586}" destId="{A9073634-AA3C-9A44-B584-1CB99DA50058}" srcOrd="0" destOrd="3" presId="urn:microsoft.com/office/officeart/2005/8/layout/process1"/>
+    <dgm:cxn modelId="{36CAEB17-ACE4-0F4A-84CE-371C7BD826CD}" srcId="{55AF6ACC-D03D-AE4C-B062-8B2F16A0D8E1}" destId="{88EAD537-7A7D-4F41-96B9-A5783DC87535}" srcOrd="0" destOrd="0" parTransId="{58B1C047-A8DB-554A-B40F-1AEC5B3B65B7}" sibTransId="{88AD6943-4577-6141-BE07-172A9AD1B4D9}"/>
+    <dgm:cxn modelId="{4680601C-603D-6543-8764-87DE9B972109}" type="presOf" srcId="{3C3A72B1-6F38-454F-ADA5-D1EBE4A37A7A}" destId="{45B56F92-CA62-7547-B01D-E6ADA8964BD8}" srcOrd="1" destOrd="0" presId="urn:microsoft.com/office/officeart/2005/8/layout/process1"/>
+    <dgm:cxn modelId="{69FEFD2E-B932-4510-B156-09EB6EA4A8FB}" type="presOf" srcId="{C38D66EC-FEDD-4439-8A86-906041F0CEE0}" destId="{062D1ADA-9625-5C42-8A29-3EBF6176F03B}" srcOrd="0" destOrd="2" presId="urn:microsoft.com/office/officeart/2005/8/layout/process1"/>
     <dgm:cxn modelId="{A1A14C2F-E7D6-964D-8977-51F9BF04B7AE}" srcId="{33B6F756-187C-084D-A5E5-14E3CE45FED5}" destId="{49ED70FB-4313-8C44-B11C-342D87274162}" srcOrd="0" destOrd="0" parTransId="{48D45555-4DDE-884A-B4D8-E13913EF94E6}" sibTransId="{701D2E83-9CEE-604F-A11C-33BFB65773F0}"/>
-    <dgm:cxn modelId="{74920BAF-8EA8-4CBA-9F75-BE54A1719792}" srcId="{55AF6ACC-D03D-AE4C-B062-8B2F16A0D8E1}" destId="{C38D66EC-FEDD-4439-8A86-906041F0CEE0}" srcOrd="1" destOrd="0" parTransId="{C3A6384D-94AE-42C5-9EC3-E0CBB36420D2}" sibTransId="{C7956634-0570-4097-A19F-943B63A780A6}"/>
+    <dgm:cxn modelId="{1C13AF36-8778-2F4D-96C9-B2B4597564DB}" type="presOf" srcId="{33B6F756-187C-084D-A5E5-14E3CE45FED5}" destId="{A9073634-AA3C-9A44-B584-1CB99DA50058}" srcOrd="0" destOrd="0" presId="urn:microsoft.com/office/officeart/2005/8/layout/process1"/>
+    <dgm:cxn modelId="{D477C136-E0FD-4B4A-95A0-B7E6DFCCDBB4}" srcId="{38F44408-F7EA-5D45-9F78-1E9259F17F1C}" destId="{55AF6ACC-D03D-AE4C-B062-8B2F16A0D8E1}" srcOrd="1" destOrd="0" parTransId="{2ADED678-A0FA-2A45-8EFC-7F6DAAA912BC}" sibTransId="{A7B5DA2F-F7AF-9F49-B4CA-599244722077}"/>
+    <dgm:cxn modelId="{49764D44-C09C-416F-8809-2C0D820881FB}" srcId="{55AF6ACC-D03D-AE4C-B062-8B2F16A0D8E1}" destId="{029DFC3C-5818-4092-88B2-7DFF19E4D432}" srcOrd="2" destOrd="0" parTransId="{004BEF1F-5740-43E4-B489-0E31BE9A1CBD}" sibTransId="{36CA98AC-D91B-405A-8BC8-65E1BC69C6BC}"/>
+    <dgm:cxn modelId="{943B2148-6680-5047-BD31-87C06188DCF7}" srcId="{38F44408-F7EA-5D45-9F78-1E9259F17F1C}" destId="{33B6F756-187C-084D-A5E5-14E3CE45FED5}" srcOrd="2" destOrd="0" parTransId="{69AE5D8A-F2AB-EB4D-96F1-27E117C0FA3C}" sibTransId="{AA2D9868-44A9-EA40-8AEE-2E386522331A}"/>
+    <dgm:cxn modelId="{83241050-9C4B-2048-B761-A08B9581B43C}" type="presOf" srcId="{CB4FD71C-37EB-7C4D-BA75-847F56CE95C2}" destId="{C52653A9-88E4-5B4C-A313-E4CE4518E38B}" srcOrd="0" destOrd="0" presId="urn:microsoft.com/office/officeart/2005/8/layout/process1"/>
+    <dgm:cxn modelId="{A7E53462-707F-41C5-AA7B-777EC66F34B8}" srcId="{55AF6ACC-D03D-AE4C-B062-8B2F16A0D8E1}" destId="{3BF0ECE6-CF23-4A63-B480-1DE00571CCC9}" srcOrd="3" destOrd="0" parTransId="{D57F2C8B-6E6E-466E-81C1-03BF76D05B44}" sibTransId="{15068EF9-593D-4455-9165-FBF57A10AA78}"/>
     <dgm:cxn modelId="{CCF3526B-89DC-2D4F-9C96-1E59C0C4FDCC}" type="presOf" srcId="{A7B5DA2F-F7AF-9F49-B4CA-599244722077}" destId="{FF924318-EFF4-114C-A607-D5E593D342F4}" srcOrd="0" destOrd="0" presId="urn:microsoft.com/office/officeart/2005/8/layout/process1"/>
-    <dgm:cxn modelId="{FE4CCA03-634C-43E9-B996-682B19E0C451}" srcId="{3AC304E9-26FF-944E-90D5-3DC6C1AA69DE}" destId="{1799A8BD-C483-4181-999C-C3AC6E1B686F}" srcOrd="2" destOrd="0" parTransId="{D57A2C41-D98D-45ED-936C-9E5212ED50A4}" sibTransId="{49AF01D2-FF22-4078-AB1D-65D1F25CCADA}"/>
-    <dgm:cxn modelId="{B436C5F6-09C7-3744-AFBC-CEB44E2793D1}" type="presOf" srcId="{88EAD537-7A7D-4F41-96B9-A5783DC87535}" destId="{062D1ADA-9625-5C42-8A29-3EBF6176F03B}" srcOrd="0" destOrd="1" presId="urn:microsoft.com/office/officeart/2005/8/layout/process1"/>
+    <dgm:cxn modelId="{50E6ED6C-C3B3-43F8-8C41-A05FE042606F}" type="presOf" srcId="{4363EB4E-56BC-4646-BFB8-09B2BF0FDB77}" destId="{C52653A9-88E4-5B4C-A313-E4CE4518E38B}" srcOrd="0" destOrd="2" presId="urn:microsoft.com/office/officeart/2005/8/layout/process1"/>
     <dgm:cxn modelId="{C53C6875-FBAC-4F51-8D6E-0AB5A15E1C2A}" type="presOf" srcId="{01DB5AA7-7AE4-42D2-B460-969F3275F4C9}" destId="{C52653A9-88E4-5B4C-A313-E4CE4518E38B}" srcOrd="0" destOrd="3" presId="urn:microsoft.com/office/officeart/2005/8/layout/process1"/>
     <dgm:cxn modelId="{3EDD7E80-4C6D-4782-89F3-E7967CBCF0BA}" srcId="{49ED70FB-4313-8C44-B11C-342D87274162}" destId="{3167F531-1595-4E3F-B6F3-008CC617D873}" srcOrd="0" destOrd="0" parTransId="{47F3A77D-7E2C-4C53-8412-FFDACAD310F5}" sibTransId="{44D8E4B9-9590-400D-840D-B118CF6040BB}"/>
-    <dgm:cxn modelId="{50E6ED6C-C3B3-43F8-8C41-A05FE042606F}" type="presOf" srcId="{4363EB4E-56BC-4646-BFB8-09B2BF0FDB77}" destId="{C52653A9-88E4-5B4C-A313-E4CE4518E38B}" srcOrd="0" destOrd="2" presId="urn:microsoft.com/office/officeart/2005/8/layout/process1"/>
-    <dgm:cxn modelId="{4680601C-603D-6543-8764-87DE9B972109}" type="presOf" srcId="{3C3A72B1-6F38-454F-ADA5-D1EBE4A37A7A}" destId="{45B56F92-CA62-7547-B01D-E6ADA8964BD8}" srcOrd="1" destOrd="0" presId="urn:microsoft.com/office/officeart/2005/8/layout/process1"/>
+    <dgm:cxn modelId="{E55D3E81-EEB7-42A9-BB84-5F2AA59302A8}" srcId="{3AC304E9-26FF-944E-90D5-3DC6C1AA69DE}" destId="{01DB5AA7-7AE4-42D2-B460-969F3275F4C9}" srcOrd="1" destOrd="0" parTransId="{B3F990EE-BAEB-45A3-8967-291FE0A307DB}" sibTransId="{9416A124-94B8-4FFA-AEE3-84A7FE020323}"/>
+    <dgm:cxn modelId="{B2FF3186-F230-4721-A261-88D57C1DBFEB}" srcId="{33B6F756-187C-084D-A5E5-14E3CE45FED5}" destId="{56493F77-2575-44A4-96C5-29A0E72BF586}" srcOrd="1" destOrd="0" parTransId="{E15F7C01-3392-4125-B9E4-B65DBF70D5AF}" sibTransId="{33E0EEFA-9FD2-4419-AD45-1EF0C91D82EB}"/>
+    <dgm:cxn modelId="{D836688F-B35D-4571-964A-BC3E43CC8147}" type="presOf" srcId="{3167F531-1595-4E3F-B6F3-008CC617D873}" destId="{A9073634-AA3C-9A44-B584-1CB99DA50058}" srcOrd="0" destOrd="2" presId="urn:microsoft.com/office/officeart/2005/8/layout/process1"/>
+    <dgm:cxn modelId="{7EE6569A-E10B-E94D-BF25-DD513728CFE9}" type="presOf" srcId="{38F44408-F7EA-5D45-9F78-1E9259F17F1C}" destId="{3EEF20E3-E8FF-C948-B6A2-E332D891F03C}" srcOrd="0" destOrd="0" presId="urn:microsoft.com/office/officeart/2005/8/layout/process1"/>
+    <dgm:cxn modelId="{C88E06A0-4AA6-E049-9C4F-DFD0AEB503E4}" type="presOf" srcId="{3C3A72B1-6F38-454F-ADA5-D1EBE4A37A7A}" destId="{524E36A4-812D-A94F-B713-8FF1DFB30DF5}" srcOrd="0" destOrd="0" presId="urn:microsoft.com/office/officeart/2005/8/layout/process1"/>
+    <dgm:cxn modelId="{EF72B4A6-FECE-924F-95B4-DA9CFFF4402C}" type="presOf" srcId="{49ED70FB-4313-8C44-B11C-342D87274162}" destId="{A9073634-AA3C-9A44-B584-1CB99DA50058}" srcOrd="0" destOrd="1" presId="urn:microsoft.com/office/officeart/2005/8/layout/process1"/>
+    <dgm:cxn modelId="{74920BAF-8EA8-4CBA-9F75-BE54A1719792}" srcId="{55AF6ACC-D03D-AE4C-B062-8B2F16A0D8E1}" destId="{C38D66EC-FEDD-4439-8A86-906041F0CEE0}" srcOrd="1" destOrd="0" parTransId="{C3A6384D-94AE-42C5-9EC3-E0CBB36420D2}" sibTransId="{C7956634-0570-4097-A19F-943B63A780A6}"/>
+    <dgm:cxn modelId="{A8F45CD2-7DF7-4711-AE86-F846F7A5DE42}" type="presOf" srcId="{3BF0ECE6-CF23-4A63-B480-1DE00571CCC9}" destId="{062D1ADA-9625-5C42-8A29-3EBF6176F03B}" srcOrd="0" destOrd="4" presId="urn:microsoft.com/office/officeart/2005/8/layout/process1"/>
+    <dgm:cxn modelId="{71DE28D3-21FF-47B2-9E5B-378C6BA65FA8}" type="presOf" srcId="{029DFC3C-5818-4092-88B2-7DFF19E4D432}" destId="{062D1ADA-9625-5C42-8A29-3EBF6176F03B}" srcOrd="0" destOrd="3" presId="urn:microsoft.com/office/officeart/2005/8/layout/process1"/>
+    <dgm:cxn modelId="{A89CB9D7-989C-40D5-AA16-206B33FB1BB2}" type="presOf" srcId="{1799A8BD-C483-4181-999C-C3AC6E1B686F}" destId="{C52653A9-88E4-5B4C-A313-E4CE4518E38B}" srcOrd="0" destOrd="4" presId="urn:microsoft.com/office/officeart/2005/8/layout/process1"/>
+    <dgm:cxn modelId="{6A5901E3-2791-FF40-B914-9AA3A09A361F}" type="presOf" srcId="{3AC304E9-26FF-944E-90D5-3DC6C1AA69DE}" destId="{C52653A9-88E4-5B4C-A313-E4CE4518E38B}" srcOrd="0" destOrd="1" presId="urn:microsoft.com/office/officeart/2005/8/layout/process1"/>
+    <dgm:cxn modelId="{6A7818E5-7AAC-0040-A041-A806D4C642AC}" type="presOf" srcId="{55AF6ACC-D03D-AE4C-B062-8B2F16A0D8E1}" destId="{062D1ADA-9625-5C42-8A29-3EBF6176F03B}" srcOrd="0" destOrd="0" presId="urn:microsoft.com/office/officeart/2005/8/layout/process1"/>
+    <dgm:cxn modelId="{0732BFEA-7762-F946-A27F-E72CD310C383}" srcId="{38F44408-F7EA-5D45-9F78-1E9259F17F1C}" destId="{CB4FD71C-37EB-7C4D-BA75-847F56CE95C2}" srcOrd="0" destOrd="0" parTransId="{F1BDFDD3-509D-304E-95A4-CCE2F1A47873}" sibTransId="{3C3A72B1-6F38-454F-ADA5-D1EBE4A37A7A}"/>
+    <dgm:cxn modelId="{B436C5F6-09C7-3744-AFBC-CEB44E2793D1}" type="presOf" srcId="{88EAD537-7A7D-4F41-96B9-A5783DC87535}" destId="{062D1ADA-9625-5C42-8A29-3EBF6176F03B}" srcOrd="0" destOrd="1" presId="urn:microsoft.com/office/officeart/2005/8/layout/process1"/>
     <dgm:cxn modelId="{9A5437F7-79EE-47AA-8799-18773654F482}" srcId="{3AC304E9-26FF-944E-90D5-3DC6C1AA69DE}" destId="{4363EB4E-56BC-4646-BFB8-09B2BF0FDB77}" srcOrd="0" destOrd="0" parTransId="{16EB9D60-8ED2-4D6F-91B2-2466D14DC8CE}" sibTransId="{1E8EF35C-2452-4458-9768-02E29F57B50D}"/>
-    <dgm:cxn modelId="{6A5901E3-2791-FF40-B914-9AA3A09A361F}" type="presOf" srcId="{3AC304E9-26FF-944E-90D5-3DC6C1AA69DE}" destId="{C52653A9-88E4-5B4C-A313-E4CE4518E38B}" srcOrd="0" destOrd="1" presId="urn:microsoft.com/office/officeart/2005/8/layout/process1"/>
-    <dgm:cxn modelId="{49764D44-C09C-416F-8809-2C0D820881FB}" srcId="{55AF6ACC-D03D-AE4C-B062-8B2F16A0D8E1}" destId="{029DFC3C-5818-4092-88B2-7DFF19E4D432}" srcOrd="2" destOrd="0" parTransId="{004BEF1F-5740-43E4-B489-0E31BE9A1CBD}" sibTransId="{36CA98AC-D91B-405A-8BC8-65E1BC69C6BC}"/>
-    <dgm:cxn modelId="{A8F45CD2-7DF7-4711-AE86-F846F7A5DE42}" type="presOf" srcId="{3BF0ECE6-CF23-4A63-B480-1DE00571CCC9}" destId="{062D1ADA-9625-5C42-8A29-3EBF6176F03B}" srcOrd="0" destOrd="4" presId="urn:microsoft.com/office/officeart/2005/8/layout/process1"/>
-    <dgm:cxn modelId="{C88E06A0-4AA6-E049-9C4F-DFD0AEB503E4}" type="presOf" srcId="{3C3A72B1-6F38-454F-ADA5-D1EBE4A37A7A}" destId="{524E36A4-812D-A94F-B713-8FF1DFB30DF5}" srcOrd="0" destOrd="0" presId="urn:microsoft.com/office/officeart/2005/8/layout/process1"/>
-    <dgm:cxn modelId="{36CAEB17-ACE4-0F4A-84CE-371C7BD826CD}" srcId="{55AF6ACC-D03D-AE4C-B062-8B2F16A0D8E1}" destId="{88EAD537-7A7D-4F41-96B9-A5783DC87535}" srcOrd="0" destOrd="0" parTransId="{58B1C047-A8DB-554A-B40F-1AEC5B3B65B7}" sibTransId="{88AD6943-4577-6141-BE07-172A9AD1B4D9}"/>
-    <dgm:cxn modelId="{83241050-9C4B-2048-B761-A08B9581B43C}" type="presOf" srcId="{CB4FD71C-37EB-7C4D-BA75-847F56CE95C2}" destId="{C52653A9-88E4-5B4C-A313-E4CE4518E38B}" srcOrd="0" destOrd="0" presId="urn:microsoft.com/office/officeart/2005/8/layout/process1"/>
-    <dgm:cxn modelId="{E55D3E81-EEB7-42A9-BB84-5F2AA59302A8}" srcId="{3AC304E9-26FF-944E-90D5-3DC6C1AA69DE}" destId="{01DB5AA7-7AE4-42D2-B460-969F3275F4C9}" srcOrd="1" destOrd="0" parTransId="{B3F990EE-BAEB-45A3-8967-291FE0A307DB}" sibTransId="{9416A124-94B8-4FFA-AEE3-84A7FE020323}"/>
-    <dgm:cxn modelId="{6C8AAC0A-232D-9248-A993-1B79BE69D5E7}" srcId="{CB4FD71C-37EB-7C4D-BA75-847F56CE95C2}" destId="{3AC304E9-26FF-944E-90D5-3DC6C1AA69DE}" srcOrd="0" destOrd="0" parTransId="{0234A1D6-3B1B-9849-9EE8-C66F3B5967D5}" sibTransId="{FBCE840F-0CAD-8945-BADD-24F97645C1A6}"/>
-    <dgm:cxn modelId="{69FEFD2E-B932-4510-B156-09EB6EA4A8FB}" type="presOf" srcId="{C38D66EC-FEDD-4439-8A86-906041F0CEE0}" destId="{062D1ADA-9625-5C42-8A29-3EBF6176F03B}" srcOrd="0" destOrd="2" presId="urn:microsoft.com/office/officeart/2005/8/layout/process1"/>
-    <dgm:cxn modelId="{943B2148-6680-5047-BD31-87C06188DCF7}" srcId="{38F44408-F7EA-5D45-9F78-1E9259F17F1C}" destId="{33B6F756-187C-084D-A5E5-14E3CE45FED5}" srcOrd="2" destOrd="0" parTransId="{69AE5D8A-F2AB-EB4D-96F1-27E117C0FA3C}" sibTransId="{AA2D9868-44A9-EA40-8AEE-2E386522331A}"/>
-    <dgm:cxn modelId="{EF72B4A6-FECE-924F-95B4-DA9CFFF4402C}" type="presOf" srcId="{49ED70FB-4313-8C44-B11C-342D87274162}" destId="{A9073634-AA3C-9A44-B584-1CB99DA50058}" srcOrd="0" destOrd="1" presId="urn:microsoft.com/office/officeart/2005/8/layout/process1"/>
-    <dgm:cxn modelId="{1C13AF36-8778-2F4D-96C9-B2B4597564DB}" type="presOf" srcId="{33B6F756-187C-084D-A5E5-14E3CE45FED5}" destId="{A9073634-AA3C-9A44-B584-1CB99DA50058}" srcOrd="0" destOrd="0" presId="urn:microsoft.com/office/officeart/2005/8/layout/process1"/>
-    <dgm:cxn modelId="{6A7818E5-7AAC-0040-A041-A806D4C642AC}" type="presOf" srcId="{55AF6ACC-D03D-AE4C-B062-8B2F16A0D8E1}" destId="{062D1ADA-9625-5C42-8A29-3EBF6176F03B}" srcOrd="0" destOrd="0" presId="urn:microsoft.com/office/officeart/2005/8/layout/process1"/>
-    <dgm:cxn modelId="{73DD5911-7F14-43E1-8C50-4BCC7D96A6B5}" type="presOf" srcId="{56493F77-2575-44A4-96C5-29A0E72BF586}" destId="{A9073634-AA3C-9A44-B584-1CB99DA50058}" srcOrd="0" destOrd="3" presId="urn:microsoft.com/office/officeart/2005/8/layout/process1"/>
-    <dgm:cxn modelId="{D836688F-B35D-4571-964A-BC3E43CC8147}" type="presOf" srcId="{3167F531-1595-4E3F-B6F3-008CC617D873}" destId="{A9073634-AA3C-9A44-B584-1CB99DA50058}" srcOrd="0" destOrd="2" presId="urn:microsoft.com/office/officeart/2005/8/layout/process1"/>
-    <dgm:cxn modelId="{B2FF3186-F230-4721-A261-88D57C1DBFEB}" srcId="{33B6F756-187C-084D-A5E5-14E3CE45FED5}" destId="{56493F77-2575-44A4-96C5-29A0E72BF586}" srcOrd="1" destOrd="0" parTransId="{E15F7C01-3392-4125-B9E4-B65DBF70D5AF}" sibTransId="{33E0EEFA-9FD2-4419-AD45-1EF0C91D82EB}"/>
-    <dgm:cxn modelId="{56614105-8CA3-4F42-9E8B-B78A9891730D}" type="presOf" srcId="{A7B5DA2F-F7AF-9F49-B4CA-599244722077}" destId="{A4EC4731-5BF8-BF47-ADB2-BBF1EF6E6274}" srcOrd="1" destOrd="0" presId="urn:microsoft.com/office/officeart/2005/8/layout/process1"/>
-    <dgm:cxn modelId="{0732BFEA-7762-F946-A27F-E72CD310C383}" srcId="{38F44408-F7EA-5D45-9F78-1E9259F17F1C}" destId="{CB4FD71C-37EB-7C4D-BA75-847F56CE95C2}" srcOrd="0" destOrd="0" parTransId="{F1BDFDD3-509D-304E-95A4-CCE2F1A47873}" sibTransId="{3C3A72B1-6F38-454F-ADA5-D1EBE4A37A7A}"/>
-    <dgm:cxn modelId="{D477C136-E0FD-4B4A-95A0-B7E6DFCCDBB4}" srcId="{38F44408-F7EA-5D45-9F78-1E9259F17F1C}" destId="{55AF6ACC-D03D-AE4C-B062-8B2F16A0D8E1}" srcOrd="1" destOrd="0" parTransId="{2ADED678-A0FA-2A45-8EFC-7F6DAAA912BC}" sibTransId="{A7B5DA2F-F7AF-9F49-B4CA-599244722077}"/>
-    <dgm:cxn modelId="{71DE28D3-21FF-47B2-9E5B-378C6BA65FA8}" type="presOf" srcId="{029DFC3C-5818-4092-88B2-7DFF19E4D432}" destId="{062D1ADA-9625-5C42-8A29-3EBF6176F03B}" srcOrd="0" destOrd="3" presId="urn:microsoft.com/office/officeart/2005/8/layout/process1"/>
-    <dgm:cxn modelId="{7EE6569A-E10B-E94D-BF25-DD513728CFE9}" type="presOf" srcId="{38F44408-F7EA-5D45-9F78-1E9259F17F1C}" destId="{3EEF20E3-E8FF-C948-B6A2-E332D891F03C}" srcOrd="0" destOrd="0" presId="urn:microsoft.com/office/officeart/2005/8/layout/process1"/>
-    <dgm:cxn modelId="{A89CB9D7-989C-40D5-AA16-206B33FB1BB2}" type="presOf" srcId="{1799A8BD-C483-4181-999C-C3AC6E1B686F}" destId="{C52653A9-88E4-5B4C-A313-E4CE4518E38B}" srcOrd="0" destOrd="4" presId="urn:microsoft.com/office/officeart/2005/8/layout/process1"/>
-    <dgm:cxn modelId="{A7E53462-707F-41C5-AA7B-777EC66F34B8}" srcId="{55AF6ACC-D03D-AE4C-B062-8B2F16A0D8E1}" destId="{3BF0ECE6-CF23-4A63-B480-1DE00571CCC9}" srcOrd="3" destOrd="0" parTransId="{D57F2C8B-6E6E-466E-81C1-03BF76D05B44}" sibTransId="{15068EF9-593D-4455-9165-FBF57A10AA78}"/>
     <dgm:cxn modelId="{FB9E4479-BC78-6E48-BA44-AB73AA00D46F}" type="presParOf" srcId="{3EEF20E3-E8FF-C948-B6A2-E332D891F03C}" destId="{C52653A9-88E4-5B4C-A313-E4CE4518E38B}" srcOrd="0" destOrd="0" presId="urn:microsoft.com/office/officeart/2005/8/layout/process1"/>
     <dgm:cxn modelId="{4BE925E6-D869-B345-97FD-92CF357989B7}" type="presParOf" srcId="{3EEF20E3-E8FF-C948-B6A2-E332D891F03C}" destId="{524E36A4-812D-A94F-B713-8FF1DFB30DF5}" srcOrd="1" destOrd="0" presId="urn:microsoft.com/office/officeart/2005/8/layout/process1"/>
     <dgm:cxn modelId="{4CA0B719-596E-A640-B57D-167A4896C823}" type="presParOf" srcId="{524E36A4-812D-A94F-B713-8FF1DFB30DF5}" destId="{45B56F92-CA62-7547-B01D-E6ADA8964BD8}" srcOrd="0" destOrd="0" presId="urn:microsoft.com/office/officeart/2005/8/layout/process1"/>
@@ -6073,10 +5882,9 @@
         <a:lstStyle/>
         <a:p>
           <a:r>
-            <a:rPr lang="en-US" dirty="0" smtClean="0"/>
+            <a:rPr lang="en-US" dirty="0"/>
             <a:t>Input</a:t>
           </a:r>
-          <a:endParaRPr lang="en-US" dirty="0"/>
         </a:p>
       </dgm:t>
     </dgm:pt>
@@ -6110,10 +5918,9 @@
         <a:lstStyle/>
         <a:p>
           <a:r>
-            <a:rPr lang="en-US" dirty="0" smtClean="0"/>
+            <a:rPr lang="en-US" dirty="0"/>
             <a:t>Transcripts (2,500)</a:t>
           </a:r>
-          <a:endParaRPr lang="en-US" dirty="0"/>
         </a:p>
       </dgm:t>
     </dgm:pt>
@@ -6147,10 +5954,9 @@
         <a:lstStyle/>
         <a:p>
           <a:r>
-            <a:rPr lang="en-US" dirty="0" smtClean="0"/>
+            <a:rPr lang="en-US" dirty="0"/>
             <a:t>Fit Linear Model</a:t>
           </a:r>
-          <a:endParaRPr lang="en-US" dirty="0"/>
         </a:p>
       </dgm:t>
     </dgm:pt>
@@ -6184,10 +5990,9 @@
         <a:lstStyle/>
         <a:p>
           <a:r>
-            <a:rPr lang="en-US" dirty="0" smtClean="0"/>
+            <a:rPr lang="en-US" dirty="0"/>
             <a:t>Warnings</a:t>
           </a:r>
-          <a:endParaRPr lang="en-US" dirty="0"/>
         </a:p>
       </dgm:t>
     </dgm:pt>
@@ -6221,10 +6026,9 @@
         <a:lstStyle/>
         <a:p>
           <a:r>
-            <a:rPr lang="en-US" dirty="0" smtClean="0"/>
+            <a:rPr lang="en-US" dirty="0"/>
             <a:t>Regularized (Lasso &amp; C.V.)</a:t>
           </a:r>
-          <a:endParaRPr lang="en-US" dirty="0"/>
         </a:p>
       </dgm:t>
     </dgm:pt>
@@ -6258,10 +6062,9 @@
         <a:lstStyle/>
         <a:p>
           <a:r>
-            <a:rPr lang="en-US" dirty="0" smtClean="0"/>
+            <a:rPr lang="en-US" dirty="0"/>
             <a:t>Predictors</a:t>
           </a:r>
-          <a:endParaRPr lang="en-US" dirty="0"/>
         </a:p>
       </dgm:t>
     </dgm:pt>
@@ -6295,10 +6098,9 @@
         <a:lstStyle/>
         <a:p>
           <a:r>
-            <a:rPr lang="en-US" dirty="0" smtClean="0"/>
+            <a:rPr lang="en-US" dirty="0"/>
             <a:t>Past academic performance</a:t>
           </a:r>
-          <a:endParaRPr lang="en-US" dirty="0"/>
         </a:p>
       </dgm:t>
     </dgm:pt>
@@ -6332,10 +6134,9 @@
         <a:lstStyle/>
         <a:p>
           <a:r>
-            <a:rPr lang="en-US" dirty="0" smtClean="0"/>
+            <a:rPr lang="en-US" dirty="0"/>
             <a:t>Topic expertise</a:t>
           </a:r>
-          <a:endParaRPr lang="en-US" dirty="0"/>
         </a:p>
       </dgm:t>
     </dgm:pt>
@@ -6369,10 +6170,9 @@
         <a:lstStyle/>
         <a:p>
           <a:r>
-            <a:rPr lang="en-US" dirty="0" smtClean="0"/>
+            <a:rPr lang="en-US" dirty="0"/>
             <a:t>A model for each course</a:t>
           </a:r>
-          <a:endParaRPr lang="en-US" dirty="0"/>
         </a:p>
       </dgm:t>
     </dgm:pt>
@@ -6406,10 +6206,9 @@
         <a:lstStyle/>
         <a:p>
           <a:r>
-            <a:rPr lang="en-US" dirty="0" smtClean="0"/>
+            <a:rPr lang="en-US" dirty="0"/>
             <a:t>App: selection of courses</a:t>
           </a:r>
-          <a:endParaRPr lang="en-US" dirty="0"/>
         </a:p>
       </dgm:t>
     </dgm:pt>
@@ -6443,10 +6242,9 @@
         <a:lstStyle/>
         <a:p>
           <a:r>
-            <a:rPr lang="en-US" dirty="0" smtClean="0"/>
+            <a:rPr lang="en-US" dirty="0"/>
             <a:t>Grade prediction</a:t>
           </a:r>
-          <a:endParaRPr lang="en-US" dirty="0"/>
         </a:p>
       </dgm:t>
     </dgm:pt>
@@ -6480,10 +6278,9 @@
         <a:lstStyle/>
         <a:p>
           <a:r>
-            <a:rPr lang="en-US" dirty="0" smtClean="0"/>
+            <a:rPr lang="en-US" dirty="0"/>
             <a:t>If predicted grade is low</a:t>
           </a:r>
-          <a:endParaRPr lang="en-US" dirty="0"/>
         </a:p>
       </dgm:t>
     </dgm:pt>
@@ -6517,10 +6314,9 @@
         <a:lstStyle/>
         <a:p>
           <a:r>
-            <a:rPr lang="en-US" dirty="0" smtClean="0"/>
+            <a:rPr lang="en-US" dirty="0"/>
             <a:t>Issue a warning</a:t>
           </a:r>
-          <a:endParaRPr lang="en-US" dirty="0"/>
         </a:p>
       </dgm:t>
     </dgm:pt>
@@ -6554,10 +6350,9 @@
         <a:lstStyle/>
         <a:p>
           <a:r>
-            <a:rPr lang="en-US" dirty="0" smtClean="0"/>
+            <a:rPr lang="en-US" dirty="0"/>
             <a:t>Suggest preparatory courses</a:t>
           </a:r>
-          <a:endParaRPr lang="en-US" dirty="0"/>
         </a:p>
       </dgm:t>
     </dgm:pt>
@@ -6591,13 +6386,6 @@
         </dgm:presLayoutVars>
       </dgm:prSet>
       <dgm:spPr/>
-      <dgm:t>
-        <a:bodyPr/>
-        <a:lstStyle/>
-        <a:p>
-          <a:endParaRPr lang="fr-FR"/>
-        </a:p>
-      </dgm:t>
     </dgm:pt>
     <dgm:pt modelId="{C52653A9-88E4-5B4C-A313-E4CE4518E38B}" type="pres">
       <dgm:prSet presAssocID="{CB4FD71C-37EB-7C4D-BA75-847F56CE95C2}" presName="node" presStyleLbl="node1" presStyleIdx="0" presStyleCnt="3">
@@ -6606,35 +6394,14 @@
         </dgm:presLayoutVars>
       </dgm:prSet>
       <dgm:spPr/>
-      <dgm:t>
-        <a:bodyPr/>
-        <a:lstStyle/>
-        <a:p>
-          <a:endParaRPr lang="fr-FR"/>
-        </a:p>
-      </dgm:t>
     </dgm:pt>
     <dgm:pt modelId="{524E36A4-812D-A94F-B713-8FF1DFB30DF5}" type="pres">
       <dgm:prSet presAssocID="{3C3A72B1-6F38-454F-ADA5-D1EBE4A37A7A}" presName="sibTrans" presStyleLbl="sibTrans2D1" presStyleIdx="0" presStyleCnt="2"/>
       <dgm:spPr/>
-      <dgm:t>
-        <a:bodyPr/>
-        <a:lstStyle/>
-        <a:p>
-          <a:endParaRPr lang="fr-FR"/>
-        </a:p>
-      </dgm:t>
     </dgm:pt>
     <dgm:pt modelId="{45B56F92-CA62-7547-B01D-E6ADA8964BD8}" type="pres">
       <dgm:prSet presAssocID="{3C3A72B1-6F38-454F-ADA5-D1EBE4A37A7A}" presName="connectorText" presStyleLbl="sibTrans2D1" presStyleIdx="0" presStyleCnt="2"/>
       <dgm:spPr/>
-      <dgm:t>
-        <a:bodyPr/>
-        <a:lstStyle/>
-        <a:p>
-          <a:endParaRPr lang="fr-FR"/>
-        </a:p>
-      </dgm:t>
     </dgm:pt>
     <dgm:pt modelId="{062D1ADA-9625-5C42-8A29-3EBF6176F03B}" type="pres">
       <dgm:prSet presAssocID="{55AF6ACC-D03D-AE4C-B062-8B2F16A0D8E1}" presName="node" presStyleLbl="node1" presStyleIdx="1" presStyleCnt="3">
@@ -6643,35 +6410,14 @@
         </dgm:presLayoutVars>
       </dgm:prSet>
       <dgm:spPr/>
-      <dgm:t>
-        <a:bodyPr/>
-        <a:lstStyle/>
-        <a:p>
-          <a:endParaRPr lang="fr-FR"/>
-        </a:p>
-      </dgm:t>
     </dgm:pt>
     <dgm:pt modelId="{FF924318-EFF4-114C-A607-D5E593D342F4}" type="pres">
       <dgm:prSet presAssocID="{A7B5DA2F-F7AF-9F49-B4CA-599244722077}" presName="sibTrans" presStyleLbl="sibTrans2D1" presStyleIdx="1" presStyleCnt="2"/>
       <dgm:spPr/>
-      <dgm:t>
-        <a:bodyPr/>
-        <a:lstStyle/>
-        <a:p>
-          <a:endParaRPr lang="fr-FR"/>
-        </a:p>
-      </dgm:t>
     </dgm:pt>
     <dgm:pt modelId="{A4EC4731-5BF8-BF47-ADB2-BBF1EF6E6274}" type="pres">
       <dgm:prSet presAssocID="{A7B5DA2F-F7AF-9F49-B4CA-599244722077}" presName="connectorText" presStyleLbl="sibTrans2D1" presStyleIdx="1" presStyleCnt="2"/>
       <dgm:spPr/>
-      <dgm:t>
-        <a:bodyPr/>
-        <a:lstStyle/>
-        <a:p>
-          <a:endParaRPr lang="fr-FR"/>
-        </a:p>
-      </dgm:t>
     </dgm:pt>
     <dgm:pt modelId="{CA926706-B92E-CE41-81A0-54D1A7872542}" type="pres">
       <dgm:prSet presAssocID="{9B0DC355-4EE7-CF4D-8FA3-65138D55947F}" presName="node" presStyleLbl="node1" presStyleIdx="2" presStyleCnt="3">
@@ -6680,49 +6426,42 @@
         </dgm:presLayoutVars>
       </dgm:prSet>
       <dgm:spPr/>
-      <dgm:t>
-        <a:bodyPr/>
-        <a:lstStyle/>
-        <a:p>
-          <a:endParaRPr lang="fr-FR"/>
-        </a:p>
-      </dgm:t>
     </dgm:pt>
   </dgm:ptLst>
   <dgm:cxnLst>
-    <dgm:cxn modelId="{F3EC295D-BBAD-4FE3-A9AC-0E85C1FBDCB3}" type="presOf" srcId="{9F015E1F-70AF-49E6-AAE0-1BFCC6C36DA3}" destId="{062D1ADA-9625-5C42-8A29-3EBF6176F03B}" srcOrd="0" destOrd="3" presId="urn:microsoft.com/office/officeart/2005/8/layout/process1"/>
-    <dgm:cxn modelId="{4C25BB67-9654-4AF5-98A8-31E6399C0D25}" type="presOf" srcId="{0AB70C2E-BC63-467F-9EBF-0AD25E43890F}" destId="{CA926706-B92E-CE41-81A0-54D1A7872542}" srcOrd="0" destOrd="2" presId="urn:microsoft.com/office/officeart/2005/8/layout/process1"/>
-    <dgm:cxn modelId="{02D37967-AB4B-4A73-8B02-A3CAD9AAF7EA}" type="presOf" srcId="{A7B38AFB-9B10-436E-AC01-F2A1C17B62DF}" destId="{CA926706-B92E-CE41-81A0-54D1A7872542}" srcOrd="0" destOrd="1" presId="urn:microsoft.com/office/officeart/2005/8/layout/process1"/>
-    <dgm:cxn modelId="{4680601C-603D-6543-8764-87DE9B972109}" type="presOf" srcId="{3C3A72B1-6F38-454F-ADA5-D1EBE4A37A7A}" destId="{45B56F92-CA62-7547-B01D-E6ADA8964BD8}" srcOrd="1" destOrd="0" presId="urn:microsoft.com/office/officeart/2005/8/layout/process1"/>
-    <dgm:cxn modelId="{A19ED68E-4A67-F04F-B544-84770542197E}" srcId="{55AF6ACC-D03D-AE4C-B062-8B2F16A0D8E1}" destId="{9BD52CC3-98A2-AD40-81AE-0D763FEEFAEE}" srcOrd="2" destOrd="0" parTransId="{C1F68240-4E3F-0246-B21A-5938545BD89C}" sibTransId="{5946D3EF-C934-D145-A3AE-EDBD01598997}"/>
-    <dgm:cxn modelId="{83241050-9C4B-2048-B761-A08B9581B43C}" type="presOf" srcId="{CB4FD71C-37EB-7C4D-BA75-847F56CE95C2}" destId="{C52653A9-88E4-5B4C-A313-E4CE4518E38B}" srcOrd="0" destOrd="0" presId="urn:microsoft.com/office/officeart/2005/8/layout/process1"/>
-    <dgm:cxn modelId="{5A3D4D4C-7197-493D-A725-DFA5F78FD22C}" srcId="{55AF6ACC-D03D-AE4C-B062-8B2F16A0D8E1}" destId="{693B9C89-A3E8-4D8A-882F-207B5799F9D2}" srcOrd="0" destOrd="0" parTransId="{16FEF354-792F-42C6-998F-3BA4FFE3BDA4}" sibTransId="{92769F45-C800-4950-A8E1-874391F32F16}"/>
     <dgm:cxn modelId="{56614105-8CA3-4F42-9E8B-B78A9891730D}" type="presOf" srcId="{A7B5DA2F-F7AF-9F49-B4CA-599244722077}" destId="{A4EC4731-5BF8-BF47-ADB2-BBF1EF6E6274}" srcOrd="1" destOrd="0" presId="urn:microsoft.com/office/officeart/2005/8/layout/process1"/>
     <dgm:cxn modelId="{BCC35A08-3799-4623-A424-BC3A9DA6659C}" srcId="{A7B38AFB-9B10-436E-AC01-F2A1C17B62DF}" destId="{0AB70C2E-BC63-467F-9EBF-0AD25E43890F}" srcOrd="0" destOrd="0" parTransId="{A9B40721-592C-4AB8-8F85-2072AC040F25}" sibTransId="{F894076B-7E23-4116-B202-08D22BE943D6}"/>
+    <dgm:cxn modelId="{6C8AAC0A-232D-9248-A993-1B79BE69D5E7}" srcId="{CB4FD71C-37EB-7C4D-BA75-847F56CE95C2}" destId="{3AC304E9-26FF-944E-90D5-3DC6C1AA69DE}" srcOrd="0" destOrd="0" parTransId="{0234A1D6-3B1B-9849-9EE8-C66F3B5967D5}" sibTransId="{FBCE840F-0CAD-8945-BADD-24F97645C1A6}"/>
+    <dgm:cxn modelId="{335CA615-4ED4-4EEA-A17C-8A5D93889A12}" srcId="{B5E1EADC-342D-4872-8FBF-904BFB559FD7}" destId="{040CA341-CBF4-424A-8CC1-F23EEA6B8300}" srcOrd="0" destOrd="0" parTransId="{83699F91-4DCF-4FB8-9549-979895EBF731}" sibTransId="{202F8413-09E2-41B1-B79F-F2F7466FD502}"/>
+    <dgm:cxn modelId="{4680601C-603D-6543-8764-87DE9B972109}" type="presOf" srcId="{3C3A72B1-6F38-454F-ADA5-D1EBE4A37A7A}" destId="{45B56F92-CA62-7547-B01D-E6ADA8964BD8}" srcOrd="1" destOrd="0" presId="urn:microsoft.com/office/officeart/2005/8/layout/process1"/>
     <dgm:cxn modelId="{22D04C1E-435C-4171-A23F-81EDE6752AF6}" srcId="{55AF6ACC-D03D-AE4C-B062-8B2F16A0D8E1}" destId="{5BBD4D31-774F-4FAF-87E7-822052301E2D}" srcOrd="1" destOrd="0" parTransId="{318CA150-D5AB-4CAF-B6D4-0E81F66EF7C7}" sibTransId="{0BB73C4D-5B3E-4CAE-B14B-1EF679EAF63E}"/>
+    <dgm:cxn modelId="{7204B823-6F78-4853-A0F8-4220404613D0}" srcId="{9B0DC355-4EE7-CF4D-8FA3-65138D55947F}" destId="{B5E1EADC-342D-4872-8FBF-904BFB559FD7}" srcOrd="1" destOrd="0" parTransId="{72D6B9B8-F722-4D27-BF0B-4F743336ED34}" sibTransId="{0A3C2726-B837-4072-A4C7-2548B216821E}"/>
+    <dgm:cxn modelId="{D477C136-E0FD-4B4A-95A0-B7E6DFCCDBB4}" srcId="{38F44408-F7EA-5D45-9F78-1E9259F17F1C}" destId="{55AF6ACC-D03D-AE4C-B062-8B2F16A0D8E1}" srcOrd="1" destOrd="0" parTransId="{2ADED678-A0FA-2A45-8EFC-7F6DAAA912BC}" sibTransId="{A7B5DA2F-F7AF-9F49-B4CA-599244722077}"/>
+    <dgm:cxn modelId="{80DD3B3B-6FE8-4287-B1E0-B965A577FBC2}" srcId="{B5E1EADC-342D-4872-8FBF-904BFB559FD7}" destId="{353B207D-30D4-4DEA-99ED-EDCBDA535407}" srcOrd="1" destOrd="0" parTransId="{AF7EC297-5A0E-444C-89CF-823DFDB9724D}" sibTransId="{886D2286-F506-4044-92D8-527B9C782E84}"/>
+    <dgm:cxn modelId="{C2EB873C-18FE-4231-A010-7315A8E0ED11}" srcId="{5BBD4D31-774F-4FAF-87E7-822052301E2D}" destId="{9F015E1F-70AF-49E6-AAE0-1BFCC6C36DA3}" srcOrd="0" destOrd="0" parTransId="{353F6634-22FB-49B3-9520-F098E84F2BB3}" sibTransId="{D8367A69-9B37-44AF-813D-042888148A3B}"/>
+    <dgm:cxn modelId="{6C00C148-5E07-4DFA-A7EB-D71A9B3C4B39}" type="presOf" srcId="{B5E1EADC-342D-4872-8FBF-904BFB559FD7}" destId="{CA926706-B92E-CE41-81A0-54D1A7872542}" srcOrd="0" destOrd="3" presId="urn:microsoft.com/office/officeart/2005/8/layout/process1"/>
+    <dgm:cxn modelId="{5A3D4D4C-7197-493D-A725-DFA5F78FD22C}" srcId="{55AF6ACC-D03D-AE4C-B062-8B2F16A0D8E1}" destId="{693B9C89-A3E8-4D8A-882F-207B5799F9D2}" srcOrd="0" destOrd="0" parTransId="{16FEF354-792F-42C6-998F-3BA4FFE3BDA4}" sibTransId="{92769F45-C800-4950-A8E1-874391F32F16}"/>
+    <dgm:cxn modelId="{83241050-9C4B-2048-B761-A08B9581B43C}" type="presOf" srcId="{CB4FD71C-37EB-7C4D-BA75-847F56CE95C2}" destId="{C52653A9-88E4-5B4C-A313-E4CE4518E38B}" srcOrd="0" destOrd="0" presId="urn:microsoft.com/office/officeart/2005/8/layout/process1"/>
+    <dgm:cxn modelId="{361B5551-A9F7-4EF4-91A5-57F57553E6F4}" type="presOf" srcId="{693B9C89-A3E8-4D8A-882F-207B5799F9D2}" destId="{062D1ADA-9625-5C42-8A29-3EBF6176F03B}" srcOrd="0" destOrd="1" presId="urn:microsoft.com/office/officeart/2005/8/layout/process1"/>
+    <dgm:cxn modelId="{756B1257-16CD-094B-8F00-790A4A520321}" type="presOf" srcId="{9BD52CC3-98A2-AD40-81AE-0D763FEEFAEE}" destId="{062D1ADA-9625-5C42-8A29-3EBF6176F03B}" srcOrd="0" destOrd="5" presId="urn:microsoft.com/office/officeart/2005/8/layout/process1"/>
+    <dgm:cxn modelId="{F3EC295D-BBAD-4FE3-A9AC-0E85C1FBDCB3}" type="presOf" srcId="{9F015E1F-70AF-49E6-AAE0-1BFCC6C36DA3}" destId="{062D1ADA-9625-5C42-8A29-3EBF6176F03B}" srcOrd="0" destOrd="3" presId="urn:microsoft.com/office/officeart/2005/8/layout/process1"/>
+    <dgm:cxn modelId="{D1A62A5E-3882-47E3-B0EB-9906D04DC5D1}" srcId="{5BBD4D31-774F-4FAF-87E7-822052301E2D}" destId="{580FA2B6-7506-42B0-98D4-E90CEB01337D}" srcOrd="1" destOrd="0" parTransId="{831E4AB6-55C3-4C58-BC37-CD607EE0B869}" sibTransId="{30D80CBB-6AB4-4004-BDB3-5730C96E6734}"/>
+    <dgm:cxn modelId="{02D37967-AB4B-4A73-8B02-A3CAD9AAF7EA}" type="presOf" srcId="{A7B38AFB-9B10-436E-AC01-F2A1C17B62DF}" destId="{CA926706-B92E-CE41-81A0-54D1A7872542}" srcOrd="0" destOrd="1" presId="urn:microsoft.com/office/officeart/2005/8/layout/process1"/>
+    <dgm:cxn modelId="{4C25BB67-9654-4AF5-98A8-31E6399C0D25}" type="presOf" srcId="{0AB70C2E-BC63-467F-9EBF-0AD25E43890F}" destId="{CA926706-B92E-CE41-81A0-54D1A7872542}" srcOrd="0" destOrd="2" presId="urn:microsoft.com/office/officeart/2005/8/layout/process1"/>
+    <dgm:cxn modelId="{CCF3526B-89DC-2D4F-9C96-1E59C0C4FDCC}" type="presOf" srcId="{A7B5DA2F-F7AF-9F49-B4CA-599244722077}" destId="{FF924318-EFF4-114C-A607-D5E593D342F4}" srcOrd="0" destOrd="0" presId="urn:microsoft.com/office/officeart/2005/8/layout/process1"/>
+    <dgm:cxn modelId="{EF5A4385-EFE4-4DA9-93D2-AF162CBD18BA}" type="presOf" srcId="{5BBD4D31-774F-4FAF-87E7-822052301E2D}" destId="{062D1ADA-9625-5C42-8A29-3EBF6176F03B}" srcOrd="0" destOrd="2" presId="urn:microsoft.com/office/officeart/2005/8/layout/process1"/>
+    <dgm:cxn modelId="{FE1BE588-DFEA-2447-9DA5-BF78CB366A2D}" srcId="{38F44408-F7EA-5D45-9F78-1E9259F17F1C}" destId="{9B0DC355-4EE7-CF4D-8FA3-65138D55947F}" srcOrd="2" destOrd="0" parTransId="{FAD9449B-3875-FA45-B535-5A58BD5335BA}" sibTransId="{7117672F-4AE5-FD41-A307-D1F4ACE04C98}"/>
+    <dgm:cxn modelId="{A19ED68E-4A67-F04F-B544-84770542197E}" srcId="{55AF6ACC-D03D-AE4C-B062-8B2F16A0D8E1}" destId="{9BD52CC3-98A2-AD40-81AE-0D763FEEFAEE}" srcOrd="2" destOrd="0" parTransId="{C1F68240-4E3F-0246-B21A-5938545BD89C}" sibTransId="{5946D3EF-C934-D145-A3AE-EDBD01598997}"/>
+    <dgm:cxn modelId="{A7F2A091-923E-48D4-ACBD-2C0D273D22F0}" type="presOf" srcId="{353B207D-30D4-4DEA-99ED-EDCBDA535407}" destId="{CA926706-B92E-CE41-81A0-54D1A7872542}" srcOrd="0" destOrd="5" presId="urn:microsoft.com/office/officeart/2005/8/layout/process1"/>
+    <dgm:cxn modelId="{7EE6569A-E10B-E94D-BF25-DD513728CFE9}" type="presOf" srcId="{38F44408-F7EA-5D45-9F78-1E9259F17F1C}" destId="{3EEF20E3-E8FF-C948-B6A2-E332D891F03C}" srcOrd="0" destOrd="0" presId="urn:microsoft.com/office/officeart/2005/8/layout/process1"/>
+    <dgm:cxn modelId="{1650F19C-5B38-45B7-92F5-73023BE3075B}" srcId="{9B0DC355-4EE7-CF4D-8FA3-65138D55947F}" destId="{A7B38AFB-9B10-436E-AC01-F2A1C17B62DF}" srcOrd="0" destOrd="0" parTransId="{B0DDB25D-A893-46EF-8041-679E04934D49}" sibTransId="{E5633864-0377-41EC-8105-AC9BC0123DD4}"/>
+    <dgm:cxn modelId="{C88E06A0-4AA6-E049-9C4F-DFD0AEB503E4}" type="presOf" srcId="{3C3A72B1-6F38-454F-ADA5-D1EBE4A37A7A}" destId="{524E36A4-812D-A94F-B713-8FF1DFB30DF5}" srcOrd="0" destOrd="0" presId="urn:microsoft.com/office/officeart/2005/8/layout/process1"/>
+    <dgm:cxn modelId="{CFDFA7D3-1D15-4AA0-9A38-E4857510A9E3}" type="presOf" srcId="{580FA2B6-7506-42B0-98D4-E90CEB01337D}" destId="{062D1ADA-9625-5C42-8A29-3EBF6176F03B}" srcOrd="0" destOrd="4" presId="urn:microsoft.com/office/officeart/2005/8/layout/process1"/>
+    <dgm:cxn modelId="{6A5901E3-2791-FF40-B914-9AA3A09A361F}" type="presOf" srcId="{3AC304E9-26FF-944E-90D5-3DC6C1AA69DE}" destId="{C52653A9-88E4-5B4C-A313-E4CE4518E38B}" srcOrd="0" destOrd="1" presId="urn:microsoft.com/office/officeart/2005/8/layout/process1"/>
+    <dgm:cxn modelId="{6A7818E5-7AAC-0040-A041-A806D4C642AC}" type="presOf" srcId="{55AF6ACC-D03D-AE4C-B062-8B2F16A0D8E1}" destId="{062D1ADA-9625-5C42-8A29-3EBF6176F03B}" srcOrd="0" destOrd="0" presId="urn:microsoft.com/office/officeart/2005/8/layout/process1"/>
     <dgm:cxn modelId="{F3E113EA-6037-4327-B3DB-EBE6C5EADB29}" type="presOf" srcId="{040CA341-CBF4-424A-8CC1-F23EEA6B8300}" destId="{CA926706-B92E-CE41-81A0-54D1A7872542}" srcOrd="0" destOrd="4" presId="urn:microsoft.com/office/officeart/2005/8/layout/process1"/>
-    <dgm:cxn modelId="{CCF3526B-89DC-2D4F-9C96-1E59C0C4FDCC}" type="presOf" srcId="{A7B5DA2F-F7AF-9F49-B4CA-599244722077}" destId="{FF924318-EFF4-114C-A607-D5E593D342F4}" srcOrd="0" destOrd="0" presId="urn:microsoft.com/office/officeart/2005/8/layout/process1"/>
-    <dgm:cxn modelId="{A7F2A091-923E-48D4-ACBD-2C0D273D22F0}" type="presOf" srcId="{353B207D-30D4-4DEA-99ED-EDCBDA535407}" destId="{CA926706-B92E-CE41-81A0-54D1A7872542}" srcOrd="0" destOrd="5" presId="urn:microsoft.com/office/officeart/2005/8/layout/process1"/>
-    <dgm:cxn modelId="{756B1257-16CD-094B-8F00-790A4A520321}" type="presOf" srcId="{9BD52CC3-98A2-AD40-81AE-0D763FEEFAEE}" destId="{062D1ADA-9625-5C42-8A29-3EBF6176F03B}" srcOrd="0" destOrd="5" presId="urn:microsoft.com/office/officeart/2005/8/layout/process1"/>
-    <dgm:cxn modelId="{80DD3B3B-6FE8-4287-B1E0-B965A577FBC2}" srcId="{B5E1EADC-342D-4872-8FBF-904BFB559FD7}" destId="{353B207D-30D4-4DEA-99ED-EDCBDA535407}" srcOrd="1" destOrd="0" parTransId="{AF7EC297-5A0E-444C-89CF-823DFDB9724D}" sibTransId="{886D2286-F506-4044-92D8-527B9C782E84}"/>
-    <dgm:cxn modelId="{CFDFA7D3-1D15-4AA0-9A38-E4857510A9E3}" type="presOf" srcId="{580FA2B6-7506-42B0-98D4-E90CEB01337D}" destId="{062D1ADA-9625-5C42-8A29-3EBF6176F03B}" srcOrd="0" destOrd="4" presId="urn:microsoft.com/office/officeart/2005/8/layout/process1"/>
-    <dgm:cxn modelId="{361B5551-A9F7-4EF4-91A5-57F57553E6F4}" type="presOf" srcId="{693B9C89-A3E8-4D8A-882F-207B5799F9D2}" destId="{062D1ADA-9625-5C42-8A29-3EBF6176F03B}" srcOrd="0" destOrd="1" presId="urn:microsoft.com/office/officeart/2005/8/layout/process1"/>
-    <dgm:cxn modelId="{7204B823-6F78-4853-A0F8-4220404613D0}" srcId="{9B0DC355-4EE7-CF4D-8FA3-65138D55947F}" destId="{B5E1EADC-342D-4872-8FBF-904BFB559FD7}" srcOrd="1" destOrd="0" parTransId="{72D6B9B8-F722-4D27-BF0B-4F743336ED34}" sibTransId="{0A3C2726-B837-4072-A4C7-2548B216821E}"/>
-    <dgm:cxn modelId="{C88E06A0-4AA6-E049-9C4F-DFD0AEB503E4}" type="presOf" srcId="{3C3A72B1-6F38-454F-ADA5-D1EBE4A37A7A}" destId="{524E36A4-812D-A94F-B713-8FF1DFB30DF5}" srcOrd="0" destOrd="0" presId="urn:microsoft.com/office/officeart/2005/8/layout/process1"/>
-    <dgm:cxn modelId="{7EE6569A-E10B-E94D-BF25-DD513728CFE9}" type="presOf" srcId="{38F44408-F7EA-5D45-9F78-1E9259F17F1C}" destId="{3EEF20E3-E8FF-C948-B6A2-E332D891F03C}" srcOrd="0" destOrd="0" presId="urn:microsoft.com/office/officeart/2005/8/layout/process1"/>
-    <dgm:cxn modelId="{6C00C148-5E07-4DFA-A7EB-D71A9B3C4B39}" type="presOf" srcId="{B5E1EADC-342D-4872-8FBF-904BFB559FD7}" destId="{CA926706-B92E-CE41-81A0-54D1A7872542}" srcOrd="0" destOrd="3" presId="urn:microsoft.com/office/officeart/2005/8/layout/process1"/>
-    <dgm:cxn modelId="{6A7818E5-7AAC-0040-A041-A806D4C642AC}" type="presOf" srcId="{55AF6ACC-D03D-AE4C-B062-8B2F16A0D8E1}" destId="{062D1ADA-9625-5C42-8A29-3EBF6176F03B}" srcOrd="0" destOrd="0" presId="urn:microsoft.com/office/officeart/2005/8/layout/process1"/>
-    <dgm:cxn modelId="{FE1BE588-DFEA-2447-9DA5-BF78CB366A2D}" srcId="{38F44408-F7EA-5D45-9F78-1E9259F17F1C}" destId="{9B0DC355-4EE7-CF4D-8FA3-65138D55947F}" srcOrd="2" destOrd="0" parTransId="{FAD9449B-3875-FA45-B535-5A58BD5335BA}" sibTransId="{7117672F-4AE5-FD41-A307-D1F4ACE04C98}"/>
-    <dgm:cxn modelId="{1650F19C-5B38-45B7-92F5-73023BE3075B}" srcId="{9B0DC355-4EE7-CF4D-8FA3-65138D55947F}" destId="{A7B38AFB-9B10-436E-AC01-F2A1C17B62DF}" srcOrd="0" destOrd="0" parTransId="{B0DDB25D-A893-46EF-8041-679E04934D49}" sibTransId="{E5633864-0377-41EC-8105-AC9BC0123DD4}"/>
-    <dgm:cxn modelId="{6A5901E3-2791-FF40-B914-9AA3A09A361F}" type="presOf" srcId="{3AC304E9-26FF-944E-90D5-3DC6C1AA69DE}" destId="{C52653A9-88E4-5B4C-A313-E4CE4518E38B}" srcOrd="0" destOrd="1" presId="urn:microsoft.com/office/officeart/2005/8/layout/process1"/>
-    <dgm:cxn modelId="{D1A62A5E-3882-47E3-B0EB-9906D04DC5D1}" srcId="{5BBD4D31-774F-4FAF-87E7-822052301E2D}" destId="{580FA2B6-7506-42B0-98D4-E90CEB01337D}" srcOrd="1" destOrd="0" parTransId="{831E4AB6-55C3-4C58-BC37-CD607EE0B869}" sibTransId="{30D80CBB-6AB4-4004-BDB3-5730C96E6734}"/>
-    <dgm:cxn modelId="{335CA615-4ED4-4EEA-A17C-8A5D93889A12}" srcId="{B5E1EADC-342D-4872-8FBF-904BFB559FD7}" destId="{040CA341-CBF4-424A-8CC1-F23EEA6B8300}" srcOrd="0" destOrd="0" parTransId="{83699F91-4DCF-4FB8-9549-979895EBF731}" sibTransId="{202F8413-09E2-41B1-B79F-F2F7466FD502}"/>
-    <dgm:cxn modelId="{C2EB873C-18FE-4231-A010-7315A8E0ED11}" srcId="{5BBD4D31-774F-4FAF-87E7-822052301E2D}" destId="{9F015E1F-70AF-49E6-AAE0-1BFCC6C36DA3}" srcOrd="0" destOrd="0" parTransId="{353F6634-22FB-49B3-9520-F098E84F2BB3}" sibTransId="{D8367A69-9B37-44AF-813D-042888148A3B}"/>
-    <dgm:cxn modelId="{EF5A4385-EFE4-4DA9-93D2-AF162CBD18BA}" type="presOf" srcId="{5BBD4D31-774F-4FAF-87E7-822052301E2D}" destId="{062D1ADA-9625-5C42-8A29-3EBF6176F03B}" srcOrd="0" destOrd="2" presId="urn:microsoft.com/office/officeart/2005/8/layout/process1"/>
+    <dgm:cxn modelId="{0732BFEA-7762-F946-A27F-E72CD310C383}" srcId="{38F44408-F7EA-5D45-9F78-1E9259F17F1C}" destId="{CB4FD71C-37EB-7C4D-BA75-847F56CE95C2}" srcOrd="0" destOrd="0" parTransId="{F1BDFDD3-509D-304E-95A4-CCE2F1A47873}" sibTransId="{3C3A72B1-6F38-454F-ADA5-D1EBE4A37A7A}"/>
     <dgm:cxn modelId="{1EB00CF4-3DE3-C846-A859-18C8BC098265}" type="presOf" srcId="{9B0DC355-4EE7-CF4D-8FA3-65138D55947F}" destId="{CA926706-B92E-CE41-81A0-54D1A7872542}" srcOrd="0" destOrd="0" presId="urn:microsoft.com/office/officeart/2005/8/layout/process1"/>
-    <dgm:cxn modelId="{0732BFEA-7762-F946-A27F-E72CD310C383}" srcId="{38F44408-F7EA-5D45-9F78-1E9259F17F1C}" destId="{CB4FD71C-37EB-7C4D-BA75-847F56CE95C2}" srcOrd="0" destOrd="0" parTransId="{F1BDFDD3-509D-304E-95A4-CCE2F1A47873}" sibTransId="{3C3A72B1-6F38-454F-ADA5-D1EBE4A37A7A}"/>
-    <dgm:cxn modelId="{D477C136-E0FD-4B4A-95A0-B7E6DFCCDBB4}" srcId="{38F44408-F7EA-5D45-9F78-1E9259F17F1C}" destId="{55AF6ACC-D03D-AE4C-B062-8B2F16A0D8E1}" srcOrd="1" destOrd="0" parTransId="{2ADED678-A0FA-2A45-8EFC-7F6DAAA912BC}" sibTransId="{A7B5DA2F-F7AF-9F49-B4CA-599244722077}"/>
-    <dgm:cxn modelId="{6C8AAC0A-232D-9248-A993-1B79BE69D5E7}" srcId="{CB4FD71C-37EB-7C4D-BA75-847F56CE95C2}" destId="{3AC304E9-26FF-944E-90D5-3DC6C1AA69DE}" srcOrd="0" destOrd="0" parTransId="{0234A1D6-3B1B-9849-9EE8-C66F3B5967D5}" sibTransId="{FBCE840F-0CAD-8945-BADD-24F97645C1A6}"/>
     <dgm:cxn modelId="{FB9E4479-BC78-6E48-BA44-AB73AA00D46F}" type="presParOf" srcId="{3EEF20E3-E8FF-C948-B6A2-E332D891F03C}" destId="{C52653A9-88E4-5B4C-A313-E4CE4518E38B}" srcOrd="0" destOrd="0" presId="urn:microsoft.com/office/officeart/2005/8/layout/process1"/>
     <dgm:cxn modelId="{4BE925E6-D869-B345-97FD-92CF357989B7}" type="presParOf" srcId="{3EEF20E3-E8FF-C948-B6A2-E332D891F03C}" destId="{524E36A4-812D-A94F-B713-8FF1DFB30DF5}" srcOrd="1" destOrd="0" presId="urn:microsoft.com/office/officeart/2005/8/layout/process1"/>
     <dgm:cxn modelId="{4CA0B719-596E-A640-B57D-167A4896C823}" type="presParOf" srcId="{524E36A4-812D-A94F-B713-8FF1DFB30DF5}" destId="{45B56F92-CA62-7547-B01D-E6ADA8964BD8}" srcOrd="0" destOrd="0" presId="urn:microsoft.com/office/officeart/2005/8/layout/process1"/>
@@ -6804,7 +6543,7 @@
         </a:bodyPr>
         <a:lstStyle/>
         <a:p>
-          <a:pPr lvl="0" algn="ctr" defTabSz="1333500">
+          <a:pPr marL="0" lvl="0" indent="0" algn="ctr" defTabSz="1333500">
             <a:lnSpc>
               <a:spcPct val="90000"/>
             </a:lnSpc>
@@ -6814,6 +6553,7 @@
             <a:spcAft>
               <a:spcPct val="35000"/>
             </a:spcAft>
+            <a:buNone/>
           </a:pPr>
           <a:r>
             <a:rPr lang="en-US" sz="3000" kern="1200" dirty="0"/>
@@ -6930,7 +6670,7 @@
         </a:bodyPr>
         <a:lstStyle/>
         <a:p>
-          <a:pPr lvl="0" algn="ctr" defTabSz="1333500">
+          <a:pPr marL="0" lvl="0" indent="0" algn="ctr" defTabSz="1333500">
             <a:lnSpc>
               <a:spcPct val="90000"/>
             </a:lnSpc>
@@ -6940,6 +6680,7 @@
             <a:spcAft>
               <a:spcPct val="35000"/>
             </a:spcAft>
+            <a:buNone/>
           </a:pPr>
           <a:r>
             <a:rPr lang="en-US" sz="3000" kern="1200" dirty="0"/>
@@ -7056,7 +6797,7 @@
         </a:bodyPr>
         <a:lstStyle/>
         <a:p>
-          <a:pPr lvl="0" algn="ctr" defTabSz="1333500">
+          <a:pPr marL="0" lvl="0" indent="0" algn="ctr" defTabSz="1333500">
             <a:lnSpc>
               <a:spcPct val="90000"/>
             </a:lnSpc>
@@ -7066,6 +6807,7 @@
             <a:spcAft>
               <a:spcPct val="35000"/>
             </a:spcAft>
+            <a:buNone/>
           </a:pPr>
           <a:r>
             <a:rPr lang="en-US" sz="3000" kern="1200" dirty="0"/>
@@ -7568,7 +7310,7 @@
         </a:bodyPr>
         <a:lstStyle/>
         <a:p>
-          <a:pPr lvl="0" algn="l" defTabSz="444500">
+          <a:pPr marL="0" lvl="0" indent="0" algn="l" defTabSz="444500">
             <a:lnSpc>
               <a:spcPct val="90000"/>
             </a:lnSpc>
@@ -7578,14 +7320,11 @@
             <a:spcAft>
               <a:spcPct val="35000"/>
             </a:spcAft>
+            <a:buNone/>
           </a:pPr>
           <a:r>
-            <a:rPr lang="en-US" sz="1000" kern="1200" dirty="0" smtClean="0"/>
-            <a:t>Recommender </a:t>
-          </a:r>
-          <a:r>
             <a:rPr lang="en-US" sz="1000" kern="1200" dirty="0"/>
-            <a:t>System</a:t>
+            <a:t>Recommender System</a:t>
           </a:r>
         </a:p>
       </dsp:txBody>
@@ -7681,7 +7420,7 @@
         </a:bodyPr>
         <a:lstStyle/>
         <a:p>
-          <a:pPr lvl="0" algn="l" defTabSz="444500">
+          <a:pPr marL="0" lvl="0" indent="0" algn="l" defTabSz="444500">
             <a:lnSpc>
               <a:spcPct val="90000"/>
             </a:lnSpc>
@@ -7691,6 +7430,7 @@
             <a:spcAft>
               <a:spcPct val="35000"/>
             </a:spcAft>
+            <a:buNone/>
           </a:pPr>
           <a:r>
             <a:rPr lang="en-US" sz="1000" kern="1200" dirty="0"/>
@@ -7790,7 +7530,7 @@
         </a:bodyPr>
         <a:lstStyle/>
         <a:p>
-          <a:pPr lvl="0" algn="l" defTabSz="444500">
+          <a:pPr marL="0" lvl="0" indent="0" algn="l" defTabSz="444500">
             <a:lnSpc>
               <a:spcPct val="90000"/>
             </a:lnSpc>
@@ -7800,6 +7540,7 @@
             <a:spcAft>
               <a:spcPct val="35000"/>
             </a:spcAft>
+            <a:buNone/>
           </a:pPr>
           <a:r>
             <a:rPr lang="en-US" sz="1000" kern="1200" dirty="0"/>
@@ -7899,7 +7640,7 @@
         </a:bodyPr>
         <a:lstStyle/>
         <a:p>
-          <a:pPr lvl="0" algn="l" defTabSz="444500">
+          <a:pPr marL="0" lvl="0" indent="0" algn="l" defTabSz="444500">
             <a:lnSpc>
               <a:spcPct val="90000"/>
             </a:lnSpc>
@@ -7909,6 +7650,7 @@
             <a:spcAft>
               <a:spcPct val="35000"/>
             </a:spcAft>
+            <a:buNone/>
           </a:pPr>
           <a:r>
             <a:rPr lang="en-US" sz="1000" b="1" kern="1200" dirty="0"/>
@@ -7920,7 +7662,7 @@
           </a:r>
         </a:p>
         <a:p>
-          <a:pPr lvl="0" algn="l" defTabSz="444500">
+          <a:pPr marL="0" lvl="0" indent="0" algn="l" defTabSz="444500">
             <a:lnSpc>
               <a:spcPct val="90000"/>
             </a:lnSpc>
@@ -7930,6 +7672,7 @@
             <a:spcAft>
               <a:spcPct val="35000"/>
             </a:spcAft>
+            <a:buNone/>
           </a:pPr>
           <a:r>
             <a:rPr lang="en-US" sz="1000" kern="1200" dirty="0"/>
@@ -8029,7 +7772,7 @@
         </a:bodyPr>
         <a:lstStyle/>
         <a:p>
-          <a:pPr lvl="0" algn="l" defTabSz="444500">
+          <a:pPr marL="0" lvl="0" indent="0" algn="l" defTabSz="444500">
             <a:lnSpc>
               <a:spcPct val="90000"/>
             </a:lnSpc>
@@ -8039,12 +7782,12 @@
             <a:spcAft>
               <a:spcPct val="35000"/>
             </a:spcAft>
+            <a:buNone/>
           </a:pPr>
           <a:r>
-            <a:rPr lang="en-US" sz="1000" kern="1200" dirty="0" smtClean="0"/>
+            <a:rPr lang="en-US" sz="1000" kern="1200" dirty="0"/>
             <a:t>Predictive Model</a:t>
           </a:r>
-          <a:endParaRPr lang="en-US" sz="1000" kern="1200" dirty="0"/>
         </a:p>
       </dsp:txBody>
       <dsp:txXfrm>
@@ -8139,7 +7882,7 @@
         </a:bodyPr>
         <a:lstStyle/>
         <a:p>
-          <a:pPr lvl="0" algn="l" defTabSz="444500">
+          <a:pPr marL="0" lvl="0" indent="0" algn="l" defTabSz="444500">
             <a:lnSpc>
               <a:spcPct val="90000"/>
             </a:lnSpc>
@@ -8149,12 +7892,12 @@
             <a:spcAft>
               <a:spcPct val="35000"/>
             </a:spcAft>
+            <a:buNone/>
           </a:pPr>
           <a:r>
-            <a:rPr lang="en-US" sz="1000" kern="1200" dirty="0" smtClean="0"/>
+            <a:rPr lang="en-US" sz="1000" kern="1200" dirty="0"/>
             <a:t>Regularized linear regression</a:t>
           </a:r>
-          <a:endParaRPr lang="en-US" sz="1000" kern="1200" dirty="0"/>
         </a:p>
       </dsp:txBody>
       <dsp:txXfrm>
@@ -8249,7 +7992,7 @@
         </a:bodyPr>
         <a:lstStyle/>
         <a:p>
-          <a:pPr lvl="0" algn="l" defTabSz="444500">
+          <a:pPr marL="0" lvl="0" indent="0" algn="l" defTabSz="444500">
             <a:lnSpc>
               <a:spcPct val="90000"/>
             </a:lnSpc>
@@ -8259,6 +8002,7 @@
             <a:spcAft>
               <a:spcPct val="35000"/>
             </a:spcAft>
+            <a:buNone/>
           </a:pPr>
           <a:r>
             <a:rPr lang="en-US" sz="1000" b="1" kern="1200" dirty="0"/>
@@ -8270,7 +8014,7 @@
           </a:r>
         </a:p>
         <a:p>
-          <a:pPr lvl="0" algn="l" defTabSz="444500">
+          <a:pPr marL="0" lvl="0" indent="0" algn="l" defTabSz="444500">
             <a:lnSpc>
               <a:spcPct val="90000"/>
             </a:lnSpc>
@@ -8280,16 +8024,12 @@
             <a:spcAft>
               <a:spcPct val="35000"/>
             </a:spcAft>
+            <a:buNone/>
           </a:pPr>
           <a:r>
-            <a:rPr lang="en-US" sz="1000" kern="1200" dirty="0" smtClean="0"/>
-            <a:t>Warnings &amp; </a:t>
+            <a:rPr lang="en-US" sz="1000" kern="1200" dirty="0"/>
+            <a:t>Warnings &amp; preparatory courses</a:t>
           </a:r>
-          <a:r>
-            <a:rPr lang="en-US" sz="1000" kern="1200" dirty="0" smtClean="0"/>
-            <a:t>preparatory courses</a:t>
-          </a:r>
-          <a:endParaRPr lang="en-US" sz="1000" kern="1200" dirty="0"/>
         </a:p>
       </dsp:txBody>
       <dsp:txXfrm>
@@ -8366,7 +8106,7 @@
         </a:bodyPr>
         <a:lstStyle/>
         <a:p>
-          <a:pPr lvl="0" algn="l" defTabSz="844550">
+          <a:pPr marL="0" lvl="0" indent="0" algn="l" defTabSz="844550">
             <a:lnSpc>
               <a:spcPct val="90000"/>
             </a:lnSpc>
@@ -8376,12 +8116,12 @@
             <a:spcAft>
               <a:spcPct val="35000"/>
             </a:spcAft>
+            <a:buNone/>
           </a:pPr>
           <a:r>
-            <a:rPr lang="en-US" sz="1900" kern="1200" dirty="0" smtClean="0"/>
+            <a:rPr lang="en-US" sz="1900" kern="1200" dirty="0"/>
             <a:t>Input</a:t>
           </a:r>
-          <a:endParaRPr lang="en-US" sz="1900" kern="1200" dirty="0"/>
         </a:p>
         <a:p>
           <a:pPr marL="114300" lvl="1" indent="-114300" algn="l" defTabSz="666750">
@@ -8394,13 +8134,12 @@
             <a:spcAft>
               <a:spcPct val="15000"/>
             </a:spcAft>
-            <a:buChar char="••"/>
+            <a:buChar char="•"/>
           </a:pPr>
           <a:r>
-            <a:rPr lang="en-US" sz="1500" kern="1200" dirty="0" smtClean="0"/>
+            <a:rPr lang="en-US" sz="1500" kern="1200" dirty="0"/>
             <a:t>Textual description of courses:</a:t>
           </a:r>
-          <a:endParaRPr lang="en-US" sz="1500" kern="1200" dirty="0"/>
         </a:p>
         <a:p>
           <a:pPr marL="228600" lvl="2" indent="-114300" algn="l" defTabSz="666750">
@@ -8413,13 +8152,12 @@
             <a:spcAft>
               <a:spcPct val="15000"/>
             </a:spcAft>
-            <a:buChar char="••"/>
+            <a:buChar char="•"/>
           </a:pPr>
           <a:r>
-            <a:rPr lang="en-US" sz="1500" kern="1200" dirty="0" smtClean="0"/>
+            <a:rPr lang="en-US" sz="1500" kern="1200" dirty="0"/>
             <a:t>Course catalogue</a:t>
           </a:r>
-          <a:endParaRPr lang="en-US" sz="1500" kern="1200" dirty="0"/>
         </a:p>
         <a:p>
           <a:pPr marL="228600" lvl="2" indent="-114300" algn="l" defTabSz="666750">
@@ -8432,13 +8170,12 @@
             <a:spcAft>
               <a:spcPct val="15000"/>
             </a:spcAft>
-            <a:buChar char="••"/>
+            <a:buChar char="•"/>
           </a:pPr>
           <a:r>
-            <a:rPr lang="en-US" sz="1500" kern="1200" dirty="0" smtClean="0"/>
+            <a:rPr lang="en-US" sz="1500" kern="1200" dirty="0"/>
             <a:t>Course manuals</a:t>
           </a:r>
-          <a:endParaRPr lang="en-US" sz="1500" kern="1200" dirty="0"/>
         </a:p>
         <a:p>
           <a:pPr marL="228600" lvl="2" indent="-114300" algn="l" defTabSz="666750">
@@ -8451,13 +8188,12 @@
             <a:spcAft>
               <a:spcPct val="15000"/>
             </a:spcAft>
-            <a:buChar char="••"/>
+            <a:buChar char="•"/>
           </a:pPr>
           <a:r>
-            <a:rPr lang="en-US" sz="1500" kern="1200" dirty="0" smtClean="0"/>
+            <a:rPr lang="en-US" sz="1500" kern="1200" dirty="0"/>
             <a:t>Course literature (future)</a:t>
           </a:r>
-          <a:endParaRPr lang="en-US" sz="1500" kern="1200" dirty="0"/>
         </a:p>
       </dsp:txBody>
       <dsp:txXfrm>
@@ -8514,7 +8250,7 @@
         </a:bodyPr>
         <a:lstStyle/>
         <a:p>
-          <a:pPr lvl="0" algn="ctr" defTabSz="711200">
+          <a:pPr marL="0" lvl="0" indent="0" algn="ctr" defTabSz="711200">
             <a:lnSpc>
               <a:spcPct val="90000"/>
             </a:lnSpc>
@@ -8524,6 +8260,7 @@
             <a:spcAft>
               <a:spcPct val="35000"/>
             </a:spcAft>
+            <a:buNone/>
           </a:pPr>
           <a:endParaRPr lang="en-US" sz="1600" kern="1200"/>
         </a:p>
@@ -8590,7 +8327,7 @@
         </a:bodyPr>
         <a:lstStyle/>
         <a:p>
-          <a:pPr lvl="0" algn="l" defTabSz="844550">
+          <a:pPr marL="0" lvl="0" indent="0" algn="l" defTabSz="844550">
             <a:lnSpc>
               <a:spcPct val="90000"/>
             </a:lnSpc>
@@ -8600,6 +8337,7 @@
             <a:spcAft>
               <a:spcPct val="35000"/>
             </a:spcAft>
+            <a:buNone/>
           </a:pPr>
           <a:r>
             <a:rPr lang="en-US" sz="1900" kern="1200" dirty="0"/>
@@ -8617,7 +8355,7 @@
             <a:spcAft>
               <a:spcPct val="15000"/>
             </a:spcAft>
-            <a:buChar char="••"/>
+            <a:buChar char="•"/>
           </a:pPr>
           <a:r>
             <a:rPr lang="en-US" sz="1500" kern="1200" dirty="0"/>
@@ -8635,10 +8373,10 @@
             <a:spcAft>
               <a:spcPct val="15000"/>
             </a:spcAft>
-            <a:buChar char="••"/>
+            <a:buChar char="•"/>
           </a:pPr>
           <a:r>
-            <a:rPr lang="en-US" sz="1500" kern="1200" dirty="0" smtClean="0"/>
+            <a:rPr lang="en-US" sz="1500" kern="1200" dirty="0"/>
             <a:t>Vary: </a:t>
           </a:r>
           <a14:m xmlns:a14="http://schemas.microsoft.com/office/drawing/2010/main">
@@ -8664,7 +8402,7 @@
             </m:oMath>
           </a14:m>
           <a:r>
-            <a:rPr lang="en-US" sz="1500" kern="1200" dirty="0" smtClean="0"/>
+            <a:rPr lang="en-US" sz="1500" kern="1200" dirty="0"/>
             <a:t> and </a:t>
           </a:r>
           <a14:m xmlns:a14="http://schemas.microsoft.com/office/drawing/2010/main">
@@ -8690,17 +8428,12 @@
             <a:spcAft>
               <a:spcPct val="15000"/>
             </a:spcAft>
-            <a:buChar char="••"/>
+            <a:buChar char="•"/>
           </a:pPr>
           <a:r>
-            <a:rPr lang="en-US" sz="1500" kern="1200" dirty="0" smtClean="0"/>
-            <a:t>Model selection: perplexity, coherence, </a:t>
+            <a:rPr lang="en-US" sz="1500" kern="1200" dirty="0"/>
+            <a:t>Model selection: perplexity, coherence, log-likelihood (future)</a:t>
           </a:r>
-          <a:r>
-            <a:rPr lang="en-US" sz="1500" kern="1200" dirty="0" smtClean="0"/>
-            <a:t>log-likelihood (future)</a:t>
-          </a:r>
-          <a:endParaRPr lang="en-US" sz="1500" kern="1200" dirty="0"/>
         </a:p>
         <a:p>
           <a:pPr marL="114300" lvl="1" indent="-114300" algn="l" defTabSz="666750">
@@ -8713,7 +8446,7 @@
             <a:spcAft>
               <a:spcPct val="15000"/>
             </a:spcAft>
-            <a:buChar char="••"/>
+            <a:buChar char="•"/>
           </a:pPr>
           <a:endParaRPr lang="en-US" sz="1500" kern="1200" dirty="0"/>
         </a:p>
@@ -8772,7 +8505,7 @@
         </a:bodyPr>
         <a:lstStyle/>
         <a:p>
-          <a:pPr lvl="0" algn="ctr" defTabSz="711200">
+          <a:pPr marL="0" lvl="0" indent="0" algn="ctr" defTabSz="711200">
             <a:lnSpc>
               <a:spcPct val="90000"/>
             </a:lnSpc>
@@ -8782,6 +8515,7 @@
             <a:spcAft>
               <a:spcPct val="35000"/>
             </a:spcAft>
+            <a:buNone/>
           </a:pPr>
           <a:endParaRPr lang="en-US" sz="1600" kern="1200"/>
         </a:p>
@@ -8848,7 +8582,7 @@
         </a:bodyPr>
         <a:lstStyle/>
         <a:p>
-          <a:pPr lvl="0" algn="l" defTabSz="844550">
+          <a:pPr marL="0" lvl="0" indent="0" algn="l" defTabSz="844550">
             <a:lnSpc>
               <a:spcPct val="90000"/>
             </a:lnSpc>
@@ -8858,14 +8592,11 @@
             <a:spcAft>
               <a:spcPct val="35000"/>
             </a:spcAft>
+            <a:buNone/>
           </a:pPr>
           <a:r>
-            <a:rPr lang="en-US" sz="1900" kern="1200" dirty="0" smtClean="0"/>
-            <a:t>Course </a:t>
-          </a:r>
-          <a:r>
             <a:rPr lang="en-US" sz="1900" kern="1200" dirty="0"/>
-            <a:t>Recommendation</a:t>
+            <a:t>Course Recommendation</a:t>
           </a:r>
         </a:p>
         <a:p>
@@ -8879,13 +8610,12 @@
             <a:spcAft>
               <a:spcPct val="15000"/>
             </a:spcAft>
-            <a:buChar char="••"/>
+            <a:buChar char="•"/>
           </a:pPr>
           <a:r>
-            <a:rPr lang="en-US" sz="1500" kern="1200" dirty="0" smtClean="0"/>
+            <a:rPr lang="en-US" sz="1500" kern="1200" dirty="0"/>
             <a:t>App: selection of key words</a:t>
           </a:r>
-          <a:endParaRPr lang="en-US" sz="1500" kern="1200" dirty="0"/>
         </a:p>
         <a:p>
           <a:pPr marL="228600" lvl="2" indent="-114300" algn="l" defTabSz="666750">
@@ -8898,13 +8628,12 @@
             <a:spcAft>
               <a:spcPct val="15000"/>
             </a:spcAft>
-            <a:buChar char="••"/>
+            <a:buChar char="•"/>
           </a:pPr>
           <a:r>
-            <a:rPr lang="en-US" sz="1500" kern="1200" dirty="0" smtClean="0"/>
+            <a:rPr lang="en-US" sz="1500" kern="1200" dirty="0"/>
             <a:t>student topic profile</a:t>
           </a:r>
-          <a:endParaRPr lang="en-US" sz="1500" kern="1200" dirty="0"/>
         </a:p>
         <a:p>
           <a:pPr marL="114300" lvl="1" indent="-114300" algn="l" defTabSz="666750">
@@ -8917,13 +8646,12 @@
             <a:spcAft>
               <a:spcPct val="15000"/>
             </a:spcAft>
-            <a:buChar char="••"/>
+            <a:buChar char="•"/>
           </a:pPr>
           <a:r>
-            <a:rPr lang="en-US" sz="1500" kern="1200" dirty="0" smtClean="0"/>
+            <a:rPr lang="en-US" sz="1500" kern="1200" dirty="0"/>
             <a:t>Identify matching courses</a:t>
           </a:r>
-          <a:endParaRPr lang="en-US" sz="1500" kern="1200" dirty="0"/>
         </a:p>
       </dsp:txBody>
       <dsp:txXfrm>
@@ -9000,7 +8728,7 @@
         </a:bodyPr>
         <a:lstStyle/>
         <a:p>
-          <a:pPr lvl="0" algn="l" defTabSz="844550">
+          <a:pPr marL="0" lvl="0" indent="0" algn="l" defTabSz="844550">
             <a:lnSpc>
               <a:spcPct val="90000"/>
             </a:lnSpc>
@@ -9010,12 +8738,12 @@
             <a:spcAft>
               <a:spcPct val="35000"/>
             </a:spcAft>
+            <a:buNone/>
           </a:pPr>
           <a:r>
-            <a:rPr lang="en-US" sz="1900" kern="1200" dirty="0" smtClean="0"/>
+            <a:rPr lang="en-US" sz="1900" kern="1200" dirty="0"/>
             <a:t>Input</a:t>
           </a:r>
-          <a:endParaRPr lang="en-US" sz="1900" kern="1200" dirty="0"/>
         </a:p>
         <a:p>
           <a:pPr marL="114300" lvl="1" indent="-114300" algn="l" defTabSz="666750">
@@ -9028,13 +8756,12 @@
             <a:spcAft>
               <a:spcPct val="15000"/>
             </a:spcAft>
-            <a:buChar char="••"/>
+            <a:buChar char="•"/>
           </a:pPr>
           <a:r>
-            <a:rPr lang="en-US" sz="1500" kern="1200" dirty="0" smtClean="0"/>
+            <a:rPr lang="en-US" sz="1500" kern="1200" dirty="0"/>
             <a:t>Transcripts (2,500)</a:t>
           </a:r>
-          <a:endParaRPr lang="en-US" sz="1500" kern="1200" dirty="0"/>
         </a:p>
       </dsp:txBody>
       <dsp:txXfrm>
@@ -9091,7 +8818,7 @@
         </a:bodyPr>
         <a:lstStyle/>
         <a:p>
-          <a:pPr lvl="0" algn="ctr" defTabSz="666750">
+          <a:pPr marL="0" lvl="0" indent="0" algn="ctr" defTabSz="666750">
             <a:lnSpc>
               <a:spcPct val="90000"/>
             </a:lnSpc>
@@ -9101,6 +8828,7 @@
             <a:spcAft>
               <a:spcPct val="35000"/>
             </a:spcAft>
+            <a:buNone/>
           </a:pPr>
           <a:endParaRPr lang="en-US" sz="1500" kern="1200"/>
         </a:p>
@@ -9167,7 +8895,7 @@
         </a:bodyPr>
         <a:lstStyle/>
         <a:p>
-          <a:pPr lvl="0" algn="l" defTabSz="844550">
+          <a:pPr marL="0" lvl="0" indent="0" algn="l" defTabSz="844550">
             <a:lnSpc>
               <a:spcPct val="90000"/>
             </a:lnSpc>
@@ -9177,12 +8905,12 @@
             <a:spcAft>
               <a:spcPct val="35000"/>
             </a:spcAft>
+            <a:buNone/>
           </a:pPr>
           <a:r>
-            <a:rPr lang="en-US" sz="1900" kern="1200" dirty="0" smtClean="0"/>
+            <a:rPr lang="en-US" sz="1900" kern="1200" dirty="0"/>
             <a:t>Fit Linear Model</a:t>
           </a:r>
-          <a:endParaRPr lang="en-US" sz="1900" kern="1200" dirty="0"/>
         </a:p>
         <a:p>
           <a:pPr marL="114300" lvl="1" indent="-114300" algn="l" defTabSz="666750">
@@ -9195,13 +8923,12 @@
             <a:spcAft>
               <a:spcPct val="15000"/>
             </a:spcAft>
-            <a:buChar char="••"/>
+            <a:buChar char="•"/>
           </a:pPr>
           <a:r>
-            <a:rPr lang="en-US" sz="1500" kern="1200" dirty="0" smtClean="0"/>
+            <a:rPr lang="en-US" sz="1500" kern="1200" dirty="0"/>
             <a:t>A model for each course</a:t>
           </a:r>
-          <a:endParaRPr lang="en-US" sz="1500" kern="1200" dirty="0"/>
         </a:p>
         <a:p>
           <a:pPr marL="114300" lvl="1" indent="-114300" algn="l" defTabSz="666750">
@@ -9214,13 +8941,12 @@
             <a:spcAft>
               <a:spcPct val="15000"/>
             </a:spcAft>
-            <a:buChar char="••"/>
+            <a:buChar char="•"/>
           </a:pPr>
           <a:r>
-            <a:rPr lang="en-US" sz="1500" kern="1200" dirty="0" smtClean="0"/>
+            <a:rPr lang="en-US" sz="1500" kern="1200" dirty="0"/>
             <a:t>Predictors</a:t>
           </a:r>
-          <a:endParaRPr lang="en-US" sz="1500" kern="1200" dirty="0"/>
         </a:p>
         <a:p>
           <a:pPr marL="228600" lvl="2" indent="-114300" algn="l" defTabSz="666750">
@@ -9233,13 +8959,12 @@
             <a:spcAft>
               <a:spcPct val="15000"/>
             </a:spcAft>
-            <a:buChar char="••"/>
+            <a:buChar char="•"/>
           </a:pPr>
           <a:r>
-            <a:rPr lang="en-US" sz="1500" kern="1200" dirty="0" smtClean="0"/>
+            <a:rPr lang="en-US" sz="1500" kern="1200" dirty="0"/>
             <a:t>Past academic performance</a:t>
           </a:r>
-          <a:endParaRPr lang="en-US" sz="1500" kern="1200" dirty="0"/>
         </a:p>
         <a:p>
           <a:pPr marL="228600" lvl="2" indent="-114300" algn="l" defTabSz="666750">
@@ -9252,13 +8977,12 @@
             <a:spcAft>
               <a:spcPct val="15000"/>
             </a:spcAft>
-            <a:buChar char="••"/>
+            <a:buChar char="•"/>
           </a:pPr>
           <a:r>
-            <a:rPr lang="en-US" sz="1500" kern="1200" dirty="0" smtClean="0"/>
+            <a:rPr lang="en-US" sz="1500" kern="1200" dirty="0"/>
             <a:t>Topic expertise</a:t>
           </a:r>
-          <a:endParaRPr lang="en-US" sz="1500" kern="1200" dirty="0"/>
         </a:p>
         <a:p>
           <a:pPr marL="114300" lvl="1" indent="-114300" algn="l" defTabSz="666750">
@@ -9271,13 +8995,12 @@
             <a:spcAft>
               <a:spcPct val="15000"/>
             </a:spcAft>
-            <a:buChar char="••"/>
+            <a:buChar char="•"/>
           </a:pPr>
           <a:r>
-            <a:rPr lang="en-US" sz="1500" kern="1200" dirty="0" smtClean="0"/>
+            <a:rPr lang="en-US" sz="1500" kern="1200" dirty="0"/>
             <a:t>Regularized (Lasso &amp; C.V.)</a:t>
           </a:r>
-          <a:endParaRPr lang="en-US" sz="1500" kern="1200" dirty="0"/>
         </a:p>
       </dsp:txBody>
       <dsp:txXfrm>
@@ -9334,7 +9057,7 @@
         </a:bodyPr>
         <a:lstStyle/>
         <a:p>
-          <a:pPr lvl="0" algn="ctr" defTabSz="666750">
+          <a:pPr marL="0" lvl="0" indent="0" algn="ctr" defTabSz="666750">
             <a:lnSpc>
               <a:spcPct val="90000"/>
             </a:lnSpc>
@@ -9344,6 +9067,7 @@
             <a:spcAft>
               <a:spcPct val="35000"/>
             </a:spcAft>
+            <a:buNone/>
           </a:pPr>
           <a:endParaRPr lang="en-US" sz="1500" kern="1200"/>
         </a:p>
@@ -9410,7 +9134,7 @@
         </a:bodyPr>
         <a:lstStyle/>
         <a:p>
-          <a:pPr lvl="0" algn="l" defTabSz="844550">
+          <a:pPr marL="0" lvl="0" indent="0" algn="l" defTabSz="844550">
             <a:lnSpc>
               <a:spcPct val="90000"/>
             </a:lnSpc>
@@ -9420,12 +9144,12 @@
             <a:spcAft>
               <a:spcPct val="35000"/>
             </a:spcAft>
+            <a:buNone/>
           </a:pPr>
           <a:r>
-            <a:rPr lang="en-US" sz="1900" kern="1200" dirty="0" smtClean="0"/>
+            <a:rPr lang="en-US" sz="1900" kern="1200" dirty="0"/>
             <a:t>Warnings</a:t>
           </a:r>
-          <a:endParaRPr lang="en-US" sz="1900" kern="1200" dirty="0"/>
         </a:p>
         <a:p>
           <a:pPr marL="114300" lvl="1" indent="-114300" algn="l" defTabSz="666750">
@@ -9438,13 +9162,12 @@
             <a:spcAft>
               <a:spcPct val="15000"/>
             </a:spcAft>
-            <a:buChar char="••"/>
+            <a:buChar char="•"/>
           </a:pPr>
           <a:r>
-            <a:rPr lang="en-US" sz="1500" kern="1200" dirty="0" smtClean="0"/>
+            <a:rPr lang="en-US" sz="1500" kern="1200" dirty="0"/>
             <a:t>App: selection of courses</a:t>
           </a:r>
-          <a:endParaRPr lang="en-US" sz="1500" kern="1200" dirty="0"/>
         </a:p>
         <a:p>
           <a:pPr marL="228600" lvl="2" indent="-114300" algn="l" defTabSz="666750">
@@ -9457,13 +9180,12 @@
             <a:spcAft>
               <a:spcPct val="15000"/>
             </a:spcAft>
-            <a:buChar char="••"/>
+            <a:buChar char="•"/>
           </a:pPr>
           <a:r>
-            <a:rPr lang="en-US" sz="1500" kern="1200" dirty="0" smtClean="0"/>
+            <a:rPr lang="en-US" sz="1500" kern="1200" dirty="0"/>
             <a:t>Grade prediction</a:t>
           </a:r>
-          <a:endParaRPr lang="en-US" sz="1500" kern="1200" dirty="0"/>
         </a:p>
         <a:p>
           <a:pPr marL="114300" lvl="1" indent="-114300" algn="l" defTabSz="666750">
@@ -9476,13 +9198,12 @@
             <a:spcAft>
               <a:spcPct val="15000"/>
             </a:spcAft>
-            <a:buChar char="••"/>
+            <a:buChar char="•"/>
           </a:pPr>
           <a:r>
-            <a:rPr lang="en-US" sz="1500" kern="1200" dirty="0" smtClean="0"/>
+            <a:rPr lang="en-US" sz="1500" kern="1200" dirty="0"/>
             <a:t>If predicted grade is low</a:t>
           </a:r>
-          <a:endParaRPr lang="en-US" sz="1500" kern="1200" dirty="0"/>
         </a:p>
         <a:p>
           <a:pPr marL="228600" lvl="2" indent="-114300" algn="l" defTabSz="666750">
@@ -9495,13 +9216,12 @@
             <a:spcAft>
               <a:spcPct val="15000"/>
             </a:spcAft>
-            <a:buChar char="••"/>
+            <a:buChar char="•"/>
           </a:pPr>
           <a:r>
-            <a:rPr lang="en-US" sz="1500" kern="1200" dirty="0" smtClean="0"/>
+            <a:rPr lang="en-US" sz="1500" kern="1200" dirty="0"/>
             <a:t>Issue a warning</a:t>
           </a:r>
-          <a:endParaRPr lang="en-US" sz="1500" kern="1200" dirty="0"/>
         </a:p>
         <a:p>
           <a:pPr marL="228600" lvl="2" indent="-114300" algn="l" defTabSz="666750">
@@ -9514,13 +9234,12 @@
             <a:spcAft>
               <a:spcPct val="15000"/>
             </a:spcAft>
-            <a:buChar char="••"/>
+            <a:buChar char="•"/>
           </a:pPr>
           <a:r>
-            <a:rPr lang="en-US" sz="1500" kern="1200" dirty="0" smtClean="0"/>
+            <a:rPr lang="en-US" sz="1500" kern="1200" dirty="0"/>
             <a:t>Suggest preparatory courses</a:t>
           </a:r>
-          <a:endParaRPr lang="en-US" sz="1500" kern="1200" dirty="0"/>
         </a:p>
       </dsp:txBody>
       <dsp:txXfrm>
@@ -14766,7 +14485,7 @@
           <a:p>
             <a:fld id="{7F746BDC-4F77-324D-9356-70AB02BC886F}" type="datetimeFigureOut">
               <a:rPr lang="en-US" smtClean="0"/>
-              <a:t>4/16/2019</a:t>
+              <a:t>4/17/19</a:t>
             </a:fld>
             <a:endParaRPr lang="en-US"/>
           </a:p>
@@ -14924,7 +14643,7 @@
           <a:p>
             <a:fld id="{1AFC0DEA-EB8E-954D-A6CB-0853391D3030}" type="slidenum">
               <a:rPr lang="en-US" smtClean="0"/>
-              <a:t>‹N°›</a:t>
+              <a:t>‹#›</a:t>
             </a:fld>
             <a:endParaRPr lang="en-US"/>
           </a:p>
@@ -15527,7 +15246,7 @@
     </p:spTree>
     <p:extLst>
       <p:ext uri="{BB962C8B-B14F-4D97-AF65-F5344CB8AC3E}">
-        <p14:creationId xmlns:p14="http://schemas.microsoft.com/office/powerpoint/2010/main" val="866470516"/>
+        <p14:creationId xmlns:p14="http://schemas.microsoft.com/office/powerpoint/2010/main" val="2873065072"/>
       </p:ext>
     </p:extLst>
   </p:cSld>
@@ -15602,7 +15321,91 @@
           <a:p>
             <a:fld id="{1AFC0DEA-EB8E-954D-A6CB-0853391D3030}" type="slidenum">
               <a:rPr lang="en-US" smtClean="0"/>
-              <a:t>16</a:t>
+              <a:t>15</a:t>
+            </a:fld>
+            <a:endParaRPr lang="en-US"/>
+          </a:p>
+        </p:txBody>
+      </p:sp>
+    </p:spTree>
+    <p:extLst>
+      <p:ext uri="{BB962C8B-B14F-4D97-AF65-F5344CB8AC3E}">
+        <p14:creationId xmlns:p14="http://schemas.microsoft.com/office/powerpoint/2010/main" val="866470516"/>
+      </p:ext>
+    </p:extLst>
+  </p:cSld>
+  <p:clrMapOvr>
+    <a:masterClrMapping/>
+  </p:clrMapOvr>
+</p:notes>
+</file>
+
+<file path=ppt/notesSlides/notesSlide8.xml><?xml version="1.0" encoding="utf-8"?>
+<p:notes xmlns:a="http://schemas.openxmlformats.org/drawingml/2006/main" xmlns:r="http://schemas.openxmlformats.org/officeDocument/2006/relationships" xmlns:p="http://schemas.openxmlformats.org/presentationml/2006/main">
+  <p:cSld>
+    <p:spTree>
+      <p:nvGrpSpPr>
+        <p:cNvPr id="1" name=""/>
+        <p:cNvGrpSpPr/>
+        <p:nvPr/>
+      </p:nvGrpSpPr>
+      <p:grpSpPr>
+        <a:xfrm>
+          <a:off x="0" y="0"/>
+          <a:ext cx="0" cy="0"/>
+          <a:chOff x="0" y="0"/>
+          <a:chExt cx="0" cy="0"/>
+        </a:xfrm>
+      </p:grpSpPr>
+      <p:sp>
+        <p:nvSpPr>
+          <p:cNvPr id="2" name="Slide Image Placeholder 1"/>
+          <p:cNvSpPr>
+            <a:spLocks noGrp="1" noRot="1" noChangeAspect="1"/>
+          </p:cNvSpPr>
+          <p:nvPr>
+            <p:ph type="sldImg"/>
+          </p:nvPr>
+        </p:nvSpPr>
+        <p:spPr/>
+      </p:sp>
+      <p:sp>
+        <p:nvSpPr>
+          <p:cNvPr id="3" name="Notes Placeholder 2"/>
+          <p:cNvSpPr>
+            <a:spLocks noGrp="1"/>
+          </p:cNvSpPr>
+          <p:nvPr>
+            <p:ph type="body" idx="1"/>
+          </p:nvPr>
+        </p:nvSpPr>
+        <p:spPr/>
+        <p:txBody>
+          <a:bodyPr/>
+          <a:lstStyle/>
+          <a:p>
+            <a:endParaRPr lang="en-US" dirty="0"/>
+          </a:p>
+        </p:txBody>
+      </p:sp>
+      <p:sp>
+        <p:nvSpPr>
+          <p:cNvPr id="4" name="Slide Number Placeholder 3"/>
+          <p:cNvSpPr>
+            <a:spLocks noGrp="1"/>
+          </p:cNvSpPr>
+          <p:nvPr>
+            <p:ph type="sldNum" sz="quarter" idx="5"/>
+          </p:nvPr>
+        </p:nvSpPr>
+        <p:spPr/>
+        <p:txBody>
+          <a:bodyPr/>
+          <a:lstStyle/>
+          <a:p>
+            <a:fld id="{1AFC0DEA-EB8E-954D-A6CB-0853391D3030}" type="slidenum">
+              <a:rPr lang="en-US" smtClean="0"/>
+              <a:t>17</a:t>
             </a:fld>
             <a:endParaRPr lang="en-US"/>
           </a:p>
@@ -15643,7 +15446,7 @@
           <p:cNvPr id="2" name="Title 1">
             <a:extLst>
               <a:ext uri="{FF2B5EF4-FFF2-40B4-BE49-F238E27FC236}">
-                <a16:creationId xmlns:a16="http://schemas.microsoft.com/office/drawing/2014/main" xmlns="" id="{D30CF053-1D27-BE43-A8BD-B5F5B44F2FF7}"/>
+                <a16:creationId xmlns:a16="http://schemas.microsoft.com/office/drawing/2014/main" id="{D30CF053-1D27-BE43-A8BD-B5F5B44F2FF7}"/>
               </a:ext>
             </a:extLst>
           </p:cNvPr>
@@ -15680,7 +15483,7 @@
           <p:cNvPr id="3" name="Subtitle 2">
             <a:extLst>
               <a:ext uri="{FF2B5EF4-FFF2-40B4-BE49-F238E27FC236}">
-                <a16:creationId xmlns:a16="http://schemas.microsoft.com/office/drawing/2014/main" xmlns="" id="{5F0D5758-DA2D-B944-B142-DDD28E440324}"/>
+                <a16:creationId xmlns:a16="http://schemas.microsoft.com/office/drawing/2014/main" id="{5F0D5758-DA2D-B944-B142-DDD28E440324}"/>
               </a:ext>
             </a:extLst>
           </p:cNvPr>
@@ -15750,7 +15553,7 @@
           <p:cNvPr id="4" name="Date Placeholder 3">
             <a:extLst>
               <a:ext uri="{FF2B5EF4-FFF2-40B4-BE49-F238E27FC236}">
-                <a16:creationId xmlns:a16="http://schemas.microsoft.com/office/drawing/2014/main" xmlns="" id="{BAB75A3F-178C-F74D-8076-47FC4F25E358}"/>
+                <a16:creationId xmlns:a16="http://schemas.microsoft.com/office/drawing/2014/main" id="{BAB75A3F-178C-F74D-8076-47FC4F25E358}"/>
               </a:ext>
             </a:extLst>
           </p:cNvPr>
@@ -15768,7 +15571,7 @@
           <a:p>
             <a:fld id="{855D09F2-5AA6-D542-9273-2F70EC32D14A}" type="datetimeFigureOut">
               <a:rPr lang="en-US" smtClean="0"/>
-              <a:t>4/16/2019</a:t>
+              <a:t>4/17/19</a:t>
             </a:fld>
             <a:endParaRPr lang="en-US"/>
           </a:p>
@@ -15779,7 +15582,7 @@
           <p:cNvPr id="5" name="Footer Placeholder 4">
             <a:extLst>
               <a:ext uri="{FF2B5EF4-FFF2-40B4-BE49-F238E27FC236}">
-                <a16:creationId xmlns:a16="http://schemas.microsoft.com/office/drawing/2014/main" xmlns="" id="{6AFBF5AD-CC7C-F748-A4B8-C1C590C26873}"/>
+                <a16:creationId xmlns:a16="http://schemas.microsoft.com/office/drawing/2014/main" id="{6AFBF5AD-CC7C-F748-A4B8-C1C590C26873}"/>
               </a:ext>
             </a:extLst>
           </p:cNvPr>
@@ -15804,7 +15607,7 @@
           <p:cNvPr id="6" name="Slide Number Placeholder 5">
             <a:extLst>
               <a:ext uri="{FF2B5EF4-FFF2-40B4-BE49-F238E27FC236}">
-                <a16:creationId xmlns:a16="http://schemas.microsoft.com/office/drawing/2014/main" xmlns="" id="{8CB446F3-1D2E-2E40-A68B-0862CC38BE6A}"/>
+                <a16:creationId xmlns:a16="http://schemas.microsoft.com/office/drawing/2014/main" id="{8CB446F3-1D2E-2E40-A68B-0862CC38BE6A}"/>
               </a:ext>
             </a:extLst>
           </p:cNvPr>
@@ -15822,7 +15625,7 @@
           <a:p>
             <a:fld id="{006D2977-72A3-A94F-9FA5-9EB7D3FCC9C4}" type="slidenum">
               <a:rPr lang="en-US" smtClean="0"/>
-              <a:t>‹N°›</a:t>
+              <a:t>‹#›</a:t>
             </a:fld>
             <a:endParaRPr lang="en-US"/>
           </a:p>
@@ -15863,7 +15666,7 @@
           <p:cNvPr id="2" name="Title 1">
             <a:extLst>
               <a:ext uri="{FF2B5EF4-FFF2-40B4-BE49-F238E27FC236}">
-                <a16:creationId xmlns:a16="http://schemas.microsoft.com/office/drawing/2014/main" xmlns="" id="{8B9E0745-2D52-5441-9A6B-1B9C22A6FA44}"/>
+                <a16:creationId xmlns:a16="http://schemas.microsoft.com/office/drawing/2014/main" id="{8B9E0745-2D52-5441-9A6B-1B9C22A6FA44}"/>
               </a:ext>
             </a:extLst>
           </p:cNvPr>
@@ -15891,7 +15694,7 @@
           <p:cNvPr id="3" name="Vertical Text Placeholder 2">
             <a:extLst>
               <a:ext uri="{FF2B5EF4-FFF2-40B4-BE49-F238E27FC236}">
-                <a16:creationId xmlns:a16="http://schemas.microsoft.com/office/drawing/2014/main" xmlns="" id="{81FDF2C2-6BD1-7040-B295-DE11F559EF30}"/>
+                <a16:creationId xmlns:a16="http://schemas.microsoft.com/office/drawing/2014/main" id="{81FDF2C2-6BD1-7040-B295-DE11F559EF30}"/>
               </a:ext>
             </a:extLst>
           </p:cNvPr>
@@ -15948,7 +15751,7 @@
           <p:cNvPr id="4" name="Date Placeholder 3">
             <a:extLst>
               <a:ext uri="{FF2B5EF4-FFF2-40B4-BE49-F238E27FC236}">
-                <a16:creationId xmlns:a16="http://schemas.microsoft.com/office/drawing/2014/main" xmlns="" id="{62F81370-F3EB-7E4A-8AAD-B6BBE169F177}"/>
+                <a16:creationId xmlns:a16="http://schemas.microsoft.com/office/drawing/2014/main" id="{62F81370-F3EB-7E4A-8AAD-B6BBE169F177}"/>
               </a:ext>
             </a:extLst>
           </p:cNvPr>
@@ -15966,7 +15769,7 @@
           <a:p>
             <a:fld id="{855D09F2-5AA6-D542-9273-2F70EC32D14A}" type="datetimeFigureOut">
               <a:rPr lang="en-US" smtClean="0"/>
-              <a:t>4/16/2019</a:t>
+              <a:t>4/17/19</a:t>
             </a:fld>
             <a:endParaRPr lang="en-US"/>
           </a:p>
@@ -15977,7 +15780,7 @@
           <p:cNvPr id="5" name="Footer Placeholder 4">
             <a:extLst>
               <a:ext uri="{FF2B5EF4-FFF2-40B4-BE49-F238E27FC236}">
-                <a16:creationId xmlns:a16="http://schemas.microsoft.com/office/drawing/2014/main" xmlns="" id="{FA73EE9D-2D31-374B-9A06-6317589357EF}"/>
+                <a16:creationId xmlns:a16="http://schemas.microsoft.com/office/drawing/2014/main" id="{FA73EE9D-2D31-374B-9A06-6317589357EF}"/>
               </a:ext>
             </a:extLst>
           </p:cNvPr>
@@ -16002,7 +15805,7 @@
           <p:cNvPr id="6" name="Slide Number Placeholder 5">
             <a:extLst>
               <a:ext uri="{FF2B5EF4-FFF2-40B4-BE49-F238E27FC236}">
-                <a16:creationId xmlns:a16="http://schemas.microsoft.com/office/drawing/2014/main" xmlns="" id="{338FA4B2-CAD0-D84B-A8A4-5709DB348836}"/>
+                <a16:creationId xmlns:a16="http://schemas.microsoft.com/office/drawing/2014/main" id="{338FA4B2-CAD0-D84B-A8A4-5709DB348836}"/>
               </a:ext>
             </a:extLst>
           </p:cNvPr>
@@ -16020,7 +15823,7 @@
           <a:p>
             <a:fld id="{006D2977-72A3-A94F-9FA5-9EB7D3FCC9C4}" type="slidenum">
               <a:rPr lang="en-US" smtClean="0"/>
-              <a:t>‹N°›</a:t>
+              <a:t>‹#›</a:t>
             </a:fld>
             <a:endParaRPr lang="en-US"/>
           </a:p>
@@ -16061,7 +15864,7 @@
           <p:cNvPr id="2" name="Vertical Title 1">
             <a:extLst>
               <a:ext uri="{FF2B5EF4-FFF2-40B4-BE49-F238E27FC236}">
-                <a16:creationId xmlns:a16="http://schemas.microsoft.com/office/drawing/2014/main" xmlns="" id="{BD43BE33-0218-7547-AA02-E3825E073C05}"/>
+                <a16:creationId xmlns:a16="http://schemas.microsoft.com/office/drawing/2014/main" id="{BD43BE33-0218-7547-AA02-E3825E073C05}"/>
               </a:ext>
             </a:extLst>
           </p:cNvPr>
@@ -16094,7 +15897,7 @@
           <p:cNvPr id="3" name="Vertical Text Placeholder 2">
             <a:extLst>
               <a:ext uri="{FF2B5EF4-FFF2-40B4-BE49-F238E27FC236}">
-                <a16:creationId xmlns:a16="http://schemas.microsoft.com/office/drawing/2014/main" xmlns="" id="{FF7B67C3-C54A-1D43-A8F9-7DE28E1D316D}"/>
+                <a16:creationId xmlns:a16="http://schemas.microsoft.com/office/drawing/2014/main" id="{FF7B67C3-C54A-1D43-A8F9-7DE28E1D316D}"/>
               </a:ext>
             </a:extLst>
           </p:cNvPr>
@@ -16156,7 +15959,7 @@
           <p:cNvPr id="4" name="Date Placeholder 3">
             <a:extLst>
               <a:ext uri="{FF2B5EF4-FFF2-40B4-BE49-F238E27FC236}">
-                <a16:creationId xmlns:a16="http://schemas.microsoft.com/office/drawing/2014/main" xmlns="" id="{2D01FAB4-1DEE-054E-93ED-48EB95DFF5F3}"/>
+                <a16:creationId xmlns:a16="http://schemas.microsoft.com/office/drawing/2014/main" id="{2D01FAB4-1DEE-054E-93ED-48EB95DFF5F3}"/>
               </a:ext>
             </a:extLst>
           </p:cNvPr>
@@ -16174,7 +15977,7 @@
           <a:p>
             <a:fld id="{855D09F2-5AA6-D542-9273-2F70EC32D14A}" type="datetimeFigureOut">
               <a:rPr lang="en-US" smtClean="0"/>
-              <a:t>4/16/2019</a:t>
+              <a:t>4/17/19</a:t>
             </a:fld>
             <a:endParaRPr lang="en-US"/>
           </a:p>
@@ -16185,7 +15988,7 @@
           <p:cNvPr id="5" name="Footer Placeholder 4">
             <a:extLst>
               <a:ext uri="{FF2B5EF4-FFF2-40B4-BE49-F238E27FC236}">
-                <a16:creationId xmlns:a16="http://schemas.microsoft.com/office/drawing/2014/main" xmlns="" id="{7962A12E-CD1F-4A40-A3D6-0EF75E921961}"/>
+                <a16:creationId xmlns:a16="http://schemas.microsoft.com/office/drawing/2014/main" id="{7962A12E-CD1F-4A40-A3D6-0EF75E921961}"/>
               </a:ext>
             </a:extLst>
           </p:cNvPr>
@@ -16210,7 +16013,7 @@
           <p:cNvPr id="6" name="Slide Number Placeholder 5">
             <a:extLst>
               <a:ext uri="{FF2B5EF4-FFF2-40B4-BE49-F238E27FC236}">
-                <a16:creationId xmlns:a16="http://schemas.microsoft.com/office/drawing/2014/main" xmlns="" id="{F988E60C-18AF-F14A-A1A9-201DA726615E}"/>
+                <a16:creationId xmlns:a16="http://schemas.microsoft.com/office/drawing/2014/main" id="{F988E60C-18AF-F14A-A1A9-201DA726615E}"/>
               </a:ext>
             </a:extLst>
           </p:cNvPr>
@@ -16228,7 +16031,7 @@
           <a:p>
             <a:fld id="{006D2977-72A3-A94F-9FA5-9EB7D3FCC9C4}" type="slidenum">
               <a:rPr lang="en-US" smtClean="0"/>
-              <a:t>‹N°›</a:t>
+              <a:t>‹#›</a:t>
             </a:fld>
             <a:endParaRPr lang="en-US"/>
           </a:p>
@@ -16269,7 +16072,7 @@
           <p:cNvPr id="2" name="Title 1">
             <a:extLst>
               <a:ext uri="{FF2B5EF4-FFF2-40B4-BE49-F238E27FC236}">
-                <a16:creationId xmlns:a16="http://schemas.microsoft.com/office/drawing/2014/main" xmlns="" id="{5EAE20E8-A5F8-1F4D-ABFD-BA4F9BBBEF8E}"/>
+                <a16:creationId xmlns:a16="http://schemas.microsoft.com/office/drawing/2014/main" id="{5EAE20E8-A5F8-1F4D-ABFD-BA4F9BBBEF8E}"/>
               </a:ext>
             </a:extLst>
           </p:cNvPr>
@@ -16297,7 +16100,7 @@
           <p:cNvPr id="3" name="Content Placeholder 2">
             <a:extLst>
               <a:ext uri="{FF2B5EF4-FFF2-40B4-BE49-F238E27FC236}">
-                <a16:creationId xmlns:a16="http://schemas.microsoft.com/office/drawing/2014/main" xmlns="" id="{D8EB24CC-7F6E-334C-8AA5-B431FDC962D0}"/>
+                <a16:creationId xmlns:a16="http://schemas.microsoft.com/office/drawing/2014/main" id="{D8EB24CC-7F6E-334C-8AA5-B431FDC962D0}"/>
               </a:ext>
             </a:extLst>
           </p:cNvPr>
@@ -16354,7 +16157,7 @@
           <p:cNvPr id="4" name="Date Placeholder 3">
             <a:extLst>
               <a:ext uri="{FF2B5EF4-FFF2-40B4-BE49-F238E27FC236}">
-                <a16:creationId xmlns:a16="http://schemas.microsoft.com/office/drawing/2014/main" xmlns="" id="{19D02DA9-D081-F546-A8B5-F887E85D1C0E}"/>
+                <a16:creationId xmlns:a16="http://schemas.microsoft.com/office/drawing/2014/main" id="{19D02DA9-D081-F546-A8B5-F887E85D1C0E}"/>
               </a:ext>
             </a:extLst>
           </p:cNvPr>
@@ -16372,7 +16175,7 @@
           <a:p>
             <a:fld id="{855D09F2-5AA6-D542-9273-2F70EC32D14A}" type="datetimeFigureOut">
               <a:rPr lang="en-US" smtClean="0"/>
-              <a:t>4/16/2019</a:t>
+              <a:t>4/17/19</a:t>
             </a:fld>
             <a:endParaRPr lang="en-US"/>
           </a:p>
@@ -16383,7 +16186,7 @@
           <p:cNvPr id="5" name="Footer Placeholder 4">
             <a:extLst>
               <a:ext uri="{FF2B5EF4-FFF2-40B4-BE49-F238E27FC236}">
-                <a16:creationId xmlns:a16="http://schemas.microsoft.com/office/drawing/2014/main" xmlns="" id="{A407FCAB-EFDC-3D40-B92F-46D6BFDEE60D}"/>
+                <a16:creationId xmlns:a16="http://schemas.microsoft.com/office/drawing/2014/main" id="{A407FCAB-EFDC-3D40-B92F-46D6BFDEE60D}"/>
               </a:ext>
             </a:extLst>
           </p:cNvPr>
@@ -16408,7 +16211,7 @@
           <p:cNvPr id="6" name="Slide Number Placeholder 5">
             <a:extLst>
               <a:ext uri="{FF2B5EF4-FFF2-40B4-BE49-F238E27FC236}">
-                <a16:creationId xmlns:a16="http://schemas.microsoft.com/office/drawing/2014/main" xmlns="" id="{E73519FC-F500-4042-A481-D09CB44FEE3C}"/>
+                <a16:creationId xmlns:a16="http://schemas.microsoft.com/office/drawing/2014/main" id="{E73519FC-F500-4042-A481-D09CB44FEE3C}"/>
               </a:ext>
             </a:extLst>
           </p:cNvPr>
@@ -16426,7 +16229,7 @@
           <a:p>
             <a:fld id="{006D2977-72A3-A94F-9FA5-9EB7D3FCC9C4}" type="slidenum">
               <a:rPr lang="en-US" smtClean="0"/>
-              <a:t>‹N°›</a:t>
+              <a:t>‹#›</a:t>
             </a:fld>
             <a:endParaRPr lang="en-US"/>
           </a:p>
@@ -16467,7 +16270,7 @@
           <p:cNvPr id="2" name="Title 1">
             <a:extLst>
               <a:ext uri="{FF2B5EF4-FFF2-40B4-BE49-F238E27FC236}">
-                <a16:creationId xmlns:a16="http://schemas.microsoft.com/office/drawing/2014/main" xmlns="" id="{BD3EA63F-89F2-084B-9890-C475553D7341}"/>
+                <a16:creationId xmlns:a16="http://schemas.microsoft.com/office/drawing/2014/main" id="{BD3EA63F-89F2-084B-9890-C475553D7341}"/>
               </a:ext>
             </a:extLst>
           </p:cNvPr>
@@ -16504,7 +16307,7 @@
           <p:cNvPr id="3" name="Text Placeholder 2">
             <a:extLst>
               <a:ext uri="{FF2B5EF4-FFF2-40B4-BE49-F238E27FC236}">
-                <a16:creationId xmlns:a16="http://schemas.microsoft.com/office/drawing/2014/main" xmlns="" id="{E6A2CB1C-B139-8840-BA17-BC8253174130}"/>
+                <a16:creationId xmlns:a16="http://schemas.microsoft.com/office/drawing/2014/main" id="{E6A2CB1C-B139-8840-BA17-BC8253174130}"/>
               </a:ext>
             </a:extLst>
           </p:cNvPr>
@@ -16629,7 +16432,7 @@
           <p:cNvPr id="4" name="Date Placeholder 3">
             <a:extLst>
               <a:ext uri="{FF2B5EF4-FFF2-40B4-BE49-F238E27FC236}">
-                <a16:creationId xmlns:a16="http://schemas.microsoft.com/office/drawing/2014/main" xmlns="" id="{D9B973F1-CC66-CB42-B2E6-495B628DB339}"/>
+                <a16:creationId xmlns:a16="http://schemas.microsoft.com/office/drawing/2014/main" id="{D9B973F1-CC66-CB42-B2E6-495B628DB339}"/>
               </a:ext>
             </a:extLst>
           </p:cNvPr>
@@ -16647,7 +16450,7 @@
           <a:p>
             <a:fld id="{855D09F2-5AA6-D542-9273-2F70EC32D14A}" type="datetimeFigureOut">
               <a:rPr lang="en-US" smtClean="0"/>
-              <a:t>4/16/2019</a:t>
+              <a:t>4/17/19</a:t>
             </a:fld>
             <a:endParaRPr lang="en-US"/>
           </a:p>
@@ -16658,7 +16461,7 @@
           <p:cNvPr id="5" name="Footer Placeholder 4">
             <a:extLst>
               <a:ext uri="{FF2B5EF4-FFF2-40B4-BE49-F238E27FC236}">
-                <a16:creationId xmlns:a16="http://schemas.microsoft.com/office/drawing/2014/main" xmlns="" id="{F4206F81-B0B1-0A4B-AA09-E3A6F566B53C}"/>
+                <a16:creationId xmlns:a16="http://schemas.microsoft.com/office/drawing/2014/main" id="{F4206F81-B0B1-0A4B-AA09-E3A6F566B53C}"/>
               </a:ext>
             </a:extLst>
           </p:cNvPr>
@@ -16683,7 +16486,7 @@
           <p:cNvPr id="6" name="Slide Number Placeholder 5">
             <a:extLst>
               <a:ext uri="{FF2B5EF4-FFF2-40B4-BE49-F238E27FC236}">
-                <a16:creationId xmlns:a16="http://schemas.microsoft.com/office/drawing/2014/main" xmlns="" id="{7B5C4C80-0043-A649-8F95-7DF55607C09A}"/>
+                <a16:creationId xmlns:a16="http://schemas.microsoft.com/office/drawing/2014/main" id="{7B5C4C80-0043-A649-8F95-7DF55607C09A}"/>
               </a:ext>
             </a:extLst>
           </p:cNvPr>
@@ -16701,7 +16504,7 @@
           <a:p>
             <a:fld id="{006D2977-72A3-A94F-9FA5-9EB7D3FCC9C4}" type="slidenum">
               <a:rPr lang="en-US" smtClean="0"/>
-              <a:t>‹N°›</a:t>
+              <a:t>‹#›</a:t>
             </a:fld>
             <a:endParaRPr lang="en-US"/>
           </a:p>
@@ -16742,7 +16545,7 @@
           <p:cNvPr id="2" name="Title 1">
             <a:extLst>
               <a:ext uri="{FF2B5EF4-FFF2-40B4-BE49-F238E27FC236}">
-                <a16:creationId xmlns:a16="http://schemas.microsoft.com/office/drawing/2014/main" xmlns="" id="{D42B41BE-FA0C-5948-9A2D-AA221BD7A1FD}"/>
+                <a16:creationId xmlns:a16="http://schemas.microsoft.com/office/drawing/2014/main" id="{D42B41BE-FA0C-5948-9A2D-AA221BD7A1FD}"/>
               </a:ext>
             </a:extLst>
           </p:cNvPr>
@@ -16770,7 +16573,7 @@
           <p:cNvPr id="3" name="Content Placeholder 2">
             <a:extLst>
               <a:ext uri="{FF2B5EF4-FFF2-40B4-BE49-F238E27FC236}">
-                <a16:creationId xmlns:a16="http://schemas.microsoft.com/office/drawing/2014/main" xmlns="" id="{B059FFA5-5463-0246-B903-E71D59A3AAF1}"/>
+                <a16:creationId xmlns:a16="http://schemas.microsoft.com/office/drawing/2014/main" id="{B059FFA5-5463-0246-B903-E71D59A3AAF1}"/>
               </a:ext>
             </a:extLst>
           </p:cNvPr>
@@ -16832,7 +16635,7 @@
           <p:cNvPr id="4" name="Content Placeholder 3">
             <a:extLst>
               <a:ext uri="{FF2B5EF4-FFF2-40B4-BE49-F238E27FC236}">
-                <a16:creationId xmlns:a16="http://schemas.microsoft.com/office/drawing/2014/main" xmlns="" id="{06F35F2D-455D-F244-AADF-5D9F0FDD7D88}"/>
+                <a16:creationId xmlns:a16="http://schemas.microsoft.com/office/drawing/2014/main" id="{06F35F2D-455D-F244-AADF-5D9F0FDD7D88}"/>
               </a:ext>
             </a:extLst>
           </p:cNvPr>
@@ -16894,7 +16697,7 @@
           <p:cNvPr id="5" name="Date Placeholder 4">
             <a:extLst>
               <a:ext uri="{FF2B5EF4-FFF2-40B4-BE49-F238E27FC236}">
-                <a16:creationId xmlns:a16="http://schemas.microsoft.com/office/drawing/2014/main" xmlns="" id="{79DC45E4-832A-3444-A464-5D938D33D751}"/>
+                <a16:creationId xmlns:a16="http://schemas.microsoft.com/office/drawing/2014/main" id="{79DC45E4-832A-3444-A464-5D938D33D751}"/>
               </a:ext>
             </a:extLst>
           </p:cNvPr>
@@ -16912,7 +16715,7 @@
           <a:p>
             <a:fld id="{855D09F2-5AA6-D542-9273-2F70EC32D14A}" type="datetimeFigureOut">
               <a:rPr lang="en-US" smtClean="0"/>
-              <a:t>4/16/2019</a:t>
+              <a:t>4/17/19</a:t>
             </a:fld>
             <a:endParaRPr lang="en-US"/>
           </a:p>
@@ -16923,7 +16726,7 @@
           <p:cNvPr id="6" name="Footer Placeholder 5">
             <a:extLst>
               <a:ext uri="{FF2B5EF4-FFF2-40B4-BE49-F238E27FC236}">
-                <a16:creationId xmlns:a16="http://schemas.microsoft.com/office/drawing/2014/main" xmlns="" id="{FD603F8B-B4B9-3F43-A997-2820AEAF956B}"/>
+                <a16:creationId xmlns:a16="http://schemas.microsoft.com/office/drawing/2014/main" id="{FD603F8B-B4B9-3F43-A997-2820AEAF956B}"/>
               </a:ext>
             </a:extLst>
           </p:cNvPr>
@@ -16948,7 +16751,7 @@
           <p:cNvPr id="7" name="Slide Number Placeholder 6">
             <a:extLst>
               <a:ext uri="{FF2B5EF4-FFF2-40B4-BE49-F238E27FC236}">
-                <a16:creationId xmlns:a16="http://schemas.microsoft.com/office/drawing/2014/main" xmlns="" id="{C7920A71-CE3D-1D48-AF31-937500C1B746}"/>
+                <a16:creationId xmlns:a16="http://schemas.microsoft.com/office/drawing/2014/main" id="{C7920A71-CE3D-1D48-AF31-937500C1B746}"/>
               </a:ext>
             </a:extLst>
           </p:cNvPr>
@@ -16966,7 +16769,7 @@
           <a:p>
             <a:fld id="{006D2977-72A3-A94F-9FA5-9EB7D3FCC9C4}" type="slidenum">
               <a:rPr lang="en-US" smtClean="0"/>
-              <a:t>‹N°›</a:t>
+              <a:t>‹#›</a:t>
             </a:fld>
             <a:endParaRPr lang="en-US"/>
           </a:p>
@@ -17007,7 +16810,7 @@
           <p:cNvPr id="2" name="Title 1">
             <a:extLst>
               <a:ext uri="{FF2B5EF4-FFF2-40B4-BE49-F238E27FC236}">
-                <a16:creationId xmlns:a16="http://schemas.microsoft.com/office/drawing/2014/main" xmlns="" id="{36A235E2-B2B9-A94E-9DEF-5EECBAC9F48A}"/>
+                <a16:creationId xmlns:a16="http://schemas.microsoft.com/office/drawing/2014/main" id="{36A235E2-B2B9-A94E-9DEF-5EECBAC9F48A}"/>
               </a:ext>
             </a:extLst>
           </p:cNvPr>
@@ -17040,7 +16843,7 @@
           <p:cNvPr id="3" name="Text Placeholder 2">
             <a:extLst>
               <a:ext uri="{FF2B5EF4-FFF2-40B4-BE49-F238E27FC236}">
-                <a16:creationId xmlns:a16="http://schemas.microsoft.com/office/drawing/2014/main" xmlns="" id="{68DFA3EF-E0FB-1B4B-B6B5-6C6CC09A9A5D}"/>
+                <a16:creationId xmlns:a16="http://schemas.microsoft.com/office/drawing/2014/main" id="{68DFA3EF-E0FB-1B4B-B6B5-6C6CC09A9A5D}"/>
               </a:ext>
             </a:extLst>
           </p:cNvPr>
@@ -17111,7 +16914,7 @@
           <p:cNvPr id="4" name="Content Placeholder 3">
             <a:extLst>
               <a:ext uri="{FF2B5EF4-FFF2-40B4-BE49-F238E27FC236}">
-                <a16:creationId xmlns:a16="http://schemas.microsoft.com/office/drawing/2014/main" xmlns="" id="{948AB3C8-691A-9D47-B4AF-5453BB418DD3}"/>
+                <a16:creationId xmlns:a16="http://schemas.microsoft.com/office/drawing/2014/main" id="{948AB3C8-691A-9D47-B4AF-5453BB418DD3}"/>
               </a:ext>
             </a:extLst>
           </p:cNvPr>
@@ -17173,7 +16976,7 @@
           <p:cNvPr id="5" name="Text Placeholder 4">
             <a:extLst>
               <a:ext uri="{FF2B5EF4-FFF2-40B4-BE49-F238E27FC236}">
-                <a16:creationId xmlns:a16="http://schemas.microsoft.com/office/drawing/2014/main" xmlns="" id="{6D6B8A08-1C5C-9048-A32F-9FA0AE290FE5}"/>
+                <a16:creationId xmlns:a16="http://schemas.microsoft.com/office/drawing/2014/main" id="{6D6B8A08-1C5C-9048-A32F-9FA0AE290FE5}"/>
               </a:ext>
             </a:extLst>
           </p:cNvPr>
@@ -17244,7 +17047,7 @@
           <p:cNvPr id="6" name="Content Placeholder 5">
             <a:extLst>
               <a:ext uri="{FF2B5EF4-FFF2-40B4-BE49-F238E27FC236}">
-                <a16:creationId xmlns:a16="http://schemas.microsoft.com/office/drawing/2014/main" xmlns="" id="{3B2C9603-C9B1-9340-A057-D5B3A68EB0AB}"/>
+                <a16:creationId xmlns:a16="http://schemas.microsoft.com/office/drawing/2014/main" id="{3B2C9603-C9B1-9340-A057-D5B3A68EB0AB}"/>
               </a:ext>
             </a:extLst>
           </p:cNvPr>
@@ -17306,7 +17109,7 @@
           <p:cNvPr id="7" name="Date Placeholder 6">
             <a:extLst>
               <a:ext uri="{FF2B5EF4-FFF2-40B4-BE49-F238E27FC236}">
-                <a16:creationId xmlns:a16="http://schemas.microsoft.com/office/drawing/2014/main" xmlns="" id="{4B9C1A12-F07A-FD4E-8D32-88E22A745997}"/>
+                <a16:creationId xmlns:a16="http://schemas.microsoft.com/office/drawing/2014/main" id="{4B9C1A12-F07A-FD4E-8D32-88E22A745997}"/>
               </a:ext>
             </a:extLst>
           </p:cNvPr>
@@ -17324,7 +17127,7 @@
           <a:p>
             <a:fld id="{855D09F2-5AA6-D542-9273-2F70EC32D14A}" type="datetimeFigureOut">
               <a:rPr lang="en-US" smtClean="0"/>
-              <a:t>4/16/2019</a:t>
+              <a:t>4/17/19</a:t>
             </a:fld>
             <a:endParaRPr lang="en-US"/>
           </a:p>
@@ -17335,7 +17138,7 @@
           <p:cNvPr id="8" name="Footer Placeholder 7">
             <a:extLst>
               <a:ext uri="{FF2B5EF4-FFF2-40B4-BE49-F238E27FC236}">
-                <a16:creationId xmlns:a16="http://schemas.microsoft.com/office/drawing/2014/main" xmlns="" id="{8AC954DA-CFA4-6C4F-899B-16B4048D4075}"/>
+                <a16:creationId xmlns:a16="http://schemas.microsoft.com/office/drawing/2014/main" id="{8AC954DA-CFA4-6C4F-899B-16B4048D4075}"/>
               </a:ext>
             </a:extLst>
           </p:cNvPr>
@@ -17360,7 +17163,7 @@
           <p:cNvPr id="9" name="Slide Number Placeholder 8">
             <a:extLst>
               <a:ext uri="{FF2B5EF4-FFF2-40B4-BE49-F238E27FC236}">
-                <a16:creationId xmlns:a16="http://schemas.microsoft.com/office/drawing/2014/main" xmlns="" id="{D2B6F33D-B39B-8E4A-815B-97E5D9170AAD}"/>
+                <a16:creationId xmlns:a16="http://schemas.microsoft.com/office/drawing/2014/main" id="{D2B6F33D-B39B-8E4A-815B-97E5D9170AAD}"/>
               </a:ext>
             </a:extLst>
           </p:cNvPr>
@@ -17378,7 +17181,7 @@
           <a:p>
             <a:fld id="{006D2977-72A3-A94F-9FA5-9EB7D3FCC9C4}" type="slidenum">
               <a:rPr lang="en-US" smtClean="0"/>
-              <a:t>‹N°›</a:t>
+              <a:t>‹#›</a:t>
             </a:fld>
             <a:endParaRPr lang="en-US"/>
           </a:p>
@@ -17419,7 +17222,7 @@
           <p:cNvPr id="2" name="Title 1">
             <a:extLst>
               <a:ext uri="{FF2B5EF4-FFF2-40B4-BE49-F238E27FC236}">
-                <a16:creationId xmlns:a16="http://schemas.microsoft.com/office/drawing/2014/main" xmlns="" id="{8EAF7062-00A4-9E4B-9329-E5835B91139B}"/>
+                <a16:creationId xmlns:a16="http://schemas.microsoft.com/office/drawing/2014/main" id="{8EAF7062-00A4-9E4B-9329-E5835B91139B}"/>
               </a:ext>
             </a:extLst>
           </p:cNvPr>
@@ -17447,7 +17250,7 @@
           <p:cNvPr id="3" name="Date Placeholder 2">
             <a:extLst>
               <a:ext uri="{FF2B5EF4-FFF2-40B4-BE49-F238E27FC236}">
-                <a16:creationId xmlns:a16="http://schemas.microsoft.com/office/drawing/2014/main" xmlns="" id="{8A8BD1A1-5E78-A54B-B57D-FD75985A4340}"/>
+                <a16:creationId xmlns:a16="http://schemas.microsoft.com/office/drawing/2014/main" id="{8A8BD1A1-5E78-A54B-B57D-FD75985A4340}"/>
               </a:ext>
             </a:extLst>
           </p:cNvPr>
@@ -17465,7 +17268,7 @@
           <a:p>
             <a:fld id="{855D09F2-5AA6-D542-9273-2F70EC32D14A}" type="datetimeFigureOut">
               <a:rPr lang="en-US" smtClean="0"/>
-              <a:t>4/16/2019</a:t>
+              <a:t>4/17/19</a:t>
             </a:fld>
             <a:endParaRPr lang="en-US"/>
           </a:p>
@@ -17476,7 +17279,7 @@
           <p:cNvPr id="4" name="Footer Placeholder 3">
             <a:extLst>
               <a:ext uri="{FF2B5EF4-FFF2-40B4-BE49-F238E27FC236}">
-                <a16:creationId xmlns:a16="http://schemas.microsoft.com/office/drawing/2014/main" xmlns="" id="{25A29280-A476-3842-AF73-295789057E54}"/>
+                <a16:creationId xmlns:a16="http://schemas.microsoft.com/office/drawing/2014/main" id="{25A29280-A476-3842-AF73-295789057E54}"/>
               </a:ext>
             </a:extLst>
           </p:cNvPr>
@@ -17501,7 +17304,7 @@
           <p:cNvPr id="5" name="Slide Number Placeholder 4">
             <a:extLst>
               <a:ext uri="{FF2B5EF4-FFF2-40B4-BE49-F238E27FC236}">
-                <a16:creationId xmlns:a16="http://schemas.microsoft.com/office/drawing/2014/main" xmlns="" id="{E6608E4C-06E5-F348-9BAC-332BABEC794A}"/>
+                <a16:creationId xmlns:a16="http://schemas.microsoft.com/office/drawing/2014/main" id="{E6608E4C-06E5-F348-9BAC-332BABEC794A}"/>
               </a:ext>
             </a:extLst>
           </p:cNvPr>
@@ -17519,7 +17322,7 @@
           <a:p>
             <a:fld id="{006D2977-72A3-A94F-9FA5-9EB7D3FCC9C4}" type="slidenum">
               <a:rPr lang="en-US" smtClean="0"/>
-              <a:t>‹N°›</a:t>
+              <a:t>‹#›</a:t>
             </a:fld>
             <a:endParaRPr lang="en-US"/>
           </a:p>
@@ -17560,7 +17363,7 @@
           <p:cNvPr id="2" name="Date Placeholder 1">
             <a:extLst>
               <a:ext uri="{FF2B5EF4-FFF2-40B4-BE49-F238E27FC236}">
-                <a16:creationId xmlns:a16="http://schemas.microsoft.com/office/drawing/2014/main" xmlns="" id="{CDB46442-5299-A44A-B323-AAB1D31B82E2}"/>
+                <a16:creationId xmlns:a16="http://schemas.microsoft.com/office/drawing/2014/main" id="{CDB46442-5299-A44A-B323-AAB1D31B82E2}"/>
               </a:ext>
             </a:extLst>
           </p:cNvPr>
@@ -17578,7 +17381,7 @@
           <a:p>
             <a:fld id="{855D09F2-5AA6-D542-9273-2F70EC32D14A}" type="datetimeFigureOut">
               <a:rPr lang="en-US" smtClean="0"/>
-              <a:t>4/16/2019</a:t>
+              <a:t>4/17/19</a:t>
             </a:fld>
             <a:endParaRPr lang="en-US"/>
           </a:p>
@@ -17589,7 +17392,7 @@
           <p:cNvPr id="3" name="Footer Placeholder 2">
             <a:extLst>
               <a:ext uri="{FF2B5EF4-FFF2-40B4-BE49-F238E27FC236}">
-                <a16:creationId xmlns:a16="http://schemas.microsoft.com/office/drawing/2014/main" xmlns="" id="{0212C444-73BE-FD46-A077-64E53475E622}"/>
+                <a16:creationId xmlns:a16="http://schemas.microsoft.com/office/drawing/2014/main" id="{0212C444-73BE-FD46-A077-64E53475E622}"/>
               </a:ext>
             </a:extLst>
           </p:cNvPr>
@@ -17614,7 +17417,7 @@
           <p:cNvPr id="4" name="Slide Number Placeholder 3">
             <a:extLst>
               <a:ext uri="{FF2B5EF4-FFF2-40B4-BE49-F238E27FC236}">
-                <a16:creationId xmlns:a16="http://schemas.microsoft.com/office/drawing/2014/main" xmlns="" id="{C3AF8E96-CDF8-7A47-BFDC-1C034295E314}"/>
+                <a16:creationId xmlns:a16="http://schemas.microsoft.com/office/drawing/2014/main" id="{C3AF8E96-CDF8-7A47-BFDC-1C034295E314}"/>
               </a:ext>
             </a:extLst>
           </p:cNvPr>
@@ -17632,7 +17435,7 @@
           <a:p>
             <a:fld id="{006D2977-72A3-A94F-9FA5-9EB7D3FCC9C4}" type="slidenum">
               <a:rPr lang="en-US" smtClean="0"/>
-              <a:t>‹N°›</a:t>
+              <a:t>‹#›</a:t>
             </a:fld>
             <a:endParaRPr lang="en-US"/>
           </a:p>
@@ -17673,7 +17476,7 @@
           <p:cNvPr id="2" name="Title 1">
             <a:extLst>
               <a:ext uri="{FF2B5EF4-FFF2-40B4-BE49-F238E27FC236}">
-                <a16:creationId xmlns:a16="http://schemas.microsoft.com/office/drawing/2014/main" xmlns="" id="{DA1731B2-921D-3D4B-9559-D67B8BDE0D53}"/>
+                <a16:creationId xmlns:a16="http://schemas.microsoft.com/office/drawing/2014/main" id="{DA1731B2-921D-3D4B-9559-D67B8BDE0D53}"/>
               </a:ext>
             </a:extLst>
           </p:cNvPr>
@@ -17710,7 +17513,7 @@
           <p:cNvPr id="3" name="Content Placeholder 2">
             <a:extLst>
               <a:ext uri="{FF2B5EF4-FFF2-40B4-BE49-F238E27FC236}">
-                <a16:creationId xmlns:a16="http://schemas.microsoft.com/office/drawing/2014/main" xmlns="" id="{9929390E-6A73-7343-897F-5E511B650BC2}"/>
+                <a16:creationId xmlns:a16="http://schemas.microsoft.com/office/drawing/2014/main" id="{9929390E-6A73-7343-897F-5E511B650BC2}"/>
               </a:ext>
             </a:extLst>
           </p:cNvPr>
@@ -17800,7 +17603,7 @@
           <p:cNvPr id="4" name="Text Placeholder 3">
             <a:extLst>
               <a:ext uri="{FF2B5EF4-FFF2-40B4-BE49-F238E27FC236}">
-                <a16:creationId xmlns:a16="http://schemas.microsoft.com/office/drawing/2014/main" xmlns="" id="{A7AE0420-CBB4-C247-A7D3-07DB3F7ACEB0}"/>
+                <a16:creationId xmlns:a16="http://schemas.microsoft.com/office/drawing/2014/main" id="{A7AE0420-CBB4-C247-A7D3-07DB3F7ACEB0}"/>
               </a:ext>
             </a:extLst>
           </p:cNvPr>
@@ -17871,7 +17674,7 @@
           <p:cNvPr id="5" name="Date Placeholder 4">
             <a:extLst>
               <a:ext uri="{FF2B5EF4-FFF2-40B4-BE49-F238E27FC236}">
-                <a16:creationId xmlns:a16="http://schemas.microsoft.com/office/drawing/2014/main" xmlns="" id="{E0DA5A61-D96A-CC48-97EF-205039F833A0}"/>
+                <a16:creationId xmlns:a16="http://schemas.microsoft.com/office/drawing/2014/main" id="{E0DA5A61-D96A-CC48-97EF-205039F833A0}"/>
               </a:ext>
             </a:extLst>
           </p:cNvPr>
@@ -17889,7 +17692,7 @@
           <a:p>
             <a:fld id="{855D09F2-5AA6-D542-9273-2F70EC32D14A}" type="datetimeFigureOut">
               <a:rPr lang="en-US" smtClean="0"/>
-              <a:t>4/16/2019</a:t>
+              <a:t>4/17/19</a:t>
             </a:fld>
             <a:endParaRPr lang="en-US"/>
           </a:p>
@@ -17900,7 +17703,7 @@
           <p:cNvPr id="6" name="Footer Placeholder 5">
             <a:extLst>
               <a:ext uri="{FF2B5EF4-FFF2-40B4-BE49-F238E27FC236}">
-                <a16:creationId xmlns:a16="http://schemas.microsoft.com/office/drawing/2014/main" xmlns="" id="{B98B452A-EC84-7149-A9CE-EBE7B0363AAB}"/>
+                <a16:creationId xmlns:a16="http://schemas.microsoft.com/office/drawing/2014/main" id="{B98B452A-EC84-7149-A9CE-EBE7B0363AAB}"/>
               </a:ext>
             </a:extLst>
           </p:cNvPr>
@@ -17925,7 +17728,7 @@
           <p:cNvPr id="7" name="Slide Number Placeholder 6">
             <a:extLst>
               <a:ext uri="{FF2B5EF4-FFF2-40B4-BE49-F238E27FC236}">
-                <a16:creationId xmlns:a16="http://schemas.microsoft.com/office/drawing/2014/main" xmlns="" id="{71AF7692-E101-1549-A03A-3AAF9DEF9814}"/>
+                <a16:creationId xmlns:a16="http://schemas.microsoft.com/office/drawing/2014/main" id="{71AF7692-E101-1549-A03A-3AAF9DEF9814}"/>
               </a:ext>
             </a:extLst>
           </p:cNvPr>
@@ -17943,7 +17746,7 @@
           <a:p>
             <a:fld id="{006D2977-72A3-A94F-9FA5-9EB7D3FCC9C4}" type="slidenum">
               <a:rPr lang="en-US" smtClean="0"/>
-              <a:t>‹N°›</a:t>
+              <a:t>‹#›</a:t>
             </a:fld>
             <a:endParaRPr lang="en-US"/>
           </a:p>
@@ -17984,7 +17787,7 @@
           <p:cNvPr id="2" name="Title 1">
             <a:extLst>
               <a:ext uri="{FF2B5EF4-FFF2-40B4-BE49-F238E27FC236}">
-                <a16:creationId xmlns:a16="http://schemas.microsoft.com/office/drawing/2014/main" xmlns="" id="{1415BE1F-4EA4-E94D-A508-ED6C2F90EC8F}"/>
+                <a16:creationId xmlns:a16="http://schemas.microsoft.com/office/drawing/2014/main" id="{1415BE1F-4EA4-E94D-A508-ED6C2F90EC8F}"/>
               </a:ext>
             </a:extLst>
           </p:cNvPr>
@@ -18021,7 +17824,7 @@
           <p:cNvPr id="3" name="Picture Placeholder 2">
             <a:extLst>
               <a:ext uri="{FF2B5EF4-FFF2-40B4-BE49-F238E27FC236}">
-                <a16:creationId xmlns:a16="http://schemas.microsoft.com/office/drawing/2014/main" xmlns="" id="{F2A99561-4666-D145-97BA-816108E938A0}"/>
+                <a16:creationId xmlns:a16="http://schemas.microsoft.com/office/drawing/2014/main" id="{F2A99561-4666-D145-97BA-816108E938A0}"/>
               </a:ext>
             </a:extLst>
           </p:cNvPr>
@@ -18088,7 +17891,7 @@
           <p:cNvPr id="4" name="Text Placeholder 3">
             <a:extLst>
               <a:ext uri="{FF2B5EF4-FFF2-40B4-BE49-F238E27FC236}">
-                <a16:creationId xmlns:a16="http://schemas.microsoft.com/office/drawing/2014/main" xmlns="" id="{81A9FF21-5F5C-BA40-8089-A47B120358D9}"/>
+                <a16:creationId xmlns:a16="http://schemas.microsoft.com/office/drawing/2014/main" id="{81A9FF21-5F5C-BA40-8089-A47B120358D9}"/>
               </a:ext>
             </a:extLst>
           </p:cNvPr>
@@ -18159,7 +17962,7 @@
           <p:cNvPr id="5" name="Date Placeholder 4">
             <a:extLst>
               <a:ext uri="{FF2B5EF4-FFF2-40B4-BE49-F238E27FC236}">
-                <a16:creationId xmlns:a16="http://schemas.microsoft.com/office/drawing/2014/main" xmlns="" id="{3E215C4B-6233-9E4D-BC0A-BA1BB6567CE6}"/>
+                <a16:creationId xmlns:a16="http://schemas.microsoft.com/office/drawing/2014/main" id="{3E215C4B-6233-9E4D-BC0A-BA1BB6567CE6}"/>
               </a:ext>
             </a:extLst>
           </p:cNvPr>
@@ -18177,7 +17980,7 @@
           <a:p>
             <a:fld id="{855D09F2-5AA6-D542-9273-2F70EC32D14A}" type="datetimeFigureOut">
               <a:rPr lang="en-US" smtClean="0"/>
-              <a:t>4/16/2019</a:t>
+              <a:t>4/17/19</a:t>
             </a:fld>
             <a:endParaRPr lang="en-US"/>
           </a:p>
@@ -18188,7 +17991,7 @@
           <p:cNvPr id="6" name="Footer Placeholder 5">
             <a:extLst>
               <a:ext uri="{FF2B5EF4-FFF2-40B4-BE49-F238E27FC236}">
-                <a16:creationId xmlns:a16="http://schemas.microsoft.com/office/drawing/2014/main" xmlns="" id="{3B3562BF-818D-FA4C-94CB-7A969095C288}"/>
+                <a16:creationId xmlns:a16="http://schemas.microsoft.com/office/drawing/2014/main" id="{3B3562BF-818D-FA4C-94CB-7A969095C288}"/>
               </a:ext>
             </a:extLst>
           </p:cNvPr>
@@ -18213,7 +18016,7 @@
           <p:cNvPr id="7" name="Slide Number Placeholder 6">
             <a:extLst>
               <a:ext uri="{FF2B5EF4-FFF2-40B4-BE49-F238E27FC236}">
-                <a16:creationId xmlns:a16="http://schemas.microsoft.com/office/drawing/2014/main" xmlns="" id="{CAEDE3B9-4EC8-B74C-A807-90C462548DFB}"/>
+                <a16:creationId xmlns:a16="http://schemas.microsoft.com/office/drawing/2014/main" id="{CAEDE3B9-4EC8-B74C-A807-90C462548DFB}"/>
               </a:ext>
             </a:extLst>
           </p:cNvPr>
@@ -18231,7 +18034,7 @@
           <a:p>
             <a:fld id="{006D2977-72A3-A94F-9FA5-9EB7D3FCC9C4}" type="slidenum">
               <a:rPr lang="en-US" smtClean="0"/>
-              <a:t>‹N°›</a:t>
+              <a:t>‹#›</a:t>
             </a:fld>
             <a:endParaRPr lang="en-US"/>
           </a:p>
@@ -18277,7 +18080,7 @@
           <p:cNvPr id="2" name="Title Placeholder 1">
             <a:extLst>
               <a:ext uri="{FF2B5EF4-FFF2-40B4-BE49-F238E27FC236}">
-                <a16:creationId xmlns:a16="http://schemas.microsoft.com/office/drawing/2014/main" xmlns="" id="{73D63FAA-0DA7-284A-9EC2-096040208074}"/>
+                <a16:creationId xmlns:a16="http://schemas.microsoft.com/office/drawing/2014/main" id="{73D63FAA-0DA7-284A-9EC2-096040208074}"/>
               </a:ext>
             </a:extLst>
           </p:cNvPr>
@@ -18315,7 +18118,7 @@
           <p:cNvPr id="3" name="Text Placeholder 2">
             <a:extLst>
               <a:ext uri="{FF2B5EF4-FFF2-40B4-BE49-F238E27FC236}">
-                <a16:creationId xmlns:a16="http://schemas.microsoft.com/office/drawing/2014/main" xmlns="" id="{654C417A-4987-E44D-9033-A854D8752004}"/>
+                <a16:creationId xmlns:a16="http://schemas.microsoft.com/office/drawing/2014/main" id="{654C417A-4987-E44D-9033-A854D8752004}"/>
               </a:ext>
             </a:extLst>
           </p:cNvPr>
@@ -18382,7 +18185,7 @@
           <p:cNvPr id="4" name="Date Placeholder 3">
             <a:extLst>
               <a:ext uri="{FF2B5EF4-FFF2-40B4-BE49-F238E27FC236}">
-                <a16:creationId xmlns:a16="http://schemas.microsoft.com/office/drawing/2014/main" xmlns="" id="{21CD0D57-BA1A-DB4A-9848-DCF34C7FD0A6}"/>
+                <a16:creationId xmlns:a16="http://schemas.microsoft.com/office/drawing/2014/main" id="{21CD0D57-BA1A-DB4A-9848-DCF34C7FD0A6}"/>
               </a:ext>
             </a:extLst>
           </p:cNvPr>
@@ -18418,7 +18221,7 @@
           <a:p>
             <a:fld id="{855D09F2-5AA6-D542-9273-2F70EC32D14A}" type="datetimeFigureOut">
               <a:rPr lang="en-US" smtClean="0"/>
-              <a:t>4/16/2019</a:t>
+              <a:t>4/17/19</a:t>
             </a:fld>
             <a:endParaRPr lang="en-US"/>
           </a:p>
@@ -18429,7 +18232,7 @@
           <p:cNvPr id="5" name="Footer Placeholder 4">
             <a:extLst>
               <a:ext uri="{FF2B5EF4-FFF2-40B4-BE49-F238E27FC236}">
-                <a16:creationId xmlns:a16="http://schemas.microsoft.com/office/drawing/2014/main" xmlns="" id="{821BA7BE-941F-884C-8247-1781444DCC07}"/>
+                <a16:creationId xmlns:a16="http://schemas.microsoft.com/office/drawing/2014/main" id="{821BA7BE-941F-884C-8247-1781444DCC07}"/>
               </a:ext>
             </a:extLst>
           </p:cNvPr>
@@ -18472,7 +18275,7 @@
           <p:cNvPr id="6" name="Slide Number Placeholder 5">
             <a:extLst>
               <a:ext uri="{FF2B5EF4-FFF2-40B4-BE49-F238E27FC236}">
-                <a16:creationId xmlns:a16="http://schemas.microsoft.com/office/drawing/2014/main" xmlns="" id="{160CE297-9649-6448-8546-61992A984751}"/>
+                <a16:creationId xmlns:a16="http://schemas.microsoft.com/office/drawing/2014/main" id="{160CE297-9649-6448-8546-61992A984751}"/>
               </a:ext>
             </a:extLst>
           </p:cNvPr>
@@ -18508,7 +18311,7 @@
           <a:p>
             <a:fld id="{006D2977-72A3-A94F-9FA5-9EB7D3FCC9C4}" type="slidenum">
               <a:rPr lang="en-US" smtClean="0"/>
-              <a:t>‹N°›</a:t>
+              <a:t>‹#›</a:t>
             </a:fld>
             <a:endParaRPr lang="en-US"/>
           </a:p>
@@ -18848,10 +18651,10 @@
           <p:cNvPr id="10" name="Rectangle 9">
             <a:extLst>
               <a:ext uri="{FF2B5EF4-FFF2-40B4-BE49-F238E27FC236}">
-                <a16:creationId xmlns:a16="http://schemas.microsoft.com/office/drawing/2014/main" xmlns="" id="{25168E7B-6D42-4B3A-B7A1-17D4C49EC903}"/>
+                <a16:creationId xmlns:a16="http://schemas.microsoft.com/office/drawing/2014/main" id="{25168E7B-6D42-4B3A-B7A1-17D4C49EC903}"/>
               </a:ext>
               <a:ext uri="{C183D7F6-B498-43B3-948B-1728B52AA6E4}">
-                <adec:decorative xmlns:adec="http://schemas.microsoft.com/office/drawing/2017/decorative" xmlns="" val="1"/>
+                <adec:decorative xmlns:adec="http://schemas.microsoft.com/office/drawing/2017/decorative" val="1"/>
               </a:ext>
             </a:extLst>
           </p:cNvPr>
@@ -18861,7 +18664,7 @@
           <p:nvPr>
             <p:extLst>
               <p:ext uri="{386F3935-93C4-4BCD-93E2-E3B085C9AB24}">
-                <p16:designElem xmlns:p16="http://schemas.microsoft.com/office/powerpoint/2015/main" xmlns="" val="1"/>
+                <p16:designElem xmlns:p16="http://schemas.microsoft.com/office/powerpoint/2015/main" val="1"/>
               </p:ext>
             </p:extLst>
           </p:nvPr>
@@ -18933,10 +18736,10 @@
           <p:cNvPr id="12" name="Picture 11">
             <a:extLst>
               <a:ext uri="{FF2B5EF4-FFF2-40B4-BE49-F238E27FC236}">
-                <a16:creationId xmlns:a16="http://schemas.microsoft.com/office/drawing/2014/main" xmlns="" id="{98A030C2-9F23-4593-9F99-7B73C232A4C9}"/>
+                <a16:creationId xmlns:a16="http://schemas.microsoft.com/office/drawing/2014/main" id="{98A030C2-9F23-4593-9F99-7B73C232A4C9}"/>
               </a:ext>
               <a:ext uri="{C183D7F6-B498-43B3-948B-1728B52AA6E4}">
-                <adec:decorative xmlns:adec="http://schemas.microsoft.com/office/drawing/2017/decorative" xmlns="" val="1"/>
+                <adec:decorative xmlns:adec="http://schemas.microsoft.com/office/drawing/2017/decorative" val="1"/>
               </a:ext>
             </a:extLst>
           </p:cNvPr>
@@ -18946,7 +18749,7 @@
           <p:nvPr>
             <p:extLst>
               <p:ext uri="{386F3935-93C4-4BCD-93E2-E3B085C9AB24}">
-                <p16:designElem xmlns:p16="http://schemas.microsoft.com/office/powerpoint/2015/main" xmlns="" val="1"/>
+                <p16:designElem xmlns:p16="http://schemas.microsoft.com/office/powerpoint/2015/main" val="1"/>
               </p:ext>
             </p:extLst>
           </p:nvPr>
@@ -18978,7 +18781,7 @@
           <p:cNvPr id="2" name="Title 1">
             <a:extLst>
               <a:ext uri="{FF2B5EF4-FFF2-40B4-BE49-F238E27FC236}">
-                <a16:creationId xmlns:a16="http://schemas.microsoft.com/office/drawing/2014/main" xmlns="" id="{979451DB-A8DC-194F-8BC3-68E815869ADA}"/>
+                <a16:creationId xmlns:a16="http://schemas.microsoft.com/office/drawing/2014/main" id="{979451DB-A8DC-194F-8BC3-68E815869ADA}"/>
               </a:ext>
             </a:extLst>
           </p:cNvPr>
@@ -19022,7 +18825,7 @@
           <p:cNvPr id="8" name="Picture 2" descr="https://lh6.googleusercontent.com/o-zD3gg3ajvak73M3tIgSa37WGMmigpo988VwPz8pSJBDBvuXH5Rtf-BffEU8IXtAKwYUD8W2I4Xn-WRyfQnGjliPblaizdA8Ug-BvozLLP_CdvBhnr8wRhX6OgDDs0C_3joz4XDm_ANp7-D9w">
             <a:extLst>
               <a:ext uri="{FF2B5EF4-FFF2-40B4-BE49-F238E27FC236}">
-                <a16:creationId xmlns:a16="http://schemas.microsoft.com/office/drawing/2014/main" xmlns="" id="{91B5445B-78E5-2548-994D-EED6B14B1D04}"/>
+                <a16:creationId xmlns:a16="http://schemas.microsoft.com/office/drawing/2014/main" id="{91B5445B-78E5-2548-994D-EED6B14B1D04}"/>
               </a:ext>
             </a:extLst>
           </p:cNvPr>
@@ -19069,7 +18872,7 @@
           <p:cNvPr id="9" name="TextBox 8">
             <a:extLst>
               <a:ext uri="{FF2B5EF4-FFF2-40B4-BE49-F238E27FC236}">
-                <a16:creationId xmlns:a16="http://schemas.microsoft.com/office/drawing/2014/main" xmlns="" id="{6C14AB48-6A9F-194B-BE19-57E50362ADAA}"/>
+                <a16:creationId xmlns:a16="http://schemas.microsoft.com/office/drawing/2014/main" id="{6C14AB48-6A9F-194B-BE19-57E50362ADAA}"/>
               </a:ext>
             </a:extLst>
           </p:cNvPr>
@@ -19115,13 +18918,6 @@
   <p:clrMapOvr>
     <a:masterClrMapping/>
   </p:clrMapOvr>
-  <p:timing>
-    <p:tnLst>
-      <p:par>
-        <p:cTn id="1" dur="indefinite" restart="never" nodeType="tmRoot"/>
-      </p:par>
-    </p:tnLst>
-  </p:timing>
 </p:sld>
 </file>
 
@@ -19155,10 +18951,10 @@
           <p:cNvPr id="11" name="Rectangle 10">
             <a:extLst>
               <a:ext uri="{FF2B5EF4-FFF2-40B4-BE49-F238E27FC236}">
-                <a16:creationId xmlns:a16="http://schemas.microsoft.com/office/drawing/2014/main" xmlns="" id="{4351DFE5-F63D-4BE0-BDA9-E3EB88F01AA5}"/>
+                <a16:creationId xmlns:a16="http://schemas.microsoft.com/office/drawing/2014/main" id="{4351DFE5-F63D-4BE0-BDA9-E3EB88F01AA5}"/>
               </a:ext>
               <a:ext uri="{C183D7F6-B498-43B3-948B-1728B52AA6E4}">
-                <adec:decorative xmlns:adec="http://schemas.microsoft.com/office/drawing/2017/decorative" xmlns="" val="1"/>
+                <adec:decorative xmlns:adec="http://schemas.microsoft.com/office/drawing/2017/decorative" val="1"/>
               </a:ext>
             </a:extLst>
           </p:cNvPr>
@@ -19168,7 +18964,7 @@
           <p:nvPr>
             <p:extLst>
               <p:ext uri="{386F3935-93C4-4BCD-93E2-E3B085C9AB24}">
-                <p16:designElem xmlns:p16="http://schemas.microsoft.com/office/powerpoint/2015/main" xmlns="" val="1"/>
+                <p16:designElem xmlns:p16="http://schemas.microsoft.com/office/powerpoint/2015/main" val="1"/>
               </p:ext>
             </p:extLst>
           </p:nvPr>
@@ -19240,10 +19036,10 @@
           <p:cNvPr id="13" name="Picture 12">
             <a:extLst>
               <a:ext uri="{FF2B5EF4-FFF2-40B4-BE49-F238E27FC236}">
-                <a16:creationId xmlns:a16="http://schemas.microsoft.com/office/drawing/2014/main" xmlns="" id="{02DD2BC0-6F29-4B4F-8D61-2DCF6D2E8E73}"/>
+                <a16:creationId xmlns:a16="http://schemas.microsoft.com/office/drawing/2014/main" id="{02DD2BC0-6F29-4B4F-8D61-2DCF6D2E8E73}"/>
               </a:ext>
               <a:ext uri="{C183D7F6-B498-43B3-948B-1728B52AA6E4}">
-                <adec:decorative xmlns:adec="http://schemas.microsoft.com/office/drawing/2017/decorative" xmlns="" val="1"/>
+                <adec:decorative xmlns:adec="http://schemas.microsoft.com/office/drawing/2017/decorative" val="1"/>
               </a:ext>
             </a:extLst>
           </p:cNvPr>
@@ -19253,7 +19049,7 @@
           <p:nvPr>
             <p:extLst>
               <p:ext uri="{386F3935-93C4-4BCD-93E2-E3B085C9AB24}">
-                <p16:designElem xmlns:p16="http://schemas.microsoft.com/office/powerpoint/2015/main" xmlns="" val="1"/>
+                <p16:designElem xmlns:p16="http://schemas.microsoft.com/office/powerpoint/2015/main" val="1"/>
               </p:ext>
             </p:extLst>
           </p:nvPr>
@@ -19285,7 +19081,7 @@
           <p:cNvPr id="4" name="Picture 2" descr="https://lh6.googleusercontent.com/o-zD3gg3ajvak73M3tIgSa37WGMmigpo988VwPz8pSJBDBvuXH5Rtf-BffEU8IXtAKwYUD8W2I4Xn-WRyfQnGjliPblaizdA8Ug-BvozLLP_CdvBhnr8wRhX6OgDDs0C_3joz4XDm_ANp7-D9w">
             <a:extLst>
               <a:ext uri="{FF2B5EF4-FFF2-40B4-BE49-F238E27FC236}">
-                <a16:creationId xmlns:a16="http://schemas.microsoft.com/office/drawing/2014/main" xmlns="" id="{4FB82333-C1EB-7E45-8A3F-FBB04B9F04A8}"/>
+                <a16:creationId xmlns:a16="http://schemas.microsoft.com/office/drawing/2014/main" id="{4FB82333-C1EB-7E45-8A3F-FBB04B9F04A8}"/>
               </a:ext>
             </a:extLst>
           </p:cNvPr>
@@ -19325,14 +19121,14 @@
           </a:extLst>
         </p:spPr>
       </p:pic>
-      <mc:AlternateContent xmlns:mc="http://schemas.openxmlformats.org/markup-compatibility/2006">
-        <mc:Choice xmlns:a14="http://schemas.microsoft.com/office/drawing/2010/main" Requires="a14">
+      <mc:AlternateContent xmlns:mc="http://schemas.openxmlformats.org/markup-compatibility/2006" xmlns:a14="http://schemas.microsoft.com/office/drawing/2010/main">
+        <mc:Choice Requires="a14">
           <p:graphicFrame>
             <p:nvGraphicFramePr>
               <p:cNvPr id="9" name="Diagram 8">
                 <a:extLst>
                   <a:ext uri="{FF2B5EF4-FFF2-40B4-BE49-F238E27FC236}">
-                    <a16:creationId xmlns:a16="http://schemas.microsoft.com/office/drawing/2014/main" xmlns="" id="{6BFB7417-4207-F142-9EC4-913C673304ED}"/>
+                    <a16:creationId xmlns:a16="http://schemas.microsoft.com/office/drawing/2014/main" id="{6BFB7417-4207-F142-9EC4-913C673304ED}"/>
                   </a:ext>
                 </a:extLst>
               </p:cNvPr>
@@ -19356,7 +19152,7 @@
             </a:graphic>
           </p:graphicFrame>
         </mc:Choice>
-        <mc:Fallback>
+        <mc:Fallback xmlns="">
           <p:graphicFrame>
             <p:nvGraphicFramePr>
               <p:cNvPr id="9" name="Diagram 8">
@@ -19381,7 +19177,7 @@
             </p:xfrm>
             <a:graphic>
               <a:graphicData uri="http://schemas.openxmlformats.org/drawingml/2006/diagram">
-                <dgm:relIds xmlns:dgm="http://schemas.openxmlformats.org/drawingml/2006/diagram" xmlns:r="http://schemas.openxmlformats.org/officeDocument/2006/relationships" r:dm="rId10" r:lo="rId6" r:qs="rId7" r:cs="rId8"/>
+                <dgm:relIds xmlns:dgm="http://schemas.openxmlformats.org/drawingml/2006/diagram" xmlns:r="http://schemas.openxmlformats.org/officeDocument/2006/relationships" r:dm="rId10" r:lo="rId11" r:qs="rId12" r:cs="rId13"/>
               </a:graphicData>
             </a:graphic>
           </p:graphicFrame>
@@ -19392,7 +19188,7 @@
           <p:cNvPr id="12" name="Title 1">
             <a:extLst>
               <a:ext uri="{FF2B5EF4-FFF2-40B4-BE49-F238E27FC236}">
-                <a16:creationId xmlns:a16="http://schemas.microsoft.com/office/drawing/2014/main" xmlns="" id="{3B76EE3A-8DE7-A346-90E7-D3279E65C18A}"/>
+                <a16:creationId xmlns:a16="http://schemas.microsoft.com/office/drawing/2014/main" id="{3B76EE3A-8DE7-A346-90E7-D3279E65C18A}"/>
               </a:ext>
             </a:extLst>
           </p:cNvPr>
@@ -19437,13 +19233,6 @@
   <p:clrMapOvr>
     <a:masterClrMapping/>
   </p:clrMapOvr>
-  <p:timing>
-    <p:tnLst>
-      <p:par>
-        <p:cTn id="1" dur="indefinite" restart="never" nodeType="tmRoot"/>
-      </p:par>
-    </p:tnLst>
-  </p:timing>
 </p:sld>
 </file>
 
@@ -19477,10 +19266,10 @@
           <p:cNvPr id="11" name="Rectangle 10">
             <a:extLst>
               <a:ext uri="{FF2B5EF4-FFF2-40B4-BE49-F238E27FC236}">
-                <a16:creationId xmlns:a16="http://schemas.microsoft.com/office/drawing/2014/main" xmlns="" id="{4351DFE5-F63D-4BE0-BDA9-E3EB88F01AA5}"/>
+                <a16:creationId xmlns:a16="http://schemas.microsoft.com/office/drawing/2014/main" id="{4351DFE5-F63D-4BE0-BDA9-E3EB88F01AA5}"/>
               </a:ext>
               <a:ext uri="{C183D7F6-B498-43B3-948B-1728B52AA6E4}">
-                <adec:decorative xmlns:adec="http://schemas.microsoft.com/office/drawing/2017/decorative" xmlns="" val="1"/>
+                <adec:decorative xmlns:adec="http://schemas.microsoft.com/office/drawing/2017/decorative" val="1"/>
               </a:ext>
             </a:extLst>
           </p:cNvPr>
@@ -19490,7 +19279,7 @@
           <p:nvPr>
             <p:extLst>
               <p:ext uri="{386F3935-93C4-4BCD-93E2-E3B085C9AB24}">
-                <p16:designElem xmlns:p16="http://schemas.microsoft.com/office/powerpoint/2015/main" xmlns="" val="1"/>
+                <p16:designElem xmlns:p16="http://schemas.microsoft.com/office/powerpoint/2015/main" val="1"/>
               </p:ext>
             </p:extLst>
           </p:nvPr>
@@ -19562,10 +19351,10 @@
           <p:cNvPr id="13" name="Picture 12">
             <a:extLst>
               <a:ext uri="{FF2B5EF4-FFF2-40B4-BE49-F238E27FC236}">
-                <a16:creationId xmlns:a16="http://schemas.microsoft.com/office/drawing/2014/main" xmlns="" id="{02DD2BC0-6F29-4B4F-8D61-2DCF6D2E8E73}"/>
+                <a16:creationId xmlns:a16="http://schemas.microsoft.com/office/drawing/2014/main" id="{02DD2BC0-6F29-4B4F-8D61-2DCF6D2E8E73}"/>
               </a:ext>
               <a:ext uri="{C183D7F6-B498-43B3-948B-1728B52AA6E4}">
-                <adec:decorative xmlns:adec="http://schemas.microsoft.com/office/drawing/2017/decorative" xmlns="" val="1"/>
+                <adec:decorative xmlns:adec="http://schemas.microsoft.com/office/drawing/2017/decorative" val="1"/>
               </a:ext>
             </a:extLst>
           </p:cNvPr>
@@ -19575,7 +19364,7 @@
           <p:nvPr>
             <p:extLst>
               <p:ext uri="{386F3935-93C4-4BCD-93E2-E3B085C9AB24}">
-                <p16:designElem xmlns:p16="http://schemas.microsoft.com/office/powerpoint/2015/main" xmlns="" val="1"/>
+                <p16:designElem xmlns:p16="http://schemas.microsoft.com/office/powerpoint/2015/main" val="1"/>
               </p:ext>
             </p:extLst>
           </p:nvPr>
@@ -19607,7 +19396,7 @@
           <p:cNvPr id="4" name="Picture 2" descr="https://lh6.googleusercontent.com/o-zD3gg3ajvak73M3tIgSa37WGMmigpo988VwPz8pSJBDBvuXH5Rtf-BffEU8IXtAKwYUD8W2I4Xn-WRyfQnGjliPblaizdA8Ug-BvozLLP_CdvBhnr8wRhX6OgDDs0C_3joz4XDm_ANp7-D9w">
             <a:extLst>
               <a:ext uri="{FF2B5EF4-FFF2-40B4-BE49-F238E27FC236}">
-                <a16:creationId xmlns:a16="http://schemas.microsoft.com/office/drawing/2014/main" xmlns="" id="{4FB82333-C1EB-7E45-8A3F-FBB04B9F04A8}"/>
+                <a16:creationId xmlns:a16="http://schemas.microsoft.com/office/drawing/2014/main" id="{4FB82333-C1EB-7E45-8A3F-FBB04B9F04A8}"/>
               </a:ext>
             </a:extLst>
           </p:cNvPr>
@@ -19652,7 +19441,7 @@
           <p:cNvPr id="12" name="Title 1">
             <a:extLst>
               <a:ext uri="{FF2B5EF4-FFF2-40B4-BE49-F238E27FC236}">
-                <a16:creationId xmlns:a16="http://schemas.microsoft.com/office/drawing/2014/main" xmlns="" id="{3B76EE3A-8DE7-A346-90E7-D3279E65C18A}"/>
+                <a16:creationId xmlns:a16="http://schemas.microsoft.com/office/drawing/2014/main" id="{3B76EE3A-8DE7-A346-90E7-D3279E65C18A}"/>
               </a:ext>
             </a:extLst>
           </p:cNvPr>
@@ -19677,18 +19466,13 @@
           <a:p>
             <a:pPr algn="ctr"/>
             <a:r>
-              <a:rPr lang="en-US" sz="4000" dirty="0" smtClean="0">
+              <a:rPr lang="en-US" sz="4000" dirty="0">
                 <a:solidFill>
                   <a:srgbClr val="FFFFFF"/>
                 </a:solidFill>
               </a:rPr>
               <a:t>Predictive Model</a:t>
             </a:r>
-            <a:endParaRPr lang="en-US" sz="4000" dirty="0">
-              <a:solidFill>
-                <a:srgbClr val="FFFFFF"/>
-              </a:solidFill>
-            </a:endParaRPr>
           </a:p>
         </p:txBody>
       </p:sp>
@@ -19697,7 +19481,7 @@
           <p:cNvPr id="7" name="Diagram 6">
             <a:extLst>
               <a:ext uri="{FF2B5EF4-FFF2-40B4-BE49-F238E27FC236}">
-                <a16:creationId xmlns:a16="http://schemas.microsoft.com/office/drawing/2014/main" xmlns="" id="{03111FD0-1CCE-2541-BF14-4D136FD18B42}"/>
+                <a16:creationId xmlns:a16="http://schemas.microsoft.com/office/drawing/2014/main" id="{03111FD0-1CCE-2541-BF14-4D136FD18B42}"/>
               </a:ext>
             </a:extLst>
           </p:cNvPr>
@@ -19730,13 +19514,6 @@
   <p:clrMapOvr>
     <a:masterClrMapping/>
   </p:clrMapOvr>
-  <p:timing>
-    <p:tnLst>
-      <p:par>
-        <p:cTn id="1" dur="indefinite" restart="never" nodeType="tmRoot"/>
-      </p:par>
-    </p:tnLst>
-  </p:timing>
 </p:sld>
 </file>
 
@@ -19770,10 +19547,10 @@
           <p:cNvPr id="10" name="Rectangle 9">
             <a:extLst>
               <a:ext uri="{FF2B5EF4-FFF2-40B4-BE49-F238E27FC236}">
-                <a16:creationId xmlns:a16="http://schemas.microsoft.com/office/drawing/2014/main" xmlns="" id="{86197D16-FE75-4A0E-A0C9-28C0F04A43DF}"/>
+                <a16:creationId xmlns:a16="http://schemas.microsoft.com/office/drawing/2014/main" id="{86197D16-FE75-4A0E-A0C9-28C0F04A43DF}"/>
               </a:ext>
               <a:ext uri="{C183D7F6-B498-43B3-948B-1728B52AA6E4}">
-                <adec:decorative xmlns:adec="http://schemas.microsoft.com/office/drawing/2017/decorative" xmlns="" val="1"/>
+                <adec:decorative xmlns:adec="http://schemas.microsoft.com/office/drawing/2017/decorative" val="1"/>
               </a:ext>
             </a:extLst>
           </p:cNvPr>
@@ -19783,7 +19560,7 @@
           <p:nvPr>
             <p:extLst>
               <p:ext uri="{386F3935-93C4-4BCD-93E2-E3B085C9AB24}">
-                <p16:designElem xmlns:p16="http://schemas.microsoft.com/office/powerpoint/2015/main" xmlns="" val="1"/>
+                <p16:designElem xmlns:p16="http://schemas.microsoft.com/office/powerpoint/2015/main" val="1"/>
               </p:ext>
             </p:extLst>
           </p:nvPr>
@@ -19855,10 +19632,10 @@
           <p:cNvPr id="12" name="Picture 11">
             <a:extLst>
               <a:ext uri="{FF2B5EF4-FFF2-40B4-BE49-F238E27FC236}">
-                <a16:creationId xmlns:a16="http://schemas.microsoft.com/office/drawing/2014/main" xmlns="" id="{FA8FCEC6-4B30-4FF2-8B32-504BEAEA3A16}"/>
+                <a16:creationId xmlns:a16="http://schemas.microsoft.com/office/drawing/2014/main" id="{FA8FCEC6-4B30-4FF2-8B32-504BEAEA3A16}"/>
               </a:ext>
               <a:ext uri="{C183D7F6-B498-43B3-948B-1728B52AA6E4}">
-                <adec:decorative xmlns:adec="http://schemas.microsoft.com/office/drawing/2017/decorative" xmlns="" val="1"/>
+                <adec:decorative xmlns:adec="http://schemas.microsoft.com/office/drawing/2017/decorative" val="1"/>
               </a:ext>
             </a:extLst>
           </p:cNvPr>
@@ -19868,7 +19645,7 @@
           <p:nvPr>
             <p:extLst>
               <p:ext uri="{386F3935-93C4-4BCD-93E2-E3B085C9AB24}">
-                <p16:designElem xmlns:p16="http://schemas.microsoft.com/office/powerpoint/2015/main" xmlns="" val="1"/>
+                <p16:designElem xmlns:p16="http://schemas.microsoft.com/office/powerpoint/2015/main" val="1"/>
               </p:ext>
             </p:extLst>
           </p:nvPr>
@@ -19944,7 +19721,7 @@
           <p:cNvPr id="2" name="Title 1">
             <a:extLst>
               <a:ext uri="{FF2B5EF4-FFF2-40B4-BE49-F238E27FC236}">
-                <a16:creationId xmlns:a16="http://schemas.microsoft.com/office/drawing/2014/main" xmlns="" id="{979451DB-A8DC-194F-8BC3-68E815869ADA}"/>
+                <a16:creationId xmlns:a16="http://schemas.microsoft.com/office/drawing/2014/main" id="{979451DB-A8DC-194F-8BC3-68E815869ADA}"/>
               </a:ext>
             </a:extLst>
           </p:cNvPr>
@@ -19984,7 +19761,7 @@
           <p:cNvPr id="5" name="Picture 2" descr="https://lh6.googleusercontent.com/o-zD3gg3ajvak73M3tIgSa37WGMmigpo988VwPz8pSJBDBvuXH5Rtf-BffEU8IXtAKwYUD8W2I4Xn-WRyfQnGjliPblaizdA8Ug-BvozLLP_CdvBhnr8wRhX6OgDDs0C_3joz4XDm_ANp7-D9w">
             <a:extLst>
               <a:ext uri="{FF2B5EF4-FFF2-40B4-BE49-F238E27FC236}">
-                <a16:creationId xmlns:a16="http://schemas.microsoft.com/office/drawing/2014/main" xmlns="" id="{1C7F4249-298E-0845-B74C-1DF7E05A0052}"/>
+                <a16:creationId xmlns:a16="http://schemas.microsoft.com/office/drawing/2014/main" id="{1C7F4249-298E-0845-B74C-1DF7E05A0052}"/>
               </a:ext>
             </a:extLst>
           </p:cNvPr>
@@ -20034,13 +19811,6 @@
   <p:clrMapOvr>
     <a:masterClrMapping/>
   </p:clrMapOvr>
-  <p:timing>
-    <p:tnLst>
-      <p:par>
-        <p:cTn id="1" dur="indefinite" restart="never" nodeType="tmRoot"/>
-      </p:par>
-    </p:tnLst>
-  </p:timing>
 </p:sld>
 </file>
 
@@ -20074,7 +19844,7 @@
           <p:cNvPr id="5" name="Picture 2" descr="https://lh6.googleusercontent.com/o-zD3gg3ajvak73M3tIgSa37WGMmigpo988VwPz8pSJBDBvuXH5Rtf-BffEU8IXtAKwYUD8W2I4Xn-WRyfQnGjliPblaizdA8Ug-BvozLLP_CdvBhnr8wRhX6OgDDs0C_3joz4XDm_ANp7-D9w">
             <a:extLst>
               <a:ext uri="{FF2B5EF4-FFF2-40B4-BE49-F238E27FC236}">
-                <a16:creationId xmlns:a16="http://schemas.microsoft.com/office/drawing/2014/main" xmlns="" id="{1C7F4249-298E-0845-B74C-1DF7E05A0052}"/>
+                <a16:creationId xmlns:a16="http://schemas.microsoft.com/office/drawing/2014/main" id="{1C7F4249-298E-0845-B74C-1DF7E05A0052}"/>
               </a:ext>
             </a:extLst>
           </p:cNvPr>
@@ -20116,10 +19886,10 @@
       </p:pic>
       <p:pic>
         <p:nvPicPr>
-          <p:cNvPr id="8" name="Picture 7">
+          <p:cNvPr id="3" name="Picture 2">
             <a:extLst>
               <a:ext uri="{FF2B5EF4-FFF2-40B4-BE49-F238E27FC236}">
-                <a16:creationId xmlns:a16="http://schemas.microsoft.com/office/drawing/2014/main" xmlns="" id="{4632C7C1-2FF8-154A-BBB6-297DC474902C}"/>
+                <a16:creationId xmlns:a16="http://schemas.microsoft.com/office/drawing/2014/main" id="{10C5BF6D-CE5A-A94E-BE24-D68A30ECDCBB}"/>
               </a:ext>
             </a:extLst>
           </p:cNvPr>
@@ -20136,8 +19906,8 @@
         </p:blipFill>
         <p:spPr>
           <a:xfrm>
-            <a:off x="952500" y="0"/>
-            <a:ext cx="10287000" cy="6858000"/>
+            <a:off x="987553" y="445131"/>
+            <a:ext cx="9365552" cy="5967737"/>
           </a:xfrm>
           <a:prstGeom prst="rect">
             <a:avLst/>
@@ -20154,13 +19924,6 @@
   <p:clrMapOvr>
     <a:masterClrMapping/>
   </p:clrMapOvr>
-  <p:timing>
-    <p:tnLst>
-      <p:par>
-        <p:cTn id="1" dur="indefinite" restart="never" nodeType="tmRoot"/>
-      </p:par>
-    </p:tnLst>
-  </p:timing>
 </p:sld>
 </file>
 
@@ -20194,7 +19957,7 @@
           <p:cNvPr id="5" name="Picture 2" descr="https://lh6.googleusercontent.com/o-zD3gg3ajvak73M3tIgSa37WGMmigpo988VwPz8pSJBDBvuXH5Rtf-BffEU8IXtAKwYUD8W2I4Xn-WRyfQnGjliPblaizdA8Ug-BvozLLP_CdvBhnr8wRhX6OgDDs0C_3joz4XDm_ANp7-D9w">
             <a:extLst>
               <a:ext uri="{FF2B5EF4-FFF2-40B4-BE49-F238E27FC236}">
-                <a16:creationId xmlns:a16="http://schemas.microsoft.com/office/drawing/2014/main" xmlns="" id="{1C7F4249-298E-0845-B74C-1DF7E05A0052}"/>
+                <a16:creationId xmlns:a16="http://schemas.microsoft.com/office/drawing/2014/main" id="{1C7F4249-298E-0845-B74C-1DF7E05A0052}"/>
               </a:ext>
             </a:extLst>
           </p:cNvPr>
@@ -20236,10 +19999,10 @@
       </p:pic>
       <p:pic>
         <p:nvPicPr>
-          <p:cNvPr id="7" name="Picture 6">
+          <p:cNvPr id="4" name="Picture 3">
             <a:extLst>
               <a:ext uri="{FF2B5EF4-FFF2-40B4-BE49-F238E27FC236}">
-                <a16:creationId xmlns:a16="http://schemas.microsoft.com/office/drawing/2014/main" xmlns="" id="{B074B8B3-71D3-AE41-97A9-8007E28276F0}"/>
+                <a16:creationId xmlns:a16="http://schemas.microsoft.com/office/drawing/2014/main" id="{A38116D0-EE26-F740-9599-E98066AB4021}"/>
               </a:ext>
             </a:extLst>
           </p:cNvPr>
@@ -20256,8 +20019,121 @@
         </p:blipFill>
         <p:spPr>
           <a:xfrm>
-            <a:off x="1225087" y="0"/>
-            <a:ext cx="9741825" cy="6858000"/>
+            <a:off x="383268" y="585216"/>
+            <a:ext cx="11451101" cy="4736592"/>
+          </a:xfrm>
+          <a:prstGeom prst="rect">
+            <a:avLst/>
+          </a:prstGeom>
+        </p:spPr>
+      </p:pic>
+    </p:spTree>
+    <p:extLst>
+      <p:ext uri="{BB962C8B-B14F-4D97-AF65-F5344CB8AC3E}">
+        <p14:creationId xmlns:p14="http://schemas.microsoft.com/office/powerpoint/2010/main" val="1891515886"/>
+      </p:ext>
+    </p:extLst>
+  </p:cSld>
+  <p:clrMapOvr>
+    <a:masterClrMapping/>
+  </p:clrMapOvr>
+</p:sld>
+</file>
+
+<file path=ppt/slides/slide15.xml><?xml version="1.0" encoding="utf-8"?>
+<p:sld xmlns:a="http://schemas.openxmlformats.org/drawingml/2006/main" xmlns:r="http://schemas.openxmlformats.org/officeDocument/2006/relationships" xmlns:p="http://schemas.openxmlformats.org/presentationml/2006/main">
+  <p:cSld>
+    <p:bg>
+      <p:bgPr>
+        <a:solidFill>
+          <a:schemeClr val="bg1"/>
+        </a:solidFill>
+        <a:effectLst/>
+      </p:bgPr>
+    </p:bg>
+    <p:spTree>
+      <p:nvGrpSpPr>
+        <p:cNvPr id="1" name=""/>
+        <p:cNvGrpSpPr/>
+        <p:nvPr/>
+      </p:nvGrpSpPr>
+      <p:grpSpPr>
+        <a:xfrm>
+          <a:off x="0" y="0"/>
+          <a:ext cx="0" cy="0"/>
+          <a:chOff x="0" y="0"/>
+          <a:chExt cx="0" cy="0"/>
+        </a:xfrm>
+      </p:grpSpPr>
+      <p:pic>
+        <p:nvPicPr>
+          <p:cNvPr id="5" name="Picture 2" descr="https://lh6.googleusercontent.com/o-zD3gg3ajvak73M3tIgSa37WGMmigpo988VwPz8pSJBDBvuXH5Rtf-BffEU8IXtAKwYUD8W2I4Xn-WRyfQnGjliPblaizdA8Ug-BvozLLP_CdvBhnr8wRhX6OgDDs0C_3joz4XDm_ANp7-D9w">
+            <a:extLst>
+              <a:ext uri="{FF2B5EF4-FFF2-40B4-BE49-F238E27FC236}">
+                <a16:creationId xmlns:a16="http://schemas.microsoft.com/office/drawing/2014/main" id="{1C7F4249-298E-0845-B74C-1DF7E05A0052}"/>
+              </a:ext>
+            </a:extLst>
+          </p:cNvPr>
+          <p:cNvPicPr>
+            <a:picLocks noChangeAspect="1" noChangeArrowheads="1"/>
+          </p:cNvPicPr>
+          <p:nvPr/>
+        </p:nvPicPr>
+        <p:blipFill rotWithShape="1">
+          <a:blip r:embed="rId3">
+            <a:extLst>
+              <a:ext uri="{28A0092B-C50C-407E-A947-70E740481C1C}">
+                <a14:useLocalDpi xmlns:a14="http://schemas.microsoft.com/office/drawing/2010/main" val="0"/>
+              </a:ext>
+            </a:extLst>
+          </a:blip>
+          <a:srcRect r="79272" b="4306"/>
+          <a:stretch/>
+        </p:blipFill>
+        <p:spPr bwMode="auto">
+          <a:xfrm>
+            <a:off x="10975872" y="5527163"/>
+            <a:ext cx="858497" cy="1010674"/>
+          </a:xfrm>
+          <a:prstGeom prst="rect">
+            <a:avLst/>
+          </a:prstGeom>
+          <a:noFill/>
+          <a:extLst>
+            <a:ext uri="{909E8E84-426E-40DD-AFC4-6F175D3DCCD1}">
+              <a14:hiddenFill xmlns:a14="http://schemas.microsoft.com/office/drawing/2010/main">
+                <a:solidFill>
+                  <a:srgbClr val="FFFFFF"/>
+                </a:solidFill>
+              </a14:hiddenFill>
+            </a:ext>
+          </a:extLst>
+        </p:spPr>
+      </p:pic>
+      <p:pic>
+        <p:nvPicPr>
+          <p:cNvPr id="6" name="Picture 5">
+            <a:extLst>
+              <a:ext uri="{FF2B5EF4-FFF2-40B4-BE49-F238E27FC236}">
+                <a16:creationId xmlns:a16="http://schemas.microsoft.com/office/drawing/2014/main" id="{29CC2EFC-656D-B241-B41F-1AB4E592F2B3}"/>
+              </a:ext>
+            </a:extLst>
+          </p:cNvPr>
+          <p:cNvPicPr>
+            <a:picLocks noChangeAspect="1"/>
+          </p:cNvPicPr>
+          <p:nvPr/>
+        </p:nvPicPr>
+        <p:blipFill>
+          <a:blip r:embed="rId4"/>
+          <a:stretch>
+            <a:fillRect/>
+          </a:stretch>
+        </p:blipFill>
+        <p:spPr>
+          <a:xfrm>
+            <a:off x="2562487" y="0"/>
+            <a:ext cx="7067025" cy="6858000"/>
           </a:xfrm>
           <a:prstGeom prst="rect">
             <a:avLst/>
@@ -20274,17 +20150,10 @@
   <p:clrMapOvr>
     <a:masterClrMapping/>
   </p:clrMapOvr>
-  <p:timing>
-    <p:tnLst>
-      <p:par>
-        <p:cTn id="1" dur="indefinite" restart="never" nodeType="tmRoot"/>
-      </p:par>
-    </p:tnLst>
-  </p:timing>
 </p:sld>
 </file>
 
-<file path=ppt/slides/slide15.xml><?xml version="1.0" encoding="utf-8"?>
+<file path=ppt/slides/slide16.xml><?xml version="1.0" encoding="utf-8"?>
 <p:sld xmlns:a="http://schemas.openxmlformats.org/drawingml/2006/main" xmlns:r="http://schemas.openxmlformats.org/officeDocument/2006/relationships" xmlns:p="http://schemas.openxmlformats.org/presentationml/2006/main">
   <p:cSld>
     <p:spTree>
@@ -20306,10 +20175,10 @@
           <p:cNvPr id="10" name="Rectangle 9">
             <a:extLst>
               <a:ext uri="{FF2B5EF4-FFF2-40B4-BE49-F238E27FC236}">
-                <a16:creationId xmlns:a16="http://schemas.microsoft.com/office/drawing/2014/main" xmlns="" id="{86197D16-FE75-4A0E-A0C9-28C0F04A43DF}"/>
+                <a16:creationId xmlns:a16="http://schemas.microsoft.com/office/drawing/2014/main" id="{86197D16-FE75-4A0E-A0C9-28C0F04A43DF}"/>
               </a:ext>
               <a:ext uri="{C183D7F6-B498-43B3-948B-1728B52AA6E4}">
-                <adec:decorative xmlns:adec="http://schemas.microsoft.com/office/drawing/2017/decorative" xmlns="" val="1"/>
+                <adec:decorative xmlns:adec="http://schemas.microsoft.com/office/drawing/2017/decorative" val="1"/>
               </a:ext>
             </a:extLst>
           </p:cNvPr>
@@ -20319,7 +20188,7 @@
           <p:nvPr>
             <p:extLst>
               <p:ext uri="{386F3935-93C4-4BCD-93E2-E3B085C9AB24}">
-                <p16:designElem xmlns:p16="http://schemas.microsoft.com/office/powerpoint/2015/main" xmlns="" val="1"/>
+                <p16:designElem xmlns:p16="http://schemas.microsoft.com/office/powerpoint/2015/main" val="1"/>
               </p:ext>
             </p:extLst>
           </p:nvPr>
@@ -20391,10 +20260,10 @@
           <p:cNvPr id="12" name="Picture 11">
             <a:extLst>
               <a:ext uri="{FF2B5EF4-FFF2-40B4-BE49-F238E27FC236}">
-                <a16:creationId xmlns:a16="http://schemas.microsoft.com/office/drawing/2014/main" xmlns="" id="{FA8FCEC6-4B30-4FF2-8B32-504BEAEA3A16}"/>
+                <a16:creationId xmlns:a16="http://schemas.microsoft.com/office/drawing/2014/main" id="{FA8FCEC6-4B30-4FF2-8B32-504BEAEA3A16}"/>
               </a:ext>
               <a:ext uri="{C183D7F6-B498-43B3-948B-1728B52AA6E4}">
-                <adec:decorative xmlns:adec="http://schemas.microsoft.com/office/drawing/2017/decorative" xmlns="" val="1"/>
+                <adec:decorative xmlns:adec="http://schemas.microsoft.com/office/drawing/2017/decorative" val="1"/>
               </a:ext>
             </a:extLst>
           </p:cNvPr>
@@ -20404,7 +20273,7 @@
           <p:nvPr>
             <p:extLst>
               <p:ext uri="{386F3935-93C4-4BCD-93E2-E3B085C9AB24}">
-                <p16:designElem xmlns:p16="http://schemas.microsoft.com/office/powerpoint/2015/main" xmlns="" val="1"/>
+                <p16:designElem xmlns:p16="http://schemas.microsoft.com/office/powerpoint/2015/main" val="1"/>
               </p:ext>
             </p:extLst>
           </p:nvPr>
@@ -20480,7 +20349,7 @@
           <p:cNvPr id="2" name="Title 1">
             <a:extLst>
               <a:ext uri="{FF2B5EF4-FFF2-40B4-BE49-F238E27FC236}">
-                <a16:creationId xmlns:a16="http://schemas.microsoft.com/office/drawing/2014/main" xmlns="" id="{979451DB-A8DC-194F-8BC3-68E815869ADA}"/>
+                <a16:creationId xmlns:a16="http://schemas.microsoft.com/office/drawing/2014/main" id="{979451DB-A8DC-194F-8BC3-68E815869ADA}"/>
               </a:ext>
             </a:extLst>
           </p:cNvPr>
@@ -20510,21 +20379,8 @@
                   <a:srgbClr val="FFFFFF"/>
                 </a:solidFill>
               </a:rPr>
-              <a:t>3. </a:t>
+              <a:t>3. Side-products</a:t>
             </a:r>
-            <a:r>
-              <a:rPr lang="en-US" sz="6600" dirty="0" smtClean="0">
-                <a:solidFill>
-                  <a:srgbClr val="FFFFFF"/>
-                </a:solidFill>
-              </a:rPr>
-              <a:t>Side-products</a:t>
-            </a:r>
-            <a:endParaRPr lang="en-US" sz="6600" dirty="0">
-              <a:solidFill>
-                <a:srgbClr val="FFFFFF"/>
-              </a:solidFill>
-            </a:endParaRPr>
           </a:p>
         </p:txBody>
       </p:sp>
@@ -20533,7 +20389,7 @@
           <p:cNvPr id="5" name="Picture 2" descr="https://lh6.googleusercontent.com/o-zD3gg3ajvak73M3tIgSa37WGMmigpo988VwPz8pSJBDBvuXH5Rtf-BffEU8IXtAKwYUD8W2I4Xn-WRyfQnGjliPblaizdA8Ug-BvozLLP_CdvBhnr8wRhX6OgDDs0C_3joz4XDm_ANp7-D9w">
             <a:extLst>
               <a:ext uri="{FF2B5EF4-FFF2-40B4-BE49-F238E27FC236}">
-                <a16:creationId xmlns:a16="http://schemas.microsoft.com/office/drawing/2014/main" xmlns="" id="{1C7F4249-298E-0845-B74C-1DF7E05A0052}"/>
+                <a16:creationId xmlns:a16="http://schemas.microsoft.com/office/drawing/2014/main" id="{1C7F4249-298E-0845-B74C-1DF7E05A0052}"/>
               </a:ext>
             </a:extLst>
           </p:cNvPr>
@@ -20583,17 +20439,10 @@
   <p:clrMapOvr>
     <a:masterClrMapping/>
   </p:clrMapOvr>
-  <p:timing>
-    <p:tnLst>
-      <p:par>
-        <p:cTn id="1" dur="indefinite" restart="never" nodeType="tmRoot"/>
-      </p:par>
-    </p:tnLst>
-  </p:timing>
 </p:sld>
 </file>
 
-<file path=ppt/slides/slide16.xml><?xml version="1.0" encoding="utf-8"?>
+<file path=ppt/slides/slide17.xml><?xml version="1.0" encoding="utf-8"?>
 <p:sld xmlns:a="http://schemas.openxmlformats.org/drawingml/2006/main" xmlns:r="http://schemas.openxmlformats.org/officeDocument/2006/relationships" xmlns:p="http://schemas.openxmlformats.org/presentationml/2006/main">
   <p:cSld>
     <p:spTree>
@@ -20615,7 +20464,7 @@
           <p:cNvPr id="5" name="Picture 2" descr="https://lh6.googleusercontent.com/o-zD3gg3ajvak73M3tIgSa37WGMmigpo988VwPz8pSJBDBvuXH5Rtf-BffEU8IXtAKwYUD8W2I4Xn-WRyfQnGjliPblaizdA8Ug-BvozLLP_CdvBhnr8wRhX6OgDDs0C_3joz4XDm_ANp7-D9w">
             <a:extLst>
               <a:ext uri="{FF2B5EF4-FFF2-40B4-BE49-F238E27FC236}">
-                <a16:creationId xmlns:a16="http://schemas.microsoft.com/office/drawing/2014/main" xmlns="" id="{1C7F4249-298E-0845-B74C-1DF7E05A0052}"/>
+                <a16:creationId xmlns:a16="http://schemas.microsoft.com/office/drawing/2014/main" id="{1C7F4249-298E-0845-B74C-1DF7E05A0052}"/>
               </a:ext>
             </a:extLst>
           </p:cNvPr>
@@ -20829,17 +20678,10 @@
   <p:clrMapOvr>
     <a:masterClrMapping/>
   </p:clrMapOvr>
-  <p:timing>
-    <p:tnLst>
-      <p:par>
-        <p:cTn id="1" dur="indefinite" restart="never" nodeType="tmRoot"/>
-      </p:par>
-    </p:tnLst>
-  </p:timing>
 </p:sld>
 </file>
 
-<file path=ppt/slides/slide17.xml><?xml version="1.0" encoding="utf-8"?>
+<file path=ppt/slides/slide18.xml><?xml version="1.0" encoding="utf-8"?>
 <p:sld xmlns:a="http://schemas.openxmlformats.org/drawingml/2006/main" xmlns:r="http://schemas.openxmlformats.org/officeDocument/2006/relationships" xmlns:p="http://schemas.openxmlformats.org/presentationml/2006/main">
   <p:cSld>
     <p:bg>
@@ -20869,10 +20711,10 @@
           <p:cNvPr id="10" name="Rectangle 9">
             <a:extLst>
               <a:ext uri="{FF2B5EF4-FFF2-40B4-BE49-F238E27FC236}">
-                <a16:creationId xmlns:a16="http://schemas.microsoft.com/office/drawing/2014/main" xmlns="" id="{86197D16-FE75-4A0E-A0C9-28C0F04A43DF}"/>
+                <a16:creationId xmlns:a16="http://schemas.microsoft.com/office/drawing/2014/main" id="{86197D16-FE75-4A0E-A0C9-28C0F04A43DF}"/>
               </a:ext>
               <a:ext uri="{C183D7F6-B498-43B3-948B-1728B52AA6E4}">
-                <adec:decorative xmlns:adec="http://schemas.microsoft.com/office/drawing/2017/decorative" xmlns="" val="1"/>
+                <adec:decorative xmlns:adec="http://schemas.microsoft.com/office/drawing/2017/decorative" val="1"/>
               </a:ext>
             </a:extLst>
           </p:cNvPr>
@@ -20882,7 +20724,7 @@
           <p:nvPr>
             <p:extLst>
               <p:ext uri="{386F3935-93C4-4BCD-93E2-E3B085C9AB24}">
-                <p16:designElem xmlns:p16="http://schemas.microsoft.com/office/powerpoint/2015/main" xmlns="" val="1"/>
+                <p16:designElem xmlns:p16="http://schemas.microsoft.com/office/powerpoint/2015/main" val="1"/>
               </p:ext>
             </p:extLst>
           </p:nvPr>
@@ -20954,10 +20796,10 @@
           <p:cNvPr id="12" name="Picture 11">
             <a:extLst>
               <a:ext uri="{FF2B5EF4-FFF2-40B4-BE49-F238E27FC236}">
-                <a16:creationId xmlns:a16="http://schemas.microsoft.com/office/drawing/2014/main" xmlns="" id="{FA8FCEC6-4B30-4FF2-8B32-504BEAEA3A16}"/>
+                <a16:creationId xmlns:a16="http://schemas.microsoft.com/office/drawing/2014/main" id="{FA8FCEC6-4B30-4FF2-8B32-504BEAEA3A16}"/>
               </a:ext>
               <a:ext uri="{C183D7F6-B498-43B3-948B-1728B52AA6E4}">
-                <adec:decorative xmlns:adec="http://schemas.microsoft.com/office/drawing/2017/decorative" xmlns="" val="1"/>
+                <adec:decorative xmlns:adec="http://schemas.microsoft.com/office/drawing/2017/decorative" val="1"/>
               </a:ext>
             </a:extLst>
           </p:cNvPr>
@@ -20967,7 +20809,7 @@
           <p:nvPr>
             <p:extLst>
               <p:ext uri="{386F3935-93C4-4BCD-93E2-E3B085C9AB24}">
-                <p16:designElem xmlns:p16="http://schemas.microsoft.com/office/powerpoint/2015/main" xmlns="" val="1"/>
+                <p16:designElem xmlns:p16="http://schemas.microsoft.com/office/powerpoint/2015/main" val="1"/>
               </p:ext>
             </p:extLst>
           </p:nvPr>
@@ -21043,7 +20885,7 @@
           <p:cNvPr id="2" name="Title 1">
             <a:extLst>
               <a:ext uri="{FF2B5EF4-FFF2-40B4-BE49-F238E27FC236}">
-                <a16:creationId xmlns:a16="http://schemas.microsoft.com/office/drawing/2014/main" xmlns="" id="{979451DB-A8DC-194F-8BC3-68E815869ADA}"/>
+                <a16:creationId xmlns:a16="http://schemas.microsoft.com/office/drawing/2014/main" id="{979451DB-A8DC-194F-8BC3-68E815869ADA}"/>
               </a:ext>
             </a:extLst>
           </p:cNvPr>
@@ -21082,7 +20924,7 @@
           <p:cNvPr id="5" name="Picture 2" descr="https://lh6.googleusercontent.com/o-zD3gg3ajvak73M3tIgSa37WGMmigpo988VwPz8pSJBDBvuXH5Rtf-BffEU8IXtAKwYUD8W2I4Xn-WRyfQnGjliPblaizdA8Ug-BvozLLP_CdvBhnr8wRhX6OgDDs0C_3joz4XDm_ANp7-D9w">
             <a:extLst>
               <a:ext uri="{FF2B5EF4-FFF2-40B4-BE49-F238E27FC236}">
-                <a16:creationId xmlns:a16="http://schemas.microsoft.com/office/drawing/2014/main" xmlns="" id="{1C7F4249-298E-0845-B74C-1DF7E05A0052}"/>
+                <a16:creationId xmlns:a16="http://schemas.microsoft.com/office/drawing/2014/main" id="{1C7F4249-298E-0845-B74C-1DF7E05A0052}"/>
               </a:ext>
             </a:extLst>
           </p:cNvPr>
@@ -21127,7 +20969,7 @@
           <p:cNvPr id="6" name="Subtitle 2">
             <a:extLst>
               <a:ext uri="{FF2B5EF4-FFF2-40B4-BE49-F238E27FC236}">
-                <a16:creationId xmlns:a16="http://schemas.microsoft.com/office/drawing/2014/main" xmlns="" id="{222040C8-3F97-8040-97E3-759B13038C22}"/>
+                <a16:creationId xmlns:a16="http://schemas.microsoft.com/office/drawing/2014/main" id="{222040C8-3F97-8040-97E3-759B13038C22}"/>
               </a:ext>
             </a:extLst>
           </p:cNvPr>
@@ -21281,13 +21123,6 @@
   <p:clrMapOvr>
     <a:masterClrMapping/>
   </p:clrMapOvr>
-  <p:timing>
-    <p:tnLst>
-      <p:par>
-        <p:cTn id="1" dur="indefinite" restart="never" nodeType="tmRoot"/>
-      </p:par>
-    </p:tnLst>
-  </p:timing>
 </p:sld>
 </file>
 
@@ -21321,10 +21156,10 @@
           <p:cNvPr id="10" name="Rectangle 9">
             <a:extLst>
               <a:ext uri="{FF2B5EF4-FFF2-40B4-BE49-F238E27FC236}">
-                <a16:creationId xmlns:a16="http://schemas.microsoft.com/office/drawing/2014/main" xmlns="" id="{86197D16-FE75-4A0E-A0C9-28C0F04A43DF}"/>
+                <a16:creationId xmlns:a16="http://schemas.microsoft.com/office/drawing/2014/main" id="{86197D16-FE75-4A0E-A0C9-28C0F04A43DF}"/>
               </a:ext>
               <a:ext uri="{C183D7F6-B498-43B3-948B-1728B52AA6E4}">
-                <adec:decorative xmlns:adec="http://schemas.microsoft.com/office/drawing/2017/decorative" xmlns="" val="1"/>
+                <adec:decorative xmlns:adec="http://schemas.microsoft.com/office/drawing/2017/decorative" val="1"/>
               </a:ext>
             </a:extLst>
           </p:cNvPr>
@@ -21334,7 +21169,7 @@
           <p:nvPr>
             <p:extLst>
               <p:ext uri="{386F3935-93C4-4BCD-93E2-E3B085C9AB24}">
-                <p16:designElem xmlns:p16="http://schemas.microsoft.com/office/powerpoint/2015/main" xmlns="" val="1"/>
+                <p16:designElem xmlns:p16="http://schemas.microsoft.com/office/powerpoint/2015/main" val="1"/>
               </p:ext>
             </p:extLst>
           </p:nvPr>
@@ -21406,10 +21241,10 @@
           <p:cNvPr id="12" name="Picture 11">
             <a:extLst>
               <a:ext uri="{FF2B5EF4-FFF2-40B4-BE49-F238E27FC236}">
-                <a16:creationId xmlns:a16="http://schemas.microsoft.com/office/drawing/2014/main" xmlns="" id="{FA8FCEC6-4B30-4FF2-8B32-504BEAEA3A16}"/>
+                <a16:creationId xmlns:a16="http://schemas.microsoft.com/office/drawing/2014/main" id="{FA8FCEC6-4B30-4FF2-8B32-504BEAEA3A16}"/>
               </a:ext>
               <a:ext uri="{C183D7F6-B498-43B3-948B-1728B52AA6E4}">
-                <adec:decorative xmlns:adec="http://schemas.microsoft.com/office/drawing/2017/decorative" xmlns="" val="1"/>
+                <adec:decorative xmlns:adec="http://schemas.microsoft.com/office/drawing/2017/decorative" val="1"/>
               </a:ext>
             </a:extLst>
           </p:cNvPr>
@@ -21419,7 +21254,7 @@
           <p:nvPr>
             <p:extLst>
               <p:ext uri="{386F3935-93C4-4BCD-93E2-E3B085C9AB24}">
-                <p16:designElem xmlns:p16="http://schemas.microsoft.com/office/powerpoint/2015/main" xmlns="" val="1"/>
+                <p16:designElem xmlns:p16="http://schemas.microsoft.com/office/powerpoint/2015/main" val="1"/>
               </p:ext>
             </p:extLst>
           </p:nvPr>
@@ -21495,7 +21330,7 @@
           <p:cNvPr id="5" name="Picture 2" descr="https://lh6.googleusercontent.com/o-zD3gg3ajvak73M3tIgSa37WGMmigpo988VwPz8pSJBDBvuXH5Rtf-BffEU8IXtAKwYUD8W2I4Xn-WRyfQnGjliPblaizdA8Ug-BvozLLP_CdvBhnr8wRhX6OgDDs0C_3joz4XDm_ANp7-D9w">
             <a:extLst>
               <a:ext uri="{FF2B5EF4-FFF2-40B4-BE49-F238E27FC236}">
-                <a16:creationId xmlns:a16="http://schemas.microsoft.com/office/drawing/2014/main" xmlns="" id="{1C7F4249-298E-0845-B74C-1DF7E05A0052}"/>
+                <a16:creationId xmlns:a16="http://schemas.microsoft.com/office/drawing/2014/main" id="{1C7F4249-298E-0845-B74C-1DF7E05A0052}"/>
               </a:ext>
             </a:extLst>
           </p:cNvPr>
@@ -21540,7 +21375,7 @@
           <p:cNvPr id="8" name="Subtitle 2">
             <a:extLst>
               <a:ext uri="{FF2B5EF4-FFF2-40B4-BE49-F238E27FC236}">
-                <a16:creationId xmlns:a16="http://schemas.microsoft.com/office/drawing/2014/main" xmlns="" id="{55F38018-88D3-8B45-88FB-F6164715CB66}"/>
+                <a16:creationId xmlns:a16="http://schemas.microsoft.com/office/drawing/2014/main" id="{55F38018-88D3-8B45-88FB-F6164715CB66}"/>
               </a:ext>
             </a:extLst>
           </p:cNvPr>
@@ -21689,7 +21524,7 @@
           <p:cNvPr id="7" name="Picture 6">
             <a:extLst>
               <a:ext uri="{FF2B5EF4-FFF2-40B4-BE49-F238E27FC236}">
-                <a16:creationId xmlns:a16="http://schemas.microsoft.com/office/drawing/2014/main" xmlns="" id="{AE3CAE2D-E69A-3A4A-A6D0-CA16D68BEA10}"/>
+                <a16:creationId xmlns:a16="http://schemas.microsoft.com/office/drawing/2014/main" id="{AE3CAE2D-E69A-3A4A-A6D0-CA16D68BEA10}"/>
               </a:ext>
             </a:extLst>
           </p:cNvPr>
@@ -21719,7 +21554,7 @@
           <p:cNvPr id="13" name="Picture 12">
             <a:extLst>
               <a:ext uri="{FF2B5EF4-FFF2-40B4-BE49-F238E27FC236}">
-                <a16:creationId xmlns:a16="http://schemas.microsoft.com/office/drawing/2014/main" xmlns="" id="{A830D5F1-4D6D-4244-B98F-DC9F727D9BC3}"/>
+                <a16:creationId xmlns:a16="http://schemas.microsoft.com/office/drawing/2014/main" id="{A830D5F1-4D6D-4244-B98F-DC9F727D9BC3}"/>
               </a:ext>
             </a:extLst>
           </p:cNvPr>
@@ -21754,13 +21589,6 @@
   <p:clrMapOvr>
     <a:masterClrMapping/>
   </p:clrMapOvr>
-  <p:timing>
-    <p:tnLst>
-      <p:par>
-        <p:cTn id="1" dur="indefinite" restart="never" nodeType="tmRoot"/>
-      </p:par>
-    </p:tnLst>
-  </p:timing>
 </p:sld>
 </file>
 
@@ -21794,10 +21622,10 @@
           <p:cNvPr id="11" name="Rectangle 10">
             <a:extLst>
               <a:ext uri="{FF2B5EF4-FFF2-40B4-BE49-F238E27FC236}">
-                <a16:creationId xmlns:a16="http://schemas.microsoft.com/office/drawing/2014/main" xmlns="" id="{4351DFE5-F63D-4BE0-BDA9-E3EB88F01AA5}"/>
+                <a16:creationId xmlns:a16="http://schemas.microsoft.com/office/drawing/2014/main" id="{4351DFE5-F63D-4BE0-BDA9-E3EB88F01AA5}"/>
               </a:ext>
               <a:ext uri="{C183D7F6-B498-43B3-948B-1728B52AA6E4}">
-                <adec:decorative xmlns:adec="http://schemas.microsoft.com/office/drawing/2017/decorative" xmlns="" val="1"/>
+                <adec:decorative xmlns:adec="http://schemas.microsoft.com/office/drawing/2017/decorative" val="1"/>
               </a:ext>
             </a:extLst>
           </p:cNvPr>
@@ -21807,7 +21635,7 @@
           <p:nvPr>
             <p:extLst>
               <p:ext uri="{386F3935-93C4-4BCD-93E2-E3B085C9AB24}">
-                <p16:designElem xmlns:p16="http://schemas.microsoft.com/office/powerpoint/2015/main" xmlns="" val="1"/>
+                <p16:designElem xmlns:p16="http://schemas.microsoft.com/office/powerpoint/2015/main" val="1"/>
               </p:ext>
             </p:extLst>
           </p:nvPr>
@@ -21879,10 +21707,10 @@
           <p:cNvPr id="13" name="Picture 12">
             <a:extLst>
               <a:ext uri="{FF2B5EF4-FFF2-40B4-BE49-F238E27FC236}">
-                <a16:creationId xmlns:a16="http://schemas.microsoft.com/office/drawing/2014/main" xmlns="" id="{02DD2BC0-6F29-4B4F-8D61-2DCF6D2E8E73}"/>
+                <a16:creationId xmlns:a16="http://schemas.microsoft.com/office/drawing/2014/main" id="{02DD2BC0-6F29-4B4F-8D61-2DCF6D2E8E73}"/>
               </a:ext>
               <a:ext uri="{C183D7F6-B498-43B3-948B-1728B52AA6E4}">
-                <adec:decorative xmlns:adec="http://schemas.microsoft.com/office/drawing/2017/decorative" xmlns="" val="1"/>
+                <adec:decorative xmlns:adec="http://schemas.microsoft.com/office/drawing/2017/decorative" val="1"/>
               </a:ext>
             </a:extLst>
           </p:cNvPr>
@@ -21892,7 +21720,7 @@
           <p:nvPr>
             <p:extLst>
               <p:ext uri="{386F3935-93C4-4BCD-93E2-E3B085C9AB24}">
-                <p16:designElem xmlns:p16="http://schemas.microsoft.com/office/powerpoint/2015/main" xmlns="" val="1"/>
+                <p16:designElem xmlns:p16="http://schemas.microsoft.com/office/powerpoint/2015/main" val="1"/>
               </p:ext>
             </p:extLst>
           </p:nvPr>
@@ -21924,7 +21752,7 @@
           <p:cNvPr id="2" name="Title 1">
             <a:extLst>
               <a:ext uri="{FF2B5EF4-FFF2-40B4-BE49-F238E27FC236}">
-                <a16:creationId xmlns:a16="http://schemas.microsoft.com/office/drawing/2014/main" xmlns="" id="{02BCACA2-D968-7B43-859F-DE266A1394AD}"/>
+                <a16:creationId xmlns:a16="http://schemas.microsoft.com/office/drawing/2014/main" id="{02BCACA2-D968-7B43-859F-DE266A1394AD}"/>
               </a:ext>
             </a:extLst>
           </p:cNvPr>
@@ -21964,7 +21792,7 @@
           <p:cNvPr id="4" name="Picture 2" descr="https://lh6.googleusercontent.com/o-zD3gg3ajvak73M3tIgSa37WGMmigpo988VwPz8pSJBDBvuXH5Rtf-BffEU8IXtAKwYUD8W2I4Xn-WRyfQnGjliPblaizdA8Ug-BvozLLP_CdvBhnr8wRhX6OgDDs0C_3joz4XDm_ANp7-D9w">
             <a:extLst>
               <a:ext uri="{FF2B5EF4-FFF2-40B4-BE49-F238E27FC236}">
-                <a16:creationId xmlns:a16="http://schemas.microsoft.com/office/drawing/2014/main" xmlns="" id="{4FB82333-C1EB-7E45-8A3F-FBB04B9F04A8}"/>
+                <a16:creationId xmlns:a16="http://schemas.microsoft.com/office/drawing/2014/main" id="{4FB82333-C1EB-7E45-8A3F-FBB04B9F04A8}"/>
               </a:ext>
             </a:extLst>
           </p:cNvPr>
@@ -22009,7 +21837,7 @@
           <p:cNvPr id="3" name="TextBox 2">
             <a:extLst>
               <a:ext uri="{FF2B5EF4-FFF2-40B4-BE49-F238E27FC236}">
-                <a16:creationId xmlns:a16="http://schemas.microsoft.com/office/drawing/2014/main" xmlns="" id="{42219E4E-DB7B-1E42-AE5C-DAC8CFA597BF}"/>
+                <a16:creationId xmlns:a16="http://schemas.microsoft.com/office/drawing/2014/main" id="{42219E4E-DB7B-1E42-AE5C-DAC8CFA597BF}"/>
               </a:ext>
             </a:extLst>
           </p:cNvPr>
@@ -22063,7 +21891,7 @@
               <a:buAutoNum type="arabicPeriod"/>
             </a:pPr>
             <a:r>
-              <a:rPr lang="en-US" sz="2800" b="1" dirty="0" smtClean="0">
+              <a:rPr lang="en-US" sz="2800" b="1" dirty="0">
                 <a:solidFill>
                   <a:schemeClr val="accent2">
                     <a:lumMod val="75000"/>
@@ -22072,13 +21900,6 @@
               </a:rPr>
               <a:t>DARS</a:t>
             </a:r>
-            <a:endParaRPr lang="en-US" sz="2800" b="1" dirty="0">
-              <a:solidFill>
-                <a:schemeClr val="accent2">
-                  <a:lumMod val="75000"/>
-                </a:schemeClr>
-              </a:solidFill>
-            </a:endParaRPr>
           </a:p>
           <a:p>
             <a:pPr marL="571500" indent="-571500">
@@ -22095,42 +21916,15 @@
               <a:buAutoNum type="arabicPeriod"/>
             </a:pPr>
             <a:r>
-              <a:rPr lang="en-US" sz="2800" b="1" dirty="0" smtClean="0">
+              <a:rPr lang="en-US" sz="2800" b="1" dirty="0">
                 <a:solidFill>
                   <a:schemeClr val="accent2">
                     <a:lumMod val="75000"/>
                   </a:schemeClr>
                 </a:solidFill>
               </a:rPr>
-              <a:t>A </a:t>
+              <a:t>A Course Recommender System for Students</a:t>
             </a:r>
-            <a:r>
-              <a:rPr lang="en-US" sz="2800" b="1" dirty="0" smtClean="0">
-                <a:solidFill>
-                  <a:schemeClr val="accent2">
-                    <a:lumMod val="75000"/>
-                  </a:schemeClr>
-                </a:solidFill>
-              </a:rPr>
-              <a:t>Course Recommender </a:t>
-            </a:r>
-            <a:r>
-              <a:rPr lang="en-US" sz="2800" b="1" dirty="0" smtClean="0">
-                <a:solidFill>
-                  <a:schemeClr val="accent2">
-                    <a:lumMod val="75000"/>
-                  </a:schemeClr>
-                </a:solidFill>
-              </a:rPr>
-              <a:t>System for Students</a:t>
-            </a:r>
-            <a:endParaRPr lang="en-US" sz="2800" b="1" dirty="0">
-              <a:solidFill>
-                <a:schemeClr val="accent2">
-                  <a:lumMod val="75000"/>
-                </a:schemeClr>
-              </a:solidFill>
-            </a:endParaRPr>
           </a:p>
           <a:p>
             <a:pPr marL="571500" indent="-571500">
@@ -22147,7 +21941,7 @@
               <a:buAutoNum type="arabicPeriod"/>
             </a:pPr>
             <a:r>
-              <a:rPr lang="en-US" sz="2800" b="1" dirty="0" smtClean="0">
+              <a:rPr lang="en-US" sz="2800" b="1" dirty="0">
                 <a:solidFill>
                   <a:schemeClr val="accent2">
                     <a:lumMod val="75000"/>
@@ -22172,7 +21966,7 @@
               <a:buAutoNum type="arabicPeriod"/>
             </a:pPr>
             <a:r>
-              <a:rPr lang="en-US" sz="2800" b="1" dirty="0" smtClean="0">
+              <a:rPr lang="en-US" sz="2800" b="1" dirty="0">
                 <a:solidFill>
                   <a:schemeClr val="accent2">
                     <a:lumMod val="75000"/>
@@ -22181,13 +21975,6 @@
               </a:rPr>
               <a:t>Side-product</a:t>
             </a:r>
-            <a:endParaRPr lang="en-US" sz="2800" b="1" dirty="0">
-              <a:solidFill>
-                <a:schemeClr val="accent2">
-                  <a:lumMod val="75000"/>
-                </a:schemeClr>
-              </a:solidFill>
-            </a:endParaRPr>
           </a:p>
         </p:txBody>
       </p:sp>
@@ -22201,13 +21988,6 @@
   <p:clrMapOvr>
     <a:masterClrMapping/>
   </p:clrMapOvr>
-  <p:timing>
-    <p:tnLst>
-      <p:par>
-        <p:cTn id="1" dur="indefinite" restart="never" nodeType="tmRoot"/>
-      </p:par>
-    </p:tnLst>
-  </p:timing>
 </p:sld>
 </file>
 
@@ -22241,10 +22021,10 @@
           <p:cNvPr id="10" name="Rectangle 9">
             <a:extLst>
               <a:ext uri="{FF2B5EF4-FFF2-40B4-BE49-F238E27FC236}">
-                <a16:creationId xmlns:a16="http://schemas.microsoft.com/office/drawing/2014/main" xmlns="" id="{86197D16-FE75-4A0E-A0C9-28C0F04A43DF}"/>
+                <a16:creationId xmlns:a16="http://schemas.microsoft.com/office/drawing/2014/main" id="{86197D16-FE75-4A0E-A0C9-28C0F04A43DF}"/>
               </a:ext>
               <a:ext uri="{C183D7F6-B498-43B3-948B-1728B52AA6E4}">
-                <adec:decorative xmlns:adec="http://schemas.microsoft.com/office/drawing/2017/decorative" xmlns="" val="1"/>
+                <adec:decorative xmlns:adec="http://schemas.microsoft.com/office/drawing/2017/decorative" val="1"/>
               </a:ext>
             </a:extLst>
           </p:cNvPr>
@@ -22254,7 +22034,7 @@
           <p:nvPr>
             <p:extLst>
               <p:ext uri="{386F3935-93C4-4BCD-93E2-E3B085C9AB24}">
-                <p16:designElem xmlns:p16="http://schemas.microsoft.com/office/powerpoint/2015/main" xmlns="" val="1"/>
+                <p16:designElem xmlns:p16="http://schemas.microsoft.com/office/powerpoint/2015/main" val="1"/>
               </p:ext>
             </p:extLst>
           </p:nvPr>
@@ -22326,10 +22106,10 @@
           <p:cNvPr id="12" name="Picture 11">
             <a:extLst>
               <a:ext uri="{FF2B5EF4-FFF2-40B4-BE49-F238E27FC236}">
-                <a16:creationId xmlns:a16="http://schemas.microsoft.com/office/drawing/2014/main" xmlns="" id="{FA8FCEC6-4B30-4FF2-8B32-504BEAEA3A16}"/>
+                <a16:creationId xmlns:a16="http://schemas.microsoft.com/office/drawing/2014/main" id="{FA8FCEC6-4B30-4FF2-8B32-504BEAEA3A16}"/>
               </a:ext>
               <a:ext uri="{C183D7F6-B498-43B3-948B-1728B52AA6E4}">
-                <adec:decorative xmlns:adec="http://schemas.microsoft.com/office/drawing/2017/decorative" xmlns="" val="1"/>
+                <adec:decorative xmlns:adec="http://schemas.microsoft.com/office/drawing/2017/decorative" val="1"/>
               </a:ext>
             </a:extLst>
           </p:cNvPr>
@@ -22339,7 +22119,7 @@
           <p:nvPr>
             <p:extLst>
               <p:ext uri="{386F3935-93C4-4BCD-93E2-E3B085C9AB24}">
-                <p16:designElem xmlns:p16="http://schemas.microsoft.com/office/powerpoint/2015/main" xmlns="" val="1"/>
+                <p16:designElem xmlns:p16="http://schemas.microsoft.com/office/powerpoint/2015/main" val="1"/>
               </p:ext>
             </p:extLst>
           </p:nvPr>
@@ -22415,7 +22195,7 @@
           <p:cNvPr id="2" name="Title 1">
             <a:extLst>
               <a:ext uri="{FF2B5EF4-FFF2-40B4-BE49-F238E27FC236}">
-                <a16:creationId xmlns:a16="http://schemas.microsoft.com/office/drawing/2014/main" xmlns="" id="{979451DB-A8DC-194F-8BC3-68E815869ADA}"/>
+                <a16:creationId xmlns:a16="http://schemas.microsoft.com/office/drawing/2014/main" id="{979451DB-A8DC-194F-8BC3-68E815869ADA}"/>
               </a:ext>
             </a:extLst>
           </p:cNvPr>
@@ -22445,21 +22225,8 @@
                   <a:srgbClr val="FFFFFF"/>
                 </a:solidFill>
               </a:rPr>
-              <a:t>1. </a:t>
+              <a:t>1. DARS</a:t>
             </a:r>
-            <a:r>
-              <a:rPr lang="en-US" sz="6600" dirty="0" smtClean="0">
-                <a:solidFill>
-                  <a:srgbClr val="FFFFFF"/>
-                </a:solidFill>
-              </a:rPr>
-              <a:t>DARS</a:t>
-            </a:r>
-            <a:endParaRPr lang="en-US" sz="6600" dirty="0">
-              <a:solidFill>
-                <a:srgbClr val="FFFFFF"/>
-              </a:solidFill>
-            </a:endParaRPr>
           </a:p>
         </p:txBody>
       </p:sp>
@@ -22468,7 +22235,7 @@
           <p:cNvPr id="5" name="Picture 2" descr="https://lh6.googleusercontent.com/o-zD3gg3ajvak73M3tIgSa37WGMmigpo988VwPz8pSJBDBvuXH5Rtf-BffEU8IXtAKwYUD8W2I4Xn-WRyfQnGjliPblaizdA8Ug-BvozLLP_CdvBhnr8wRhX6OgDDs0C_3joz4XDm_ANp7-D9w">
             <a:extLst>
               <a:ext uri="{FF2B5EF4-FFF2-40B4-BE49-F238E27FC236}">
-                <a16:creationId xmlns:a16="http://schemas.microsoft.com/office/drawing/2014/main" xmlns="" id="{1C7F4249-298E-0845-B74C-1DF7E05A0052}"/>
+                <a16:creationId xmlns:a16="http://schemas.microsoft.com/office/drawing/2014/main" id="{1C7F4249-298E-0845-B74C-1DF7E05A0052}"/>
               </a:ext>
             </a:extLst>
           </p:cNvPr>
@@ -22518,13 +22285,6 @@
   <p:clrMapOvr>
     <a:masterClrMapping/>
   </p:clrMapOvr>
-  <p:timing>
-    <p:tnLst>
-      <p:par>
-        <p:cTn id="1" dur="indefinite" restart="never" nodeType="tmRoot"/>
-      </p:par>
-    </p:tnLst>
-  </p:timing>
 </p:sld>
 </file>
 
@@ -22558,10 +22318,10 @@
           <p:cNvPr id="11" name="Rectangle 10">
             <a:extLst>
               <a:ext uri="{FF2B5EF4-FFF2-40B4-BE49-F238E27FC236}">
-                <a16:creationId xmlns:a16="http://schemas.microsoft.com/office/drawing/2014/main" xmlns="" id="{4351DFE5-F63D-4BE0-BDA9-E3EB88F01AA5}"/>
+                <a16:creationId xmlns:a16="http://schemas.microsoft.com/office/drawing/2014/main" id="{4351DFE5-F63D-4BE0-BDA9-E3EB88F01AA5}"/>
               </a:ext>
               <a:ext uri="{C183D7F6-B498-43B3-948B-1728B52AA6E4}">
-                <adec:decorative xmlns:adec="http://schemas.microsoft.com/office/drawing/2017/decorative" xmlns="" val="1"/>
+                <adec:decorative xmlns:adec="http://schemas.microsoft.com/office/drawing/2017/decorative" val="1"/>
               </a:ext>
             </a:extLst>
           </p:cNvPr>
@@ -22571,7 +22331,7 @@
           <p:nvPr>
             <p:extLst>
               <p:ext uri="{386F3935-93C4-4BCD-93E2-E3B085C9AB24}">
-                <p16:designElem xmlns:p16="http://schemas.microsoft.com/office/powerpoint/2015/main" xmlns="" val="1"/>
+                <p16:designElem xmlns:p16="http://schemas.microsoft.com/office/powerpoint/2015/main" val="1"/>
               </p:ext>
             </p:extLst>
           </p:nvPr>
@@ -22643,10 +22403,10 @@
           <p:cNvPr id="13" name="Picture 12">
             <a:extLst>
               <a:ext uri="{FF2B5EF4-FFF2-40B4-BE49-F238E27FC236}">
-                <a16:creationId xmlns:a16="http://schemas.microsoft.com/office/drawing/2014/main" xmlns="" id="{02DD2BC0-6F29-4B4F-8D61-2DCF6D2E8E73}"/>
+                <a16:creationId xmlns:a16="http://schemas.microsoft.com/office/drawing/2014/main" id="{02DD2BC0-6F29-4B4F-8D61-2DCF6D2E8E73}"/>
               </a:ext>
               <a:ext uri="{C183D7F6-B498-43B3-948B-1728B52AA6E4}">
-                <adec:decorative xmlns:adec="http://schemas.microsoft.com/office/drawing/2017/decorative" xmlns="" val="1"/>
+                <adec:decorative xmlns:adec="http://schemas.microsoft.com/office/drawing/2017/decorative" val="1"/>
               </a:ext>
             </a:extLst>
           </p:cNvPr>
@@ -22656,7 +22416,7 @@
           <p:nvPr>
             <p:extLst>
               <p:ext uri="{386F3935-93C4-4BCD-93E2-E3B085C9AB24}">
-                <p16:designElem xmlns:p16="http://schemas.microsoft.com/office/powerpoint/2015/main" xmlns="" val="1"/>
+                <p16:designElem xmlns:p16="http://schemas.microsoft.com/office/powerpoint/2015/main" val="1"/>
               </p:ext>
             </p:extLst>
           </p:nvPr>
@@ -22688,7 +22448,7 @@
           <p:cNvPr id="2" name="Title 1">
             <a:extLst>
               <a:ext uri="{FF2B5EF4-FFF2-40B4-BE49-F238E27FC236}">
-                <a16:creationId xmlns:a16="http://schemas.microsoft.com/office/drawing/2014/main" xmlns="" id="{02BCACA2-D968-7B43-859F-DE266A1394AD}"/>
+                <a16:creationId xmlns:a16="http://schemas.microsoft.com/office/drawing/2014/main" id="{02BCACA2-D968-7B43-859F-DE266A1394AD}"/>
               </a:ext>
             </a:extLst>
           </p:cNvPr>
@@ -22728,7 +22488,7 @@
           <p:cNvPr id="4" name="Picture 2" descr="https://lh6.googleusercontent.com/o-zD3gg3ajvak73M3tIgSa37WGMmigpo988VwPz8pSJBDBvuXH5Rtf-BffEU8IXtAKwYUD8W2I4Xn-WRyfQnGjliPblaizdA8Ug-BvozLLP_CdvBhnr8wRhX6OgDDs0C_3joz4XDm_ANp7-D9w">
             <a:extLst>
               <a:ext uri="{FF2B5EF4-FFF2-40B4-BE49-F238E27FC236}">
-                <a16:creationId xmlns:a16="http://schemas.microsoft.com/office/drawing/2014/main" xmlns="" id="{4FB82333-C1EB-7E45-8A3F-FBB04B9F04A8}"/>
+                <a16:creationId xmlns:a16="http://schemas.microsoft.com/office/drawing/2014/main" id="{4FB82333-C1EB-7E45-8A3F-FBB04B9F04A8}"/>
               </a:ext>
             </a:extLst>
           </p:cNvPr>
@@ -22773,7 +22533,7 @@
           <p:cNvPr id="15" name="TextBox 14">
             <a:extLst>
               <a:ext uri="{FF2B5EF4-FFF2-40B4-BE49-F238E27FC236}">
-                <a16:creationId xmlns:a16="http://schemas.microsoft.com/office/drawing/2014/main" xmlns="" id="{0A22F531-D2E0-FE48-8DBF-570600A7F8B8}"/>
+                <a16:creationId xmlns:a16="http://schemas.microsoft.com/office/drawing/2014/main" id="{0A22F531-D2E0-FE48-8DBF-570600A7F8B8}"/>
               </a:ext>
             </a:extLst>
           </p:cNvPr>
@@ -22831,38 +22591,22 @@
               <a:buChar char="§"/>
             </a:pPr>
             <a:r>
-              <a:rPr lang="en-US" sz="2800" dirty="0" smtClean="0">
-                <a:solidFill>
-                  <a:srgbClr val="121259"/>
-                </a:solidFill>
-              </a:rPr>
-              <a:t>Course Recommender </a:t>
-            </a:r>
-            <a:r>
               <a:rPr lang="en-US" sz="2800" dirty="0">
                 <a:solidFill>
                   <a:srgbClr val="121259"/>
                 </a:solidFill>
               </a:rPr>
-              <a:t>System </a:t>
+              <a:t>Course Recommender System for MSLAS </a:t>
             </a:r>
             <a:r>
-              <a:rPr lang="en-US" sz="2800" dirty="0" smtClean="0">
-                <a:solidFill>
-                  <a:srgbClr val="121259"/>
-                </a:solidFill>
-              </a:rPr>
-              <a:t>for MSLAS </a:t>
-            </a:r>
-            <a:r>
-              <a:rPr lang="en-US" sz="2800" i="1" dirty="0" smtClean="0">
+              <a:rPr lang="en-US" sz="2800" i="1" dirty="0">
                 <a:solidFill>
                   <a:srgbClr val="121259"/>
                 </a:solidFill>
               </a:rPr>
               <a:t>Students</a:t>
             </a:r>
-            <a:endParaRPr lang="en-US" sz="2800" dirty="0" smtClean="0">
+            <a:endParaRPr lang="en-US" sz="2800" dirty="0">
               <a:solidFill>
                 <a:srgbClr val="121259"/>
               </a:solidFill>
@@ -22874,20 +22618,12 @@
               <a:buChar char="§"/>
             </a:pPr>
             <a:r>
-              <a:rPr lang="en-US" sz="2800" dirty="0" smtClean="0">
-                <a:solidFill>
-                  <a:srgbClr val="121259"/>
-                </a:solidFill>
-              </a:rPr>
-              <a:t>Supporting </a:t>
-            </a:r>
-            <a:r>
               <a:rPr lang="en-US" sz="2800" dirty="0">
                 <a:solidFill>
                   <a:srgbClr val="121259"/>
                 </a:solidFill>
               </a:rPr>
-              <a:t>Team:</a:t>
+              <a:t>Supporting Team:</a:t>
             </a:r>
           </a:p>
           <a:p>
@@ -22930,13 +22666,6 @@
   <p:clrMapOvr>
     <a:masterClrMapping/>
   </p:clrMapOvr>
-  <p:timing>
-    <p:tnLst>
-      <p:par>
-        <p:cTn id="1" dur="indefinite" restart="never" nodeType="tmRoot"/>
-      </p:par>
-    </p:tnLst>
-  </p:timing>
 </p:sld>
 </file>
 
@@ -22970,10 +22699,10 @@
           <p:cNvPr id="11" name="Rectangle 10">
             <a:extLst>
               <a:ext uri="{FF2B5EF4-FFF2-40B4-BE49-F238E27FC236}">
-                <a16:creationId xmlns:a16="http://schemas.microsoft.com/office/drawing/2014/main" xmlns="" id="{4351DFE5-F63D-4BE0-BDA9-E3EB88F01AA5}"/>
+                <a16:creationId xmlns:a16="http://schemas.microsoft.com/office/drawing/2014/main" id="{4351DFE5-F63D-4BE0-BDA9-E3EB88F01AA5}"/>
               </a:ext>
               <a:ext uri="{C183D7F6-B498-43B3-948B-1728B52AA6E4}">
-                <adec:decorative xmlns:adec="http://schemas.microsoft.com/office/drawing/2017/decorative" xmlns="" val="1"/>
+                <adec:decorative xmlns:adec="http://schemas.microsoft.com/office/drawing/2017/decorative" val="1"/>
               </a:ext>
             </a:extLst>
           </p:cNvPr>
@@ -22983,7 +22712,7 @@
           <p:nvPr>
             <p:extLst>
               <p:ext uri="{386F3935-93C4-4BCD-93E2-E3B085C9AB24}">
-                <p16:designElem xmlns:p16="http://schemas.microsoft.com/office/powerpoint/2015/main" xmlns="" val="1"/>
+                <p16:designElem xmlns:p16="http://schemas.microsoft.com/office/powerpoint/2015/main" val="1"/>
               </p:ext>
             </p:extLst>
           </p:nvPr>
@@ -23055,10 +22784,10 @@
           <p:cNvPr id="13" name="Picture 12">
             <a:extLst>
               <a:ext uri="{FF2B5EF4-FFF2-40B4-BE49-F238E27FC236}">
-                <a16:creationId xmlns:a16="http://schemas.microsoft.com/office/drawing/2014/main" xmlns="" id="{02DD2BC0-6F29-4B4F-8D61-2DCF6D2E8E73}"/>
+                <a16:creationId xmlns:a16="http://schemas.microsoft.com/office/drawing/2014/main" id="{02DD2BC0-6F29-4B4F-8D61-2DCF6D2E8E73}"/>
               </a:ext>
               <a:ext uri="{C183D7F6-B498-43B3-948B-1728B52AA6E4}">
-                <adec:decorative xmlns:adec="http://schemas.microsoft.com/office/drawing/2017/decorative" xmlns="" val="1"/>
+                <adec:decorative xmlns:adec="http://schemas.microsoft.com/office/drawing/2017/decorative" val="1"/>
               </a:ext>
             </a:extLst>
           </p:cNvPr>
@@ -23068,7 +22797,7 @@
           <p:nvPr>
             <p:extLst>
               <p:ext uri="{386F3935-93C4-4BCD-93E2-E3B085C9AB24}">
-                <p16:designElem xmlns:p16="http://schemas.microsoft.com/office/powerpoint/2015/main" xmlns="" val="1"/>
+                <p16:designElem xmlns:p16="http://schemas.microsoft.com/office/powerpoint/2015/main" val="1"/>
               </p:ext>
             </p:extLst>
           </p:nvPr>
@@ -23100,7 +22829,7 @@
           <p:cNvPr id="2" name="Title 1">
             <a:extLst>
               <a:ext uri="{FF2B5EF4-FFF2-40B4-BE49-F238E27FC236}">
-                <a16:creationId xmlns:a16="http://schemas.microsoft.com/office/drawing/2014/main" xmlns="" id="{02BCACA2-D968-7B43-859F-DE266A1394AD}"/>
+                <a16:creationId xmlns:a16="http://schemas.microsoft.com/office/drawing/2014/main" id="{02BCACA2-D968-7B43-859F-DE266A1394AD}"/>
               </a:ext>
             </a:extLst>
           </p:cNvPr>
@@ -23125,18 +22854,13 @@
           <a:p>
             <a:pPr algn="ctr"/>
             <a:r>
-              <a:rPr lang="en-US" sz="4000" dirty="0" smtClean="0">
+              <a:rPr lang="en-US" sz="4000" dirty="0">
                 <a:solidFill>
                   <a:srgbClr val="FFFFFF"/>
                 </a:solidFill>
               </a:rPr>
               <a:t>Objectives</a:t>
             </a:r>
-            <a:endParaRPr lang="en-US" sz="4000" dirty="0">
-              <a:solidFill>
-                <a:srgbClr val="FFFFFF"/>
-              </a:solidFill>
-            </a:endParaRPr>
           </a:p>
         </p:txBody>
       </p:sp>
@@ -23145,7 +22869,7 @@
           <p:cNvPr id="4" name="Picture 2" descr="https://lh6.googleusercontent.com/o-zD3gg3ajvak73M3tIgSa37WGMmigpo988VwPz8pSJBDBvuXH5Rtf-BffEU8IXtAKwYUD8W2I4Xn-WRyfQnGjliPblaizdA8Ug-BvozLLP_CdvBhnr8wRhX6OgDDs0C_3joz4XDm_ANp7-D9w">
             <a:extLst>
               <a:ext uri="{FF2B5EF4-FFF2-40B4-BE49-F238E27FC236}">
-                <a16:creationId xmlns:a16="http://schemas.microsoft.com/office/drawing/2014/main" xmlns="" id="{4FB82333-C1EB-7E45-8A3F-FBB04B9F04A8}"/>
+                <a16:creationId xmlns:a16="http://schemas.microsoft.com/office/drawing/2014/main" id="{4FB82333-C1EB-7E45-8A3F-FBB04B9F04A8}"/>
               </a:ext>
             </a:extLst>
           </p:cNvPr>
@@ -23190,7 +22914,7 @@
           <p:cNvPr id="14" name="TextBox 13">
             <a:extLst>
               <a:ext uri="{FF2B5EF4-FFF2-40B4-BE49-F238E27FC236}">
-                <a16:creationId xmlns:a16="http://schemas.microsoft.com/office/drawing/2014/main" xmlns="" id="{B9A4D418-1BBF-614E-877D-19C161ECA2C1}"/>
+                <a16:creationId xmlns:a16="http://schemas.microsoft.com/office/drawing/2014/main" id="{B9A4D418-1BBF-614E-877D-19C161ECA2C1}"/>
               </a:ext>
             </a:extLst>
           </p:cNvPr>
@@ -23239,23 +22963,7 @@
                   <a:srgbClr val="121259"/>
                 </a:solidFill>
               </a:rPr>
-              <a:t>Help students make well-informed decisions </a:t>
-            </a:r>
-            <a:r>
-              <a:rPr lang="en-US" sz="2800" dirty="0" smtClean="0">
-                <a:solidFill>
-                  <a:srgbClr val="121259"/>
-                </a:solidFill>
-              </a:rPr>
-              <a:t>w.r.t. course </a:t>
-            </a:r>
-            <a:r>
-              <a:rPr lang="en-US" sz="2800" dirty="0">
-                <a:solidFill>
-                  <a:srgbClr val="121259"/>
-                </a:solidFill>
-              </a:rPr>
-              <a:t>selection</a:t>
+              <a:t>Help students make well-informed decisions w.r.t. course selection</a:t>
             </a:r>
           </a:p>
           <a:p>
@@ -23269,23 +22977,7 @@
                   <a:srgbClr val="121259"/>
                 </a:solidFill>
               </a:rPr>
-              <a:t>Improve </a:t>
-            </a:r>
-            <a:r>
-              <a:rPr lang="en-US" sz="2800" dirty="0" smtClean="0">
-                <a:solidFill>
-                  <a:srgbClr val="121259"/>
-                </a:solidFill>
-              </a:rPr>
-              <a:t>self- and academic </a:t>
-            </a:r>
-            <a:r>
-              <a:rPr lang="en-US" sz="2800" dirty="0" smtClean="0">
-                <a:solidFill>
-                  <a:srgbClr val="121259"/>
-                </a:solidFill>
-              </a:rPr>
-              <a:t>advising</a:t>
+              <a:t>Improve self- and academic advising</a:t>
             </a:r>
           </a:p>
           <a:p>
@@ -23294,18 +22986,13 @@
               <a:buChar char="§"/>
             </a:pPr>
             <a:r>
-              <a:rPr lang="en-US" sz="2800" dirty="0" smtClean="0">
+              <a:rPr lang="en-US" sz="2800" dirty="0">
                 <a:solidFill>
                   <a:srgbClr val="121259"/>
                 </a:solidFill>
               </a:rPr>
               <a:t>App</a:t>
             </a:r>
-            <a:endParaRPr lang="en-US" sz="2800" dirty="0">
-              <a:solidFill>
-                <a:srgbClr val="121259"/>
-              </a:solidFill>
-            </a:endParaRPr>
           </a:p>
         </p:txBody>
       </p:sp>
@@ -23319,13 +23006,6 @@
   <p:clrMapOvr>
     <a:masterClrMapping/>
   </p:clrMapOvr>
-  <p:timing>
-    <p:tnLst>
-      <p:par>
-        <p:cTn id="1" dur="indefinite" restart="never" nodeType="tmRoot"/>
-      </p:par>
-    </p:tnLst>
-  </p:timing>
 </p:sld>
 </file>
 
@@ -23359,10 +23039,10 @@
           <p:cNvPr id="11" name="Rectangle 10">
             <a:extLst>
               <a:ext uri="{FF2B5EF4-FFF2-40B4-BE49-F238E27FC236}">
-                <a16:creationId xmlns:a16="http://schemas.microsoft.com/office/drawing/2014/main" xmlns="" id="{4351DFE5-F63D-4BE0-BDA9-E3EB88F01AA5}"/>
+                <a16:creationId xmlns:a16="http://schemas.microsoft.com/office/drawing/2014/main" id="{4351DFE5-F63D-4BE0-BDA9-E3EB88F01AA5}"/>
               </a:ext>
               <a:ext uri="{C183D7F6-B498-43B3-948B-1728B52AA6E4}">
-                <adec:decorative xmlns:adec="http://schemas.microsoft.com/office/drawing/2017/decorative" xmlns="" val="1"/>
+                <adec:decorative xmlns:adec="http://schemas.microsoft.com/office/drawing/2017/decorative" val="1"/>
               </a:ext>
             </a:extLst>
           </p:cNvPr>
@@ -23372,7 +23052,7 @@
           <p:nvPr>
             <p:extLst>
               <p:ext uri="{386F3935-93C4-4BCD-93E2-E3B085C9AB24}">
-                <p16:designElem xmlns:p16="http://schemas.microsoft.com/office/powerpoint/2015/main" xmlns="" val="1"/>
+                <p16:designElem xmlns:p16="http://schemas.microsoft.com/office/powerpoint/2015/main" val="1"/>
               </p:ext>
             </p:extLst>
           </p:nvPr>
@@ -23444,10 +23124,10 @@
           <p:cNvPr id="13" name="Picture 12">
             <a:extLst>
               <a:ext uri="{FF2B5EF4-FFF2-40B4-BE49-F238E27FC236}">
-                <a16:creationId xmlns:a16="http://schemas.microsoft.com/office/drawing/2014/main" xmlns="" id="{02DD2BC0-6F29-4B4F-8D61-2DCF6D2E8E73}"/>
+                <a16:creationId xmlns:a16="http://schemas.microsoft.com/office/drawing/2014/main" id="{02DD2BC0-6F29-4B4F-8D61-2DCF6D2E8E73}"/>
               </a:ext>
               <a:ext uri="{C183D7F6-B498-43B3-948B-1728B52AA6E4}">
-                <adec:decorative xmlns:adec="http://schemas.microsoft.com/office/drawing/2017/decorative" xmlns="" val="1"/>
+                <adec:decorative xmlns:adec="http://schemas.microsoft.com/office/drawing/2017/decorative" val="1"/>
               </a:ext>
             </a:extLst>
           </p:cNvPr>
@@ -23457,7 +23137,7 @@
           <p:nvPr>
             <p:extLst>
               <p:ext uri="{386F3935-93C4-4BCD-93E2-E3B085C9AB24}">
-                <p16:designElem xmlns:p16="http://schemas.microsoft.com/office/powerpoint/2015/main" xmlns="" val="1"/>
+                <p16:designElem xmlns:p16="http://schemas.microsoft.com/office/powerpoint/2015/main" val="1"/>
               </p:ext>
             </p:extLst>
           </p:nvPr>
@@ -23489,7 +23169,7 @@
           <p:cNvPr id="2" name="Title 1">
             <a:extLst>
               <a:ext uri="{FF2B5EF4-FFF2-40B4-BE49-F238E27FC236}">
-                <a16:creationId xmlns:a16="http://schemas.microsoft.com/office/drawing/2014/main" xmlns="" id="{02BCACA2-D968-7B43-859F-DE266A1394AD}"/>
+                <a16:creationId xmlns:a16="http://schemas.microsoft.com/office/drawing/2014/main" id="{02BCACA2-D968-7B43-859F-DE266A1394AD}"/>
               </a:ext>
             </a:extLst>
           </p:cNvPr>
@@ -23529,7 +23209,7 @@
           <p:cNvPr id="4" name="Picture 2" descr="https://lh6.googleusercontent.com/o-zD3gg3ajvak73M3tIgSa37WGMmigpo988VwPz8pSJBDBvuXH5Rtf-BffEU8IXtAKwYUD8W2I4Xn-WRyfQnGjliPblaizdA8Ug-BvozLLP_CdvBhnr8wRhX6OgDDs0C_3joz4XDm_ANp7-D9w">
             <a:extLst>
               <a:ext uri="{FF2B5EF4-FFF2-40B4-BE49-F238E27FC236}">
-                <a16:creationId xmlns:a16="http://schemas.microsoft.com/office/drawing/2014/main" xmlns="" id="{4FB82333-C1EB-7E45-8A3F-FBB04B9F04A8}"/>
+                <a16:creationId xmlns:a16="http://schemas.microsoft.com/office/drawing/2014/main" id="{4FB82333-C1EB-7E45-8A3F-FBB04B9F04A8}"/>
               </a:ext>
             </a:extLst>
           </p:cNvPr>
@@ -23574,7 +23254,7 @@
           <p:cNvPr id="7" name="Diagram 6">
             <a:extLst>
               <a:ext uri="{FF2B5EF4-FFF2-40B4-BE49-F238E27FC236}">
-                <a16:creationId xmlns:a16="http://schemas.microsoft.com/office/drawing/2014/main" xmlns="" id="{E6AD6190-76EE-8241-98F6-867245B7549E}"/>
+                <a16:creationId xmlns:a16="http://schemas.microsoft.com/office/drawing/2014/main" id="{E6AD6190-76EE-8241-98F6-867245B7549E}"/>
               </a:ext>
             </a:extLst>
           </p:cNvPr>
@@ -23607,13 +23287,6 @@
   <p:clrMapOvr>
     <a:masterClrMapping/>
   </p:clrMapOvr>
-  <p:timing>
-    <p:tnLst>
-      <p:par>
-        <p:cTn id="1" dur="indefinite" restart="never" nodeType="tmRoot"/>
-      </p:par>
-    </p:tnLst>
-  </p:timing>
 </p:sld>
 </file>
 
@@ -23647,10 +23320,10 @@
           <p:cNvPr id="10" name="Rectangle 9">
             <a:extLst>
               <a:ext uri="{FF2B5EF4-FFF2-40B4-BE49-F238E27FC236}">
-                <a16:creationId xmlns:a16="http://schemas.microsoft.com/office/drawing/2014/main" xmlns="" id="{86197D16-FE75-4A0E-A0C9-28C0F04A43DF}"/>
+                <a16:creationId xmlns:a16="http://schemas.microsoft.com/office/drawing/2014/main" id="{86197D16-FE75-4A0E-A0C9-28C0F04A43DF}"/>
               </a:ext>
               <a:ext uri="{C183D7F6-B498-43B3-948B-1728B52AA6E4}">
-                <adec:decorative xmlns:adec="http://schemas.microsoft.com/office/drawing/2017/decorative" xmlns="" val="1"/>
+                <adec:decorative xmlns:adec="http://schemas.microsoft.com/office/drawing/2017/decorative" val="1"/>
               </a:ext>
             </a:extLst>
           </p:cNvPr>
@@ -23660,7 +23333,7 @@
           <p:nvPr>
             <p:extLst>
               <p:ext uri="{386F3935-93C4-4BCD-93E2-E3B085C9AB24}">
-                <p16:designElem xmlns:p16="http://schemas.microsoft.com/office/powerpoint/2015/main" xmlns="" val="1"/>
+                <p16:designElem xmlns:p16="http://schemas.microsoft.com/office/powerpoint/2015/main" val="1"/>
               </p:ext>
             </p:extLst>
           </p:nvPr>
@@ -23732,10 +23405,10 @@
           <p:cNvPr id="12" name="Picture 11">
             <a:extLst>
               <a:ext uri="{FF2B5EF4-FFF2-40B4-BE49-F238E27FC236}">
-                <a16:creationId xmlns:a16="http://schemas.microsoft.com/office/drawing/2014/main" xmlns="" id="{FA8FCEC6-4B30-4FF2-8B32-504BEAEA3A16}"/>
+                <a16:creationId xmlns:a16="http://schemas.microsoft.com/office/drawing/2014/main" id="{FA8FCEC6-4B30-4FF2-8B32-504BEAEA3A16}"/>
               </a:ext>
               <a:ext uri="{C183D7F6-B498-43B3-948B-1728B52AA6E4}">
-                <adec:decorative xmlns:adec="http://schemas.microsoft.com/office/drawing/2017/decorative" xmlns="" val="1"/>
+                <adec:decorative xmlns:adec="http://schemas.microsoft.com/office/drawing/2017/decorative" val="1"/>
               </a:ext>
             </a:extLst>
           </p:cNvPr>
@@ -23745,7 +23418,7 @@
           <p:nvPr>
             <p:extLst>
               <p:ext uri="{386F3935-93C4-4BCD-93E2-E3B085C9AB24}">
-                <p16:designElem xmlns:p16="http://schemas.microsoft.com/office/powerpoint/2015/main" xmlns="" val="1"/>
+                <p16:designElem xmlns:p16="http://schemas.microsoft.com/office/powerpoint/2015/main" val="1"/>
               </p:ext>
             </p:extLst>
           </p:nvPr>
@@ -23821,7 +23494,7 @@
           <p:cNvPr id="2" name="Title 1">
             <a:extLst>
               <a:ext uri="{FF2B5EF4-FFF2-40B4-BE49-F238E27FC236}">
-                <a16:creationId xmlns:a16="http://schemas.microsoft.com/office/drawing/2014/main" xmlns="" id="{979451DB-A8DC-194F-8BC3-68E815869ADA}"/>
+                <a16:creationId xmlns:a16="http://schemas.microsoft.com/office/drawing/2014/main" id="{979451DB-A8DC-194F-8BC3-68E815869ADA}"/>
               </a:ext>
             </a:extLst>
           </p:cNvPr>
@@ -23851,37 +23524,8 @@
                   <a:srgbClr val="FFFFFF"/>
                 </a:solidFill>
               </a:rPr>
-              <a:t>2. </a:t>
+              <a:t>2. A Course Recommender System for Students</a:t>
             </a:r>
-            <a:r>
-              <a:rPr lang="en-US" sz="6600" dirty="0" smtClean="0">
-                <a:solidFill>
-                  <a:srgbClr val="FFFFFF"/>
-                </a:solidFill>
-              </a:rPr>
-              <a:t>A </a:t>
-            </a:r>
-            <a:r>
-              <a:rPr lang="en-US" sz="6600" dirty="0" smtClean="0">
-                <a:solidFill>
-                  <a:srgbClr val="FFFFFF"/>
-                </a:solidFill>
-              </a:rPr>
-              <a:t>Course Recommender </a:t>
-            </a:r>
-            <a:r>
-              <a:rPr lang="en-US" sz="6600" dirty="0" smtClean="0">
-                <a:solidFill>
-                  <a:srgbClr val="FFFFFF"/>
-                </a:solidFill>
-              </a:rPr>
-              <a:t>System for Students</a:t>
-            </a:r>
-            <a:endParaRPr lang="en-US" sz="6600" dirty="0">
-              <a:solidFill>
-                <a:srgbClr val="FFFFFF"/>
-              </a:solidFill>
-            </a:endParaRPr>
           </a:p>
         </p:txBody>
       </p:sp>
@@ -23890,7 +23534,7 @@
           <p:cNvPr id="5" name="Picture 2" descr="https://lh6.googleusercontent.com/o-zD3gg3ajvak73M3tIgSa37WGMmigpo988VwPz8pSJBDBvuXH5Rtf-BffEU8IXtAKwYUD8W2I4Xn-WRyfQnGjliPblaizdA8Ug-BvozLLP_CdvBhnr8wRhX6OgDDs0C_3joz4XDm_ANp7-D9w">
             <a:extLst>
               <a:ext uri="{FF2B5EF4-FFF2-40B4-BE49-F238E27FC236}">
-                <a16:creationId xmlns:a16="http://schemas.microsoft.com/office/drawing/2014/main" xmlns="" id="{1C7F4249-298E-0845-B74C-1DF7E05A0052}"/>
+                <a16:creationId xmlns:a16="http://schemas.microsoft.com/office/drawing/2014/main" id="{1C7F4249-298E-0845-B74C-1DF7E05A0052}"/>
               </a:ext>
             </a:extLst>
           </p:cNvPr>
@@ -23940,13 +23584,6 @@
   <p:clrMapOvr>
     <a:masterClrMapping/>
   </p:clrMapOvr>
-  <p:timing>
-    <p:tnLst>
-      <p:par>
-        <p:cTn id="1" dur="indefinite" restart="never" nodeType="tmRoot"/>
-      </p:par>
-    </p:tnLst>
-  </p:timing>
 </p:sld>
 </file>
 
@@ -23980,10 +23617,10 @@
           <p:cNvPr id="11" name="Rectangle 10">
             <a:extLst>
               <a:ext uri="{FF2B5EF4-FFF2-40B4-BE49-F238E27FC236}">
-                <a16:creationId xmlns:a16="http://schemas.microsoft.com/office/drawing/2014/main" xmlns="" id="{4351DFE5-F63D-4BE0-BDA9-E3EB88F01AA5}"/>
+                <a16:creationId xmlns:a16="http://schemas.microsoft.com/office/drawing/2014/main" id="{4351DFE5-F63D-4BE0-BDA9-E3EB88F01AA5}"/>
               </a:ext>
               <a:ext uri="{C183D7F6-B498-43B3-948B-1728B52AA6E4}">
-                <adec:decorative xmlns:adec="http://schemas.microsoft.com/office/drawing/2017/decorative" xmlns="" val="1"/>
+                <adec:decorative xmlns:adec="http://schemas.microsoft.com/office/drawing/2017/decorative" val="1"/>
               </a:ext>
             </a:extLst>
           </p:cNvPr>
@@ -23993,7 +23630,7 @@
           <p:nvPr>
             <p:extLst>
               <p:ext uri="{386F3935-93C4-4BCD-93E2-E3B085C9AB24}">
-                <p16:designElem xmlns:p16="http://schemas.microsoft.com/office/powerpoint/2015/main" xmlns="" val="1"/>
+                <p16:designElem xmlns:p16="http://schemas.microsoft.com/office/powerpoint/2015/main" val="1"/>
               </p:ext>
             </p:extLst>
           </p:nvPr>
@@ -24065,10 +23702,10 @@
           <p:cNvPr id="13" name="Picture 12">
             <a:extLst>
               <a:ext uri="{FF2B5EF4-FFF2-40B4-BE49-F238E27FC236}">
-                <a16:creationId xmlns:a16="http://schemas.microsoft.com/office/drawing/2014/main" xmlns="" id="{02DD2BC0-6F29-4B4F-8D61-2DCF6D2E8E73}"/>
+                <a16:creationId xmlns:a16="http://schemas.microsoft.com/office/drawing/2014/main" id="{02DD2BC0-6F29-4B4F-8D61-2DCF6D2E8E73}"/>
               </a:ext>
               <a:ext uri="{C183D7F6-B498-43B3-948B-1728B52AA6E4}">
-                <adec:decorative xmlns:adec="http://schemas.microsoft.com/office/drawing/2017/decorative" xmlns="" val="1"/>
+                <adec:decorative xmlns:adec="http://schemas.microsoft.com/office/drawing/2017/decorative" val="1"/>
               </a:ext>
             </a:extLst>
           </p:cNvPr>
@@ -24078,7 +23715,7 @@
           <p:nvPr>
             <p:extLst>
               <p:ext uri="{386F3935-93C4-4BCD-93E2-E3B085C9AB24}">
-                <p16:designElem xmlns:p16="http://schemas.microsoft.com/office/powerpoint/2015/main" xmlns="" val="1"/>
+                <p16:designElem xmlns:p16="http://schemas.microsoft.com/office/powerpoint/2015/main" val="1"/>
               </p:ext>
             </p:extLst>
           </p:nvPr>
@@ -24110,7 +23747,7 @@
           <p:cNvPr id="2" name="Title 1">
             <a:extLst>
               <a:ext uri="{FF2B5EF4-FFF2-40B4-BE49-F238E27FC236}">
-                <a16:creationId xmlns:a16="http://schemas.microsoft.com/office/drawing/2014/main" xmlns="" id="{02BCACA2-D968-7B43-859F-DE266A1394AD}"/>
+                <a16:creationId xmlns:a16="http://schemas.microsoft.com/office/drawing/2014/main" id="{02BCACA2-D968-7B43-859F-DE266A1394AD}"/>
               </a:ext>
             </a:extLst>
           </p:cNvPr>
@@ -24135,18 +23772,13 @@
           <a:p>
             <a:pPr algn="ctr"/>
             <a:r>
-              <a:rPr lang="en-US" sz="4000" dirty="0" smtClean="0">
+              <a:rPr lang="en-US" sz="4000" dirty="0">
                 <a:solidFill>
                   <a:srgbClr val="FFFFFF"/>
                 </a:solidFill>
               </a:rPr>
               <a:t>Recommender System</a:t>
             </a:r>
-            <a:endParaRPr lang="en-US" sz="4000" dirty="0">
-              <a:solidFill>
-                <a:srgbClr val="FFFFFF"/>
-              </a:solidFill>
-            </a:endParaRPr>
           </a:p>
         </p:txBody>
       </p:sp>
@@ -24155,7 +23787,7 @@
           <p:cNvPr id="4" name="Picture 2" descr="https://lh6.googleusercontent.com/o-zD3gg3ajvak73M3tIgSa37WGMmigpo988VwPz8pSJBDBvuXH5Rtf-BffEU8IXtAKwYUD8W2I4Xn-WRyfQnGjliPblaizdA8Ug-BvozLLP_CdvBhnr8wRhX6OgDDs0C_3joz4XDm_ANp7-D9w">
             <a:extLst>
               <a:ext uri="{FF2B5EF4-FFF2-40B4-BE49-F238E27FC236}">
-                <a16:creationId xmlns:a16="http://schemas.microsoft.com/office/drawing/2014/main" xmlns="" id="{4FB82333-C1EB-7E45-8A3F-FBB04B9F04A8}"/>
+                <a16:creationId xmlns:a16="http://schemas.microsoft.com/office/drawing/2014/main" id="{4FB82333-C1EB-7E45-8A3F-FBB04B9F04A8}"/>
               </a:ext>
             </a:extLst>
           </p:cNvPr>
@@ -24200,7 +23832,7 @@
           <p:cNvPr id="8" name="Diagram 7">
             <a:extLst>
               <a:ext uri="{FF2B5EF4-FFF2-40B4-BE49-F238E27FC236}">
-                <a16:creationId xmlns:a16="http://schemas.microsoft.com/office/drawing/2014/main" xmlns="" id="{1D27ABC3-4E63-0943-BAE7-DFB0DA85A76F}"/>
+                <a16:creationId xmlns:a16="http://schemas.microsoft.com/office/drawing/2014/main" id="{1D27ABC3-4E63-0943-BAE7-DFB0DA85A76F}"/>
               </a:ext>
             </a:extLst>
           </p:cNvPr>
@@ -24233,13 +23865,6 @@
   <p:clrMapOvr>
     <a:masterClrMapping/>
   </p:clrMapOvr>
-  <p:timing>
-    <p:tnLst>
-      <p:par>
-        <p:cTn id="1" dur="indefinite" restart="never" nodeType="tmRoot"/>
-      </p:par>
-    </p:tnLst>
-  </p:timing>
 </p:sld>
 </file>
 
@@ -24532,7 +24157,7 @@
   <a:extraClrSchemeLst/>
   <a:extLst>
     <a:ext uri="{05A4C25C-085E-4340-85A3-A5531E510DB2}">
-      <thm15:themeFamily xmlns:thm15="http://schemas.microsoft.com/office/thememl/2012/main" xmlns="" name="Office Theme" id="{62F939B6-93AF-4DB8-9C6B-D6C7DFDC589F}" vid="{4A3C46E8-61CC-4603-A589-7422A47A8E4A}"/>
+      <thm15:themeFamily xmlns:thm15="http://schemas.microsoft.com/office/thememl/2012/main" name="Office Theme" id="{62F939B6-93AF-4DB8-9C6B-D6C7DFDC589F}" vid="{4A3C46E8-61CC-4603-A589-7422A47A8E4A}"/>
     </a:ext>
   </a:extLst>
 </a:theme>
@@ -24827,7 +24452,7 @@
   <a:extraClrSchemeLst/>
   <a:extLst>
     <a:ext uri="{05A4C25C-085E-4340-85A3-A5531E510DB2}">
-      <thm15:themeFamily xmlns:thm15="http://schemas.microsoft.com/office/thememl/2012/main" xmlns="" name="Office Theme" id="{62F939B6-93AF-4DB8-9C6B-D6C7DFDC589F}" vid="{4A3C46E8-61CC-4603-A589-7422A47A8E4A}"/>
+      <thm15:themeFamily xmlns:thm15="http://schemas.microsoft.com/office/thememl/2012/main" name="Office Theme" id="{62F939B6-93AF-4DB8-9C6B-D6C7DFDC589F}" vid="{4A3C46E8-61CC-4603-A589-7422A47A8E4A}"/>
     </a:ext>
   </a:extLst>
 </a:theme>

</xml_diff>

<commit_message>
compute app_model in Pillar 2
</commit_message>
<xml_diff>
--- a/Output/Communication Material/most recent version.pptx
+++ b/Output/Communication Material/most recent version.pptx
@@ -19999,10 +19999,10 @@
       </p:pic>
       <p:pic>
         <p:nvPicPr>
-          <p:cNvPr id="4" name="Picture 3">
+          <p:cNvPr id="3" name="Picture 2">
             <a:extLst>
               <a:ext uri="{FF2B5EF4-FFF2-40B4-BE49-F238E27FC236}">
-                <a16:creationId xmlns:a16="http://schemas.microsoft.com/office/drawing/2014/main" id="{A38116D0-EE26-F740-9599-E98066AB4021}"/>
+                <a16:creationId xmlns:a16="http://schemas.microsoft.com/office/drawing/2014/main" id="{7642D2EE-C10A-B540-949C-85D2D1F4393E}"/>
               </a:ext>
             </a:extLst>
           </p:cNvPr>
@@ -20019,8 +20019,8 @@
         </p:blipFill>
         <p:spPr>
           <a:xfrm>
-            <a:off x="383268" y="585216"/>
-            <a:ext cx="11451101" cy="4736592"/>
+            <a:off x="352295" y="164591"/>
+            <a:ext cx="11315449" cy="6431083"/>
           </a:xfrm>
           <a:prstGeom prst="rect">
             <a:avLst/>
@@ -20132,7 +20132,7 @@
         </p:blipFill>
         <p:spPr>
           <a:xfrm>
-            <a:off x="2562487" y="0"/>
+            <a:off x="2562487" y="65868"/>
             <a:ext cx="7067025" cy="6858000"/>
           </a:xfrm>
           <a:prstGeom prst="rect">

</xml_diff>

<commit_message>
cleaner visuals in traffic light table
</commit_message>
<xml_diff>
--- a/Output/Communication Material/most recent version.pptx
+++ b/Output/Communication Material/most recent version.pptx
@@ -19999,10 +19999,10 @@
       </p:pic>
       <p:pic>
         <p:nvPicPr>
-          <p:cNvPr id="4" name="Picture 3">
+          <p:cNvPr id="3" name="Picture 2">
             <a:extLst>
               <a:ext uri="{FF2B5EF4-FFF2-40B4-BE49-F238E27FC236}">
-                <a16:creationId xmlns:a16="http://schemas.microsoft.com/office/drawing/2014/main" id="{A38116D0-EE26-F740-9599-E98066AB4021}"/>
+                <a16:creationId xmlns:a16="http://schemas.microsoft.com/office/drawing/2014/main" id="{7642D2EE-C10A-B540-949C-85D2D1F4393E}"/>
               </a:ext>
             </a:extLst>
           </p:cNvPr>
@@ -20019,8 +20019,8 @@
         </p:blipFill>
         <p:spPr>
           <a:xfrm>
-            <a:off x="383268" y="585216"/>
-            <a:ext cx="11451101" cy="4736592"/>
+            <a:off x="352295" y="164591"/>
+            <a:ext cx="11315449" cy="6431083"/>
           </a:xfrm>
           <a:prstGeom prst="rect">
             <a:avLst/>
@@ -20132,7 +20132,7 @@
         </p:blipFill>
         <p:spPr>
           <a:xfrm>
-            <a:off x="2562487" y="0"/>
+            <a:off x="2562487" y="65868"/>
             <a:ext cx="7067025" cy="6858000"/>
           </a:xfrm>
           <a:prstGeom prst="rect">

</xml_diff>